<commit_message>
Student enrollement platform project CST 499 submitted
This submission contains a compressed folder that contains the student enrollment platform project and the updated PowerPoint presentation file.
</commit_message>
<xml_diff>
--- a/Student_Enrollment_Presentation_Sofiane_Akli.pptx
+++ b/Student_Enrollment_Presentation_Sofiane_Akli.pptx
@@ -143,6 +143,7 @@
 <file path=ppt/revisionInfo.xml><?xml version="1.0" encoding="utf-8"?>
 <p1510:revInfo xmlns:a="http://schemas.openxmlformats.org/drawingml/2006/main" xmlns:r="http://schemas.openxmlformats.org/officeDocument/2006/relationships" xmlns:p1510="http://schemas.microsoft.com/office/powerpoint/2015/10/main">
   <p1510:revLst>
+    <p1510:client id="{00174874-EC68-41A4-B563-71B24B4BC89A}" v="5" dt="2025-10-14T01:03:43.750"/>
     <p1510:client id="{60841BFD-2C57-487D-8D61-D0BA60BF2341}" v="73" dt="2025-10-13T22:20:11.438"/>
   </p1510:revLst>
 </p1510:revInfo>
@@ -150,6 +151,38 @@
 
 <file path=ppt/changesInfos/changesInfo1.xml><?xml version="1.0" encoding="utf-8"?>
 <pc:chgInfo xmlns:a="http://schemas.openxmlformats.org/drawingml/2006/main" xmlns:r="http://schemas.openxmlformats.org/officeDocument/2006/relationships" xmlns:ac="http://schemas.microsoft.com/office/drawing/2013/main/command" xmlns:pc="http://schemas.microsoft.com/office/powerpoint/2013/main/command">
+  <pc:docChgLst>
+    <pc:chgData name="sofiane akli" userId="fcc0bca7a68ac814" providerId="LiveId" clId="{00174874-EC68-41A4-B563-71B24B4BC89A}"/>
+    <pc:docChg chg="modSld">
+      <pc:chgData name="sofiane akli" userId="fcc0bca7a68ac814" providerId="LiveId" clId="{00174874-EC68-41A4-B563-71B24B4BC89A}" dt="2025-10-14T01:03:43.750" v="50" actId="20577"/>
+      <pc:docMkLst>
+        <pc:docMk/>
+      </pc:docMkLst>
+      <pc:sldChg chg="addSp delSp modSp mod">
+        <pc:chgData name="sofiane akli" userId="fcc0bca7a68ac814" providerId="LiveId" clId="{00174874-EC68-41A4-B563-71B24B4BC89A}" dt="2025-10-14T01:03:43.750" v="50" actId="20577"/>
+        <pc:sldMkLst>
+          <pc:docMk/>
+          <pc:sldMk cId="0" sldId="270"/>
+        </pc:sldMkLst>
+        <pc:spChg chg="mod">
+          <ac:chgData name="sofiane akli" userId="fcc0bca7a68ac814" providerId="LiveId" clId="{00174874-EC68-41A4-B563-71B24B4BC89A}" dt="2025-10-14T01:03:43.750" v="50" actId="20577"/>
+          <ac:spMkLst>
+            <pc:docMk/>
+            <pc:sldMk cId="0" sldId="270"/>
+            <ac:spMk id="3" creationId="{00000000-0000-0000-0000-000000000000}"/>
+          </ac:spMkLst>
+        </pc:spChg>
+        <pc:spChg chg="add del mod">
+          <ac:chgData name="sofiane akli" userId="fcc0bca7a68ac814" providerId="LiveId" clId="{00174874-EC68-41A4-B563-71B24B4BC89A}" dt="2025-10-14T01:03:09.129" v="47" actId="478"/>
+          <ac:spMkLst>
+            <pc:docMk/>
+            <pc:sldMk cId="0" sldId="270"/>
+            <ac:spMk id="4" creationId="{64683BB9-2A1D-130A-EC48-CD7EE9BEB85A}"/>
+          </ac:spMkLst>
+        </pc:spChg>
+      </pc:sldChg>
+    </pc:docChg>
+  </pc:docChgLst>
   <pc:docChgLst>
     <pc:chgData name="sofiane akli" userId="fcc0bca7a68ac814" providerId="LiveId" clId="{60841BFD-2C57-487D-8D61-D0BA60BF2341}"/>
     <pc:docChg chg="undo custSel addSld modSld">
@@ -11175,7 +11208,7 @@
           <a:noFill/>
           <a:extLst>
             <a:ext uri="{909E8E84-426E-40dd-AFC4-6F175D3DCCD1}">
-              <a14:hiddenFill xmlns:a14="http://schemas.microsoft.com/office/drawing/2010/main" xmlns="">
+              <a14:hiddenFill xmlns="" xmlns:a14="http://schemas.microsoft.com/office/drawing/2010/main">
                 <a:solidFill>
                   <a:srgbClr val="FFFFFF"/>
                 </a:solidFill>
@@ -11235,7 +11268,7 @@
             </a:ln>
             <a:extLst>
               <a:ext uri="{91240B29-F687-4f45-9708-019B960494DF}">
-                <a14:hiddenLine xmlns:a14="http://schemas.microsoft.com/office/drawing/2010/main" xmlns="" w="9525">
+                <a14:hiddenLine xmlns="" xmlns:a14="http://schemas.microsoft.com/office/drawing/2010/main" w="9525">
                   <a:solidFill>
                     <a:srgbClr val="000000"/>
                   </a:solidFill>
@@ -11325,7 +11358,7 @@
             </a:ln>
             <a:extLst>
               <a:ext uri="{91240B29-F687-4f45-9708-019B960494DF}">
-                <a14:hiddenLine xmlns:a14="http://schemas.microsoft.com/office/drawing/2010/main" xmlns="" w="9525">
+                <a14:hiddenLine xmlns="" xmlns:a14="http://schemas.microsoft.com/office/drawing/2010/main" w="9525">
                   <a:solidFill>
                     <a:srgbClr val="000000"/>
                   </a:solidFill>
@@ -11415,7 +11448,7 @@
             </a:ln>
             <a:extLst>
               <a:ext uri="{91240B29-F687-4f45-9708-019B960494DF}">
-                <a14:hiddenLine xmlns:a14="http://schemas.microsoft.com/office/drawing/2010/main" xmlns="" w="9525">
+                <a14:hiddenLine xmlns="" xmlns:a14="http://schemas.microsoft.com/office/drawing/2010/main" w="9525">
                   <a:solidFill>
                     <a:srgbClr val="000000"/>
                   </a:solidFill>
@@ -11449,7 +11482,7 @@
             </a:ln>
             <a:extLst>
               <a:ext uri="{91240B29-F687-4f45-9708-019B960494DF}">
-                <a14:hiddenLine xmlns:a14="http://schemas.microsoft.com/office/drawing/2010/main" xmlns="" w="9525">
+                <a14:hiddenLine xmlns="" xmlns:a14="http://schemas.microsoft.com/office/drawing/2010/main" w="9525">
                   <a:solidFill>
                     <a:srgbClr val="000000"/>
                   </a:solidFill>
@@ -11539,7 +11572,7 @@
             </a:ln>
             <a:extLst>
               <a:ext uri="{91240B29-F687-4f45-9708-019B960494DF}">
-                <a14:hiddenLine xmlns:a14="http://schemas.microsoft.com/office/drawing/2010/main" xmlns="" w="9525">
+                <a14:hiddenLine xmlns="" xmlns:a14="http://schemas.microsoft.com/office/drawing/2010/main" w="9525">
                   <a:solidFill>
                     <a:srgbClr val="000000"/>
                   </a:solidFill>
@@ -11601,7 +11634,7 @@
             </a:ln>
             <a:extLst>
               <a:ext uri="{91240B29-F687-4f45-9708-019B960494DF}">
-                <a14:hiddenLine xmlns:a14="http://schemas.microsoft.com/office/drawing/2010/main" xmlns="" w="9525">
+                <a14:hiddenLine xmlns="" xmlns:a14="http://schemas.microsoft.com/office/drawing/2010/main" w="9525">
                   <a:solidFill>
                     <a:srgbClr val="000000"/>
                   </a:solidFill>
@@ -11663,7 +11696,7 @@
             </a:ln>
             <a:extLst>
               <a:ext uri="{91240B29-F687-4f45-9708-019B960494DF}">
-                <a14:hiddenLine xmlns:a14="http://schemas.microsoft.com/office/drawing/2010/main" xmlns="" w="9525">
+                <a14:hiddenLine xmlns="" xmlns:a14="http://schemas.microsoft.com/office/drawing/2010/main" w="9525">
                   <a:solidFill>
                     <a:srgbClr val="000000"/>
                   </a:solidFill>
@@ -11753,7 +11786,7 @@
             </a:ln>
             <a:extLst>
               <a:ext uri="{91240B29-F687-4f45-9708-019B960494DF}">
-                <a14:hiddenLine xmlns:a14="http://schemas.microsoft.com/office/drawing/2010/main" xmlns="" w="9525">
+                <a14:hiddenLine xmlns="" xmlns:a14="http://schemas.microsoft.com/office/drawing/2010/main" w="9525">
                   <a:solidFill>
                     <a:srgbClr val="000000"/>
                   </a:solidFill>
@@ -11815,7 +11848,7 @@
             </a:ln>
             <a:extLst>
               <a:ext uri="{91240B29-F687-4f45-9708-019B960494DF}">
-                <a14:hiddenLine xmlns:a14="http://schemas.microsoft.com/office/drawing/2010/main" xmlns="" w="9525">
+                <a14:hiddenLine xmlns="" xmlns:a14="http://schemas.microsoft.com/office/drawing/2010/main" w="9525">
                   <a:solidFill>
                     <a:srgbClr val="000000"/>
                   </a:solidFill>
@@ -11877,7 +11910,7 @@
             </a:ln>
             <a:extLst>
               <a:ext uri="{91240B29-F687-4f45-9708-019B960494DF}">
-                <a14:hiddenLine xmlns:a14="http://schemas.microsoft.com/office/drawing/2010/main" xmlns="" w="9525">
+                <a14:hiddenLine xmlns="" xmlns:a14="http://schemas.microsoft.com/office/drawing/2010/main" w="9525">
                   <a:solidFill>
                     <a:srgbClr val="000000"/>
                   </a:solidFill>
@@ -11967,7 +12000,7 @@
             </a:ln>
             <a:extLst>
               <a:ext uri="{91240B29-F687-4f45-9708-019B960494DF}">
-                <a14:hiddenLine xmlns:a14="http://schemas.microsoft.com/office/drawing/2010/main" xmlns="" w="9525">
+                <a14:hiddenLine xmlns="" xmlns:a14="http://schemas.microsoft.com/office/drawing/2010/main" w="9525">
                   <a:solidFill>
                     <a:srgbClr val="000000"/>
                   </a:solidFill>
@@ -12057,7 +12090,7 @@
             </a:ln>
             <a:extLst>
               <a:ext uri="{91240B29-F687-4f45-9708-019B960494DF}">
-                <a14:hiddenLine xmlns:a14="http://schemas.microsoft.com/office/drawing/2010/main" xmlns="" w="9525">
+                <a14:hiddenLine xmlns="" xmlns:a14="http://schemas.microsoft.com/office/drawing/2010/main" w="9525">
                   <a:solidFill>
                     <a:srgbClr val="000000"/>
                   </a:solidFill>
@@ -12119,7 +12152,7 @@
             </a:ln>
             <a:extLst>
               <a:ext uri="{91240B29-F687-4f45-9708-019B960494DF}">
-                <a14:hiddenLine xmlns:a14="http://schemas.microsoft.com/office/drawing/2010/main" xmlns="" w="9525">
+                <a14:hiddenLine xmlns="" xmlns:a14="http://schemas.microsoft.com/office/drawing/2010/main" w="9525">
                   <a:solidFill>
                     <a:srgbClr val="000000"/>
                   </a:solidFill>
@@ -12229,7 +12262,7 @@
             </a:ln>
             <a:extLst>
               <a:ext uri="{91240B29-F687-4f45-9708-019B960494DF}">
-                <a14:hiddenLine xmlns:a14="http://schemas.microsoft.com/office/drawing/2010/main" xmlns="" w="9525">
+                <a14:hiddenLine xmlns="" xmlns:a14="http://schemas.microsoft.com/office/drawing/2010/main" w="9525">
                   <a:solidFill>
                     <a:srgbClr val="000000"/>
                   </a:solidFill>
@@ -12291,7 +12324,7 @@
             </a:ln>
             <a:extLst>
               <a:ext uri="{91240B29-F687-4f45-9708-019B960494DF}">
-                <a14:hiddenLine xmlns:a14="http://schemas.microsoft.com/office/drawing/2010/main" xmlns="" w="9525">
+                <a14:hiddenLine xmlns="" xmlns:a14="http://schemas.microsoft.com/office/drawing/2010/main" w="9525">
                   <a:solidFill>
                     <a:srgbClr val="000000"/>
                   </a:solidFill>
@@ -12381,7 +12414,7 @@
             </a:ln>
             <a:extLst>
               <a:ext uri="{91240B29-F687-4f45-9708-019B960494DF}">
-                <a14:hiddenLine xmlns:a14="http://schemas.microsoft.com/office/drawing/2010/main" xmlns="" w="9525">
+                <a14:hiddenLine xmlns="" xmlns:a14="http://schemas.microsoft.com/office/drawing/2010/main" w="9525">
                   <a:solidFill>
                     <a:srgbClr val="000000"/>
                   </a:solidFill>
@@ -12471,7 +12504,7 @@
             </a:ln>
             <a:extLst>
               <a:ext uri="{91240B29-F687-4f45-9708-019B960494DF}">
-                <a14:hiddenLine xmlns:a14="http://schemas.microsoft.com/office/drawing/2010/main" xmlns="" w="9525">
+                <a14:hiddenLine xmlns="" xmlns:a14="http://schemas.microsoft.com/office/drawing/2010/main" w="9525">
                   <a:solidFill>
                     <a:srgbClr val="000000"/>
                   </a:solidFill>
@@ -12533,7 +12566,7 @@
             </a:ln>
             <a:extLst>
               <a:ext uri="{91240B29-F687-4f45-9708-019B960494DF}">
-                <a14:hiddenLine xmlns:a14="http://schemas.microsoft.com/office/drawing/2010/main" xmlns="" w="9525">
+                <a14:hiddenLine xmlns="" xmlns:a14="http://schemas.microsoft.com/office/drawing/2010/main" w="9525">
                   <a:solidFill>
                     <a:srgbClr val="000000"/>
                   </a:solidFill>
@@ -12623,7 +12656,7 @@
             </a:ln>
             <a:extLst>
               <a:ext uri="{91240B29-F687-4f45-9708-019B960494DF}">
-                <a14:hiddenLine xmlns:a14="http://schemas.microsoft.com/office/drawing/2010/main" xmlns="" w="9525">
+                <a14:hiddenLine xmlns="" xmlns:a14="http://schemas.microsoft.com/office/drawing/2010/main" w="9525">
                   <a:solidFill>
                     <a:srgbClr val="000000"/>
                   </a:solidFill>
@@ -12713,7 +12746,7 @@
             </a:ln>
             <a:extLst>
               <a:ext uri="{91240B29-F687-4f45-9708-019B960494DF}">
-                <a14:hiddenLine xmlns:a14="http://schemas.microsoft.com/office/drawing/2010/main" xmlns="" w="9525">
+                <a14:hiddenLine xmlns="" xmlns:a14="http://schemas.microsoft.com/office/drawing/2010/main" w="9525">
                   <a:solidFill>
                     <a:srgbClr val="000000"/>
                   </a:solidFill>
@@ -12769,7 +12802,7 @@
             </a:ln>
             <a:extLst>
               <a:ext uri="{91240B29-F687-4f45-9708-019B960494DF}">
-                <a14:hiddenLine xmlns:a14="http://schemas.microsoft.com/office/drawing/2010/main" xmlns="" w="9525">
+                <a14:hiddenLine xmlns="" xmlns:a14="http://schemas.microsoft.com/office/drawing/2010/main" w="9525">
                   <a:solidFill>
                     <a:srgbClr val="000000"/>
                   </a:solidFill>
@@ -12859,7 +12892,7 @@
             </a:ln>
             <a:extLst>
               <a:ext uri="{91240B29-F687-4f45-9708-019B960494DF}">
-                <a14:hiddenLine xmlns:a14="http://schemas.microsoft.com/office/drawing/2010/main" xmlns="" w="9525">
+                <a14:hiddenLine xmlns="" xmlns:a14="http://schemas.microsoft.com/office/drawing/2010/main" w="9525">
                   <a:solidFill>
                     <a:srgbClr val="000000"/>
                   </a:solidFill>
@@ -12915,7 +12948,7 @@
             </a:ln>
             <a:extLst>
               <a:ext uri="{91240B29-F687-4f45-9708-019B960494DF}">
-                <a14:hiddenLine xmlns:a14="http://schemas.microsoft.com/office/drawing/2010/main" xmlns="" w="9525">
+                <a14:hiddenLine xmlns="" xmlns:a14="http://schemas.microsoft.com/office/drawing/2010/main" w="9525">
                   <a:solidFill>
                     <a:srgbClr val="000000"/>
                   </a:solidFill>
@@ -13005,7 +13038,7 @@
             </a:ln>
             <a:extLst>
               <a:ext uri="{91240B29-F687-4f45-9708-019B960494DF}">
-                <a14:hiddenLine xmlns:a14="http://schemas.microsoft.com/office/drawing/2010/main" xmlns="" w="9525">
+                <a14:hiddenLine xmlns="" xmlns:a14="http://schemas.microsoft.com/office/drawing/2010/main" w="9525">
                   <a:solidFill>
                     <a:srgbClr val="000000"/>
                   </a:solidFill>
@@ -13073,7 +13106,7 @@
             </a:ln>
             <a:extLst>
               <a:ext uri="{91240B29-F687-4f45-9708-019B960494DF}">
-                <a14:hiddenLine xmlns:a14="http://schemas.microsoft.com/office/drawing/2010/main" xmlns="" w="9525">
+                <a14:hiddenLine xmlns="" xmlns:a14="http://schemas.microsoft.com/office/drawing/2010/main" w="9525">
                   <a:solidFill>
                     <a:srgbClr val="000000"/>
                   </a:solidFill>
@@ -13163,7 +13196,7 @@
             </a:ln>
             <a:extLst>
               <a:ext uri="{91240B29-F687-4f45-9708-019B960494DF}">
-                <a14:hiddenLine xmlns:a14="http://schemas.microsoft.com/office/drawing/2010/main" xmlns="" w="9525">
+                <a14:hiddenLine xmlns="" xmlns:a14="http://schemas.microsoft.com/office/drawing/2010/main" w="9525">
                   <a:solidFill>
                     <a:srgbClr val="000000"/>
                   </a:solidFill>
@@ -13231,7 +13264,7 @@
             </a:ln>
             <a:extLst>
               <a:ext uri="{91240B29-F687-4f45-9708-019B960494DF}">
-                <a14:hiddenLine xmlns:a14="http://schemas.microsoft.com/office/drawing/2010/main" xmlns="" w="9525">
+                <a14:hiddenLine xmlns="" xmlns:a14="http://schemas.microsoft.com/office/drawing/2010/main" w="9525">
                   <a:solidFill>
                     <a:srgbClr val="000000"/>
                   </a:solidFill>
@@ -13321,7 +13354,7 @@
             </a:ln>
             <a:extLst>
               <a:ext uri="{91240B29-F687-4f45-9708-019B960494DF}">
-                <a14:hiddenLine xmlns:a14="http://schemas.microsoft.com/office/drawing/2010/main" xmlns="" w="9525">
+                <a14:hiddenLine xmlns="" xmlns:a14="http://schemas.microsoft.com/office/drawing/2010/main" w="9525">
                   <a:solidFill>
                     <a:srgbClr val="000000"/>
                   </a:solidFill>
@@ -13355,7 +13388,7 @@
             </a:ln>
             <a:extLst>
               <a:ext uri="{91240B29-F687-4f45-9708-019B960494DF}">
-                <a14:hiddenLine xmlns:a14="http://schemas.microsoft.com/office/drawing/2010/main" xmlns="" w="9525">
+                <a14:hiddenLine xmlns="" xmlns:a14="http://schemas.microsoft.com/office/drawing/2010/main" w="9525">
                   <a:solidFill>
                     <a:srgbClr val="000000"/>
                   </a:solidFill>
@@ -13445,7 +13478,7 @@
             </a:ln>
             <a:extLst>
               <a:ext uri="{91240B29-F687-4f45-9708-019B960494DF}">
-                <a14:hiddenLine xmlns:a14="http://schemas.microsoft.com/office/drawing/2010/main" xmlns="" w="9525">
+                <a14:hiddenLine xmlns="" xmlns:a14="http://schemas.microsoft.com/office/drawing/2010/main" w="9525">
                   <a:solidFill>
                     <a:srgbClr val="000000"/>
                   </a:solidFill>
@@ -13507,7 +13540,7 @@
             </a:ln>
             <a:extLst>
               <a:ext uri="{91240B29-F687-4f45-9708-019B960494DF}">
-                <a14:hiddenLine xmlns:a14="http://schemas.microsoft.com/office/drawing/2010/main" xmlns="" w="9525">
+                <a14:hiddenLine xmlns="" xmlns:a14="http://schemas.microsoft.com/office/drawing/2010/main" w="9525">
                   <a:solidFill>
                     <a:srgbClr val="000000"/>
                   </a:solidFill>
@@ -13569,7 +13602,7 @@
             </a:ln>
             <a:extLst>
               <a:ext uri="{91240B29-F687-4f45-9708-019B960494DF}">
-                <a14:hiddenLine xmlns:a14="http://schemas.microsoft.com/office/drawing/2010/main" xmlns="" w="9525">
+                <a14:hiddenLine xmlns="" xmlns:a14="http://schemas.microsoft.com/office/drawing/2010/main" w="9525">
                   <a:solidFill>
                     <a:srgbClr val="000000"/>
                   </a:solidFill>
@@ -13659,7 +13692,7 @@
             </a:ln>
             <a:extLst>
               <a:ext uri="{91240B29-F687-4f45-9708-019B960494DF}">
-                <a14:hiddenLine xmlns:a14="http://schemas.microsoft.com/office/drawing/2010/main" xmlns="" w="9525">
+                <a14:hiddenLine xmlns="" xmlns:a14="http://schemas.microsoft.com/office/drawing/2010/main" w="9525">
                   <a:solidFill>
                     <a:srgbClr val="000000"/>
                   </a:solidFill>
@@ -13727,7 +13760,7 @@
             </a:ln>
             <a:extLst>
               <a:ext uri="{91240B29-F687-4f45-9708-019B960494DF}">
-                <a14:hiddenLine xmlns:a14="http://schemas.microsoft.com/office/drawing/2010/main" xmlns="" w="9525">
+                <a14:hiddenLine xmlns="" xmlns:a14="http://schemas.microsoft.com/office/drawing/2010/main" w="9525">
                   <a:solidFill>
                     <a:srgbClr val="000000"/>
                   </a:solidFill>
@@ -13789,7 +13822,7 @@
             </a:ln>
             <a:extLst>
               <a:ext uri="{91240B29-F687-4f45-9708-019B960494DF}">
-                <a14:hiddenLine xmlns:a14="http://schemas.microsoft.com/office/drawing/2010/main" xmlns="" w="9525">
+                <a14:hiddenLine xmlns="" xmlns:a14="http://schemas.microsoft.com/office/drawing/2010/main" w="9525">
                   <a:solidFill>
                     <a:srgbClr val="000000"/>
                   </a:solidFill>
@@ -13879,7 +13912,7 @@
             </a:ln>
             <a:extLst>
               <a:ext uri="{91240B29-F687-4f45-9708-019B960494DF}">
-                <a14:hiddenLine xmlns:a14="http://schemas.microsoft.com/office/drawing/2010/main" xmlns="" w="9525">
+                <a14:hiddenLine xmlns="" xmlns:a14="http://schemas.microsoft.com/office/drawing/2010/main" w="9525">
                   <a:solidFill>
                     <a:srgbClr val="000000"/>
                   </a:solidFill>
@@ -13941,7 +13974,7 @@
             </a:ln>
             <a:extLst>
               <a:ext uri="{91240B29-F687-4f45-9708-019B960494DF}">
-                <a14:hiddenLine xmlns:a14="http://schemas.microsoft.com/office/drawing/2010/main" xmlns="" w="9525">
+                <a14:hiddenLine xmlns="" xmlns:a14="http://schemas.microsoft.com/office/drawing/2010/main" w="9525">
                   <a:solidFill>
                     <a:srgbClr val="000000"/>
                   </a:solidFill>
@@ -14031,7 +14064,7 @@
             </a:ln>
             <a:extLst>
               <a:ext uri="{91240B29-F687-4f45-9708-019B960494DF}">
-                <a14:hiddenLine xmlns:a14="http://schemas.microsoft.com/office/drawing/2010/main" xmlns="" w="9525">
+                <a14:hiddenLine xmlns="" xmlns:a14="http://schemas.microsoft.com/office/drawing/2010/main" w="9525">
                   <a:solidFill>
                     <a:srgbClr val="000000"/>
                   </a:solidFill>
@@ -14093,7 +14126,7 @@
             </a:ln>
             <a:extLst>
               <a:ext uri="{91240B29-F687-4f45-9708-019B960494DF}">
-                <a14:hiddenLine xmlns:a14="http://schemas.microsoft.com/office/drawing/2010/main" xmlns="" w="9525">
+                <a14:hiddenLine xmlns="" xmlns:a14="http://schemas.microsoft.com/office/drawing/2010/main" w="9525">
                   <a:solidFill>
                     <a:srgbClr val="000000"/>
                   </a:solidFill>
@@ -14183,7 +14216,7 @@
             </a:ln>
             <a:extLst>
               <a:ext uri="{91240B29-F687-4f45-9708-019B960494DF}">
-                <a14:hiddenLine xmlns:a14="http://schemas.microsoft.com/office/drawing/2010/main" xmlns="" w="9525">
+                <a14:hiddenLine xmlns="" xmlns:a14="http://schemas.microsoft.com/office/drawing/2010/main" w="9525">
                   <a:solidFill>
                     <a:srgbClr val="000000"/>
                   </a:solidFill>
@@ -14217,7 +14250,7 @@
             </a:ln>
             <a:extLst>
               <a:ext uri="{91240B29-F687-4f45-9708-019B960494DF}">
-                <a14:hiddenLine xmlns:a14="http://schemas.microsoft.com/office/drawing/2010/main" xmlns="" w="9525">
+                <a14:hiddenLine xmlns="" xmlns:a14="http://schemas.microsoft.com/office/drawing/2010/main" w="9525">
                   <a:solidFill>
                     <a:srgbClr val="000000"/>
                   </a:solidFill>
@@ -14282,7 +14315,7 @@
             </a:ln>
             <a:extLst>
               <a:ext uri="{91240B29-F687-4f45-9708-019B960494DF}">
-                <a14:hiddenLine xmlns:a14="http://schemas.microsoft.com/office/drawing/2010/main" xmlns="" w="9525">
+                <a14:hiddenLine xmlns="" xmlns:a14="http://schemas.microsoft.com/office/drawing/2010/main" w="9525">
                   <a:solidFill>
                     <a:srgbClr val="000000"/>
                   </a:solidFill>
@@ -14372,7 +14405,7 @@
             </a:ln>
             <a:extLst>
               <a:ext uri="{91240B29-F687-4f45-9708-019B960494DF}">
-                <a14:hiddenLine xmlns:a14="http://schemas.microsoft.com/office/drawing/2010/main" xmlns="" w="9525">
+                <a14:hiddenLine xmlns="" xmlns:a14="http://schemas.microsoft.com/office/drawing/2010/main" w="9525">
                   <a:solidFill>
                     <a:srgbClr val="000000"/>
                   </a:solidFill>
@@ -14434,7 +14467,7 @@
             </a:ln>
             <a:extLst>
               <a:ext uri="{91240B29-F687-4f45-9708-019B960494DF}">
-                <a14:hiddenLine xmlns:a14="http://schemas.microsoft.com/office/drawing/2010/main" xmlns="" w="9525">
+                <a14:hiddenLine xmlns="" xmlns:a14="http://schemas.microsoft.com/office/drawing/2010/main" w="9525">
                   <a:solidFill>
                     <a:srgbClr val="000000"/>
                   </a:solidFill>
@@ -14524,7 +14557,7 @@
             </a:ln>
             <a:extLst>
               <a:ext uri="{91240B29-F687-4f45-9708-019B960494DF}">
-                <a14:hiddenLine xmlns:a14="http://schemas.microsoft.com/office/drawing/2010/main" xmlns="" w="9525">
+                <a14:hiddenLine xmlns="" xmlns:a14="http://schemas.microsoft.com/office/drawing/2010/main" w="9525">
                   <a:solidFill>
                     <a:srgbClr val="000000"/>
                   </a:solidFill>
@@ -14614,7 +14647,7 @@
             </a:ln>
             <a:extLst>
               <a:ext uri="{91240B29-F687-4f45-9708-019B960494DF}">
-                <a14:hiddenLine xmlns:a14="http://schemas.microsoft.com/office/drawing/2010/main" xmlns="" w="9525">
+                <a14:hiddenLine xmlns="" xmlns:a14="http://schemas.microsoft.com/office/drawing/2010/main" w="9525">
                   <a:solidFill>
                     <a:srgbClr val="000000"/>
                   </a:solidFill>
@@ -14679,7 +14712,7 @@
             </a:ln>
             <a:extLst>
               <a:ext uri="{91240B29-F687-4f45-9708-019B960494DF}">
-                <a14:hiddenLine xmlns:a14="http://schemas.microsoft.com/office/drawing/2010/main" xmlns="" w="9525">
+                <a14:hiddenLine xmlns="" xmlns:a14="http://schemas.microsoft.com/office/drawing/2010/main" w="9525">
                   <a:solidFill>
                     <a:srgbClr val="000000"/>
                   </a:solidFill>
@@ -14741,7 +14774,7 @@
             </a:ln>
             <a:extLst>
               <a:ext uri="{91240B29-F687-4f45-9708-019B960494DF}">
-                <a14:hiddenLine xmlns:a14="http://schemas.microsoft.com/office/drawing/2010/main" xmlns="" w="9525">
+                <a14:hiddenLine xmlns="" xmlns:a14="http://schemas.microsoft.com/office/drawing/2010/main" w="9525">
                   <a:solidFill>
                     <a:srgbClr val="000000"/>
                   </a:solidFill>
@@ -14831,7 +14864,7 @@
             </a:ln>
             <a:extLst>
               <a:ext uri="{91240B29-F687-4f45-9708-019B960494DF}">
-                <a14:hiddenLine xmlns:a14="http://schemas.microsoft.com/office/drawing/2010/main" xmlns="" w="9525">
+                <a14:hiddenLine xmlns="" xmlns:a14="http://schemas.microsoft.com/office/drawing/2010/main" w="9525">
                   <a:solidFill>
                     <a:srgbClr val="000000"/>
                   </a:solidFill>
@@ -14921,7 +14954,7 @@
             </a:ln>
             <a:extLst>
               <a:ext uri="{91240B29-F687-4f45-9708-019B960494DF}">
-                <a14:hiddenLine xmlns:a14="http://schemas.microsoft.com/office/drawing/2010/main" xmlns="" w="9525">
+                <a14:hiddenLine xmlns="" xmlns:a14="http://schemas.microsoft.com/office/drawing/2010/main" w="9525">
                   <a:solidFill>
                     <a:srgbClr val="000000"/>
                   </a:solidFill>
@@ -14983,7 +15016,7 @@
             </a:ln>
             <a:extLst>
               <a:ext uri="{91240B29-F687-4f45-9708-019B960494DF}">
-                <a14:hiddenLine xmlns:a14="http://schemas.microsoft.com/office/drawing/2010/main" xmlns="" w="9525">
+                <a14:hiddenLine xmlns="" xmlns:a14="http://schemas.microsoft.com/office/drawing/2010/main" w="9525">
                   <a:solidFill>
                     <a:srgbClr val="000000"/>
                   </a:solidFill>
@@ -15103,7 +15136,7 @@
             </a:ln>
             <a:extLst>
               <a:ext uri="{91240B29-F687-4f45-9708-019B960494DF}">
-                <a14:hiddenLine xmlns:a14="http://schemas.microsoft.com/office/drawing/2010/main" xmlns="" w="9525">
+                <a14:hiddenLine xmlns="" xmlns:a14="http://schemas.microsoft.com/office/drawing/2010/main" w="9525">
                   <a:solidFill>
                     <a:srgbClr val="000000"/>
                   </a:solidFill>
@@ -15171,7 +15204,7 @@
             </a:ln>
             <a:extLst>
               <a:ext uri="{91240B29-F687-4f45-9708-019B960494DF}">
-                <a14:hiddenLine xmlns:a14="http://schemas.microsoft.com/office/drawing/2010/main" xmlns="" w="9525">
+                <a14:hiddenLine xmlns="" xmlns:a14="http://schemas.microsoft.com/office/drawing/2010/main" w="9525">
                   <a:solidFill>
                     <a:srgbClr val="000000"/>
                   </a:solidFill>
@@ -15261,7 +15294,7 @@
             </a:ln>
             <a:extLst>
               <a:ext uri="{91240B29-F687-4f45-9708-019B960494DF}">
-                <a14:hiddenLine xmlns:a14="http://schemas.microsoft.com/office/drawing/2010/main" xmlns="" w="9525">
+                <a14:hiddenLine xmlns="" xmlns:a14="http://schemas.microsoft.com/office/drawing/2010/main" w="9525">
                   <a:solidFill>
                     <a:srgbClr val="000000"/>
                   </a:solidFill>
@@ -20076,7 +20109,7 @@
           <a:noFill/>
           <a:extLst>
             <a:ext uri="{909E8E84-426E-40dd-AFC4-6F175D3DCCD1}">
-              <a14:hiddenFill xmlns:a14="http://schemas.microsoft.com/office/drawing/2010/main" xmlns="">
+              <a14:hiddenFill xmlns="" xmlns:a14="http://schemas.microsoft.com/office/drawing/2010/main">
                 <a:solidFill>
                   <a:srgbClr val="FFFFFF"/>
                 </a:solidFill>
@@ -20150,7 +20183,7 @@
               </a:ln>
               <a:extLst>
                 <a:ext uri="{91240B29-F687-4f45-9708-019B960494DF}">
-                  <a14:hiddenLine xmlns:a14="http://schemas.microsoft.com/office/drawing/2010/main" xmlns="" w="9525">
+                  <a14:hiddenLine xmlns="" xmlns:a14="http://schemas.microsoft.com/office/drawing/2010/main" w="9525">
                     <a:solidFill>
                       <a:srgbClr val="000000"/>
                     </a:solidFill>
@@ -20240,7 +20273,7 @@
               </a:ln>
               <a:extLst>
                 <a:ext uri="{91240B29-F687-4f45-9708-019B960494DF}">
-                  <a14:hiddenLine xmlns:a14="http://schemas.microsoft.com/office/drawing/2010/main" xmlns="" w="9525">
+                  <a14:hiddenLine xmlns="" xmlns:a14="http://schemas.microsoft.com/office/drawing/2010/main" w="9525">
                     <a:solidFill>
                       <a:srgbClr val="000000"/>
                     </a:solidFill>
@@ -20330,7 +20363,7 @@
               </a:ln>
               <a:extLst>
                 <a:ext uri="{91240B29-F687-4f45-9708-019B960494DF}">
-                  <a14:hiddenLine xmlns:a14="http://schemas.microsoft.com/office/drawing/2010/main" xmlns="" w="9525">
+                  <a14:hiddenLine xmlns="" xmlns:a14="http://schemas.microsoft.com/office/drawing/2010/main" w="9525">
                     <a:solidFill>
                       <a:srgbClr val="000000"/>
                     </a:solidFill>
@@ -20392,7 +20425,7 @@
               </a:ln>
               <a:extLst>
                 <a:ext uri="{91240B29-F687-4f45-9708-019B960494DF}">
-                  <a14:hiddenLine xmlns:a14="http://schemas.microsoft.com/office/drawing/2010/main" xmlns="" w="9525">
+                  <a14:hiddenLine xmlns="" xmlns:a14="http://schemas.microsoft.com/office/drawing/2010/main" w="9525">
                     <a:solidFill>
                       <a:srgbClr val="000000"/>
                     </a:solidFill>
@@ -20482,7 +20515,7 @@
               </a:ln>
               <a:extLst>
                 <a:ext uri="{91240B29-F687-4f45-9708-019B960494DF}">
-                  <a14:hiddenLine xmlns:a14="http://schemas.microsoft.com/office/drawing/2010/main" xmlns="" w="9525">
+                  <a14:hiddenLine xmlns="" xmlns:a14="http://schemas.microsoft.com/office/drawing/2010/main" w="9525">
                     <a:solidFill>
                       <a:srgbClr val="000000"/>
                     </a:solidFill>
@@ -20544,7 +20577,7 @@
               </a:ln>
               <a:extLst>
                 <a:ext uri="{91240B29-F687-4f45-9708-019B960494DF}">
-                  <a14:hiddenLine xmlns:a14="http://schemas.microsoft.com/office/drawing/2010/main" xmlns="" w="9525">
+                  <a14:hiddenLine xmlns="" xmlns:a14="http://schemas.microsoft.com/office/drawing/2010/main" w="9525">
                     <a:solidFill>
                       <a:srgbClr val="000000"/>
                     </a:solidFill>
@@ -20606,7 +20639,7 @@
               </a:ln>
               <a:extLst>
                 <a:ext uri="{91240B29-F687-4f45-9708-019B960494DF}">
-                  <a14:hiddenLine xmlns:a14="http://schemas.microsoft.com/office/drawing/2010/main" xmlns="" w="9525">
+                  <a14:hiddenLine xmlns="" xmlns:a14="http://schemas.microsoft.com/office/drawing/2010/main" w="9525">
                     <a:solidFill>
                       <a:srgbClr val="000000"/>
                     </a:solidFill>
@@ -20696,7 +20729,7 @@
               </a:ln>
               <a:extLst>
                 <a:ext uri="{91240B29-F687-4f45-9708-019B960494DF}">
-                  <a14:hiddenLine xmlns:a14="http://schemas.microsoft.com/office/drawing/2010/main" xmlns="" w="9525">
+                  <a14:hiddenLine xmlns="" xmlns:a14="http://schemas.microsoft.com/office/drawing/2010/main" w="9525">
                     <a:solidFill>
                       <a:srgbClr val="000000"/>
                     </a:solidFill>
@@ -20786,7 +20819,7 @@
               </a:ln>
               <a:extLst>
                 <a:ext uri="{91240B29-F687-4f45-9708-019B960494DF}">
-                  <a14:hiddenLine xmlns:a14="http://schemas.microsoft.com/office/drawing/2010/main" xmlns="" w="9525">
+                  <a14:hiddenLine xmlns="" xmlns:a14="http://schemas.microsoft.com/office/drawing/2010/main" w="9525">
                     <a:solidFill>
                       <a:srgbClr val="000000"/>
                     </a:solidFill>
@@ -20848,7 +20881,7 @@
               </a:ln>
               <a:extLst>
                 <a:ext uri="{91240B29-F687-4f45-9708-019B960494DF}">
-                  <a14:hiddenLine xmlns:a14="http://schemas.microsoft.com/office/drawing/2010/main" xmlns="" w="9525">
+                  <a14:hiddenLine xmlns="" xmlns:a14="http://schemas.microsoft.com/office/drawing/2010/main" w="9525">
                     <a:solidFill>
                       <a:srgbClr val="000000"/>
                     </a:solidFill>
@@ -20958,7 +20991,7 @@
               </a:ln>
               <a:extLst>
                 <a:ext uri="{91240B29-F687-4f45-9708-019B960494DF}">
-                  <a14:hiddenLine xmlns:a14="http://schemas.microsoft.com/office/drawing/2010/main" xmlns="" w="9525">
+                  <a14:hiddenLine xmlns="" xmlns:a14="http://schemas.microsoft.com/office/drawing/2010/main" w="9525">
                     <a:solidFill>
                       <a:srgbClr val="000000"/>
                     </a:solidFill>
@@ -21042,7 +21075,7 @@
               </a:ln>
               <a:extLst>
                 <a:ext uri="{91240B29-F687-4f45-9708-019B960494DF}">
-                  <a14:hiddenLine xmlns:a14="http://schemas.microsoft.com/office/drawing/2010/main" xmlns="" w="9525">
+                  <a14:hiddenLine xmlns="" xmlns:a14="http://schemas.microsoft.com/office/drawing/2010/main" w="9525">
                     <a:solidFill>
                       <a:srgbClr val="000000"/>
                     </a:solidFill>
@@ -21104,7 +21137,7 @@
               </a:ln>
               <a:extLst>
                 <a:ext uri="{91240B29-F687-4f45-9708-019B960494DF}">
-                  <a14:hiddenLine xmlns:a14="http://schemas.microsoft.com/office/drawing/2010/main" xmlns="" w="9525">
+                  <a14:hiddenLine xmlns="" xmlns:a14="http://schemas.microsoft.com/office/drawing/2010/main" w="9525">
                     <a:solidFill>
                       <a:srgbClr val="000000"/>
                     </a:solidFill>
@@ -21166,7 +21199,7 @@
               </a:ln>
               <a:extLst>
                 <a:ext uri="{91240B29-F687-4f45-9708-019B960494DF}">
-                  <a14:hiddenLine xmlns:a14="http://schemas.microsoft.com/office/drawing/2010/main" xmlns="" w="9525">
+                  <a14:hiddenLine xmlns="" xmlns:a14="http://schemas.microsoft.com/office/drawing/2010/main" w="9525">
                     <a:solidFill>
                       <a:srgbClr val="000000"/>
                     </a:solidFill>
@@ -21256,7 +21289,7 @@
               </a:ln>
               <a:extLst>
                 <a:ext uri="{91240B29-F687-4f45-9708-019B960494DF}">
-                  <a14:hiddenLine xmlns:a14="http://schemas.microsoft.com/office/drawing/2010/main" xmlns="" w="9525">
+                  <a14:hiddenLine xmlns="" xmlns:a14="http://schemas.microsoft.com/office/drawing/2010/main" w="9525">
                     <a:solidFill>
                       <a:srgbClr val="000000"/>
                     </a:solidFill>
@@ -21290,7 +21323,7 @@
               </a:ln>
               <a:extLst>
                 <a:ext uri="{91240B29-F687-4f45-9708-019B960494DF}">
-                  <a14:hiddenLine xmlns:a14="http://schemas.microsoft.com/office/drawing/2010/main" xmlns="" w="9525">
+                  <a14:hiddenLine xmlns="" xmlns:a14="http://schemas.microsoft.com/office/drawing/2010/main" w="9525">
                     <a:solidFill>
                       <a:srgbClr val="000000"/>
                     </a:solidFill>
@@ -21355,7 +21388,7 @@
               </a:ln>
               <a:extLst>
                 <a:ext uri="{91240B29-F687-4f45-9708-019B960494DF}">
-                  <a14:hiddenLine xmlns:a14="http://schemas.microsoft.com/office/drawing/2010/main" xmlns="" w="9525">
+                  <a14:hiddenLine xmlns="" xmlns:a14="http://schemas.microsoft.com/office/drawing/2010/main" w="9525">
                     <a:solidFill>
                       <a:srgbClr val="000000"/>
                     </a:solidFill>
@@ -21445,7 +21478,7 @@
               </a:ln>
               <a:extLst>
                 <a:ext uri="{91240B29-F687-4f45-9708-019B960494DF}">
-                  <a14:hiddenLine xmlns:a14="http://schemas.microsoft.com/office/drawing/2010/main" xmlns="" w="9525">
+                  <a14:hiddenLine xmlns="" xmlns:a14="http://schemas.microsoft.com/office/drawing/2010/main" w="9525">
                     <a:solidFill>
                       <a:srgbClr val="000000"/>
                     </a:solidFill>
@@ -21507,7 +21540,7 @@
               </a:ln>
               <a:extLst>
                 <a:ext uri="{91240B29-F687-4f45-9708-019B960494DF}">
-                  <a14:hiddenLine xmlns:a14="http://schemas.microsoft.com/office/drawing/2010/main" xmlns="" w="9525">
+                  <a14:hiddenLine xmlns="" xmlns:a14="http://schemas.microsoft.com/office/drawing/2010/main" w="9525">
                     <a:solidFill>
                       <a:srgbClr val="000000"/>
                     </a:solidFill>
@@ -21597,7 +21630,7 @@
               </a:ln>
               <a:extLst>
                 <a:ext uri="{91240B29-F687-4f45-9708-019B960494DF}">
-                  <a14:hiddenLine xmlns:a14="http://schemas.microsoft.com/office/drawing/2010/main" xmlns="" w="9525">
+                  <a14:hiddenLine xmlns="" xmlns:a14="http://schemas.microsoft.com/office/drawing/2010/main" w="9525">
                     <a:solidFill>
                       <a:srgbClr val="000000"/>
                     </a:solidFill>
@@ -21662,7 +21695,7 @@
               </a:ln>
               <a:extLst>
                 <a:ext uri="{91240B29-F687-4f45-9708-019B960494DF}">
-                  <a14:hiddenLine xmlns:a14="http://schemas.microsoft.com/office/drawing/2010/main" xmlns="" w="9525">
+                  <a14:hiddenLine xmlns="" xmlns:a14="http://schemas.microsoft.com/office/drawing/2010/main" w="9525">
                     <a:solidFill>
                       <a:srgbClr val="000000"/>
                     </a:solidFill>
@@ -21724,7 +21757,7 @@
               </a:ln>
               <a:extLst>
                 <a:ext uri="{91240B29-F687-4f45-9708-019B960494DF}">
-                  <a14:hiddenLine xmlns:a14="http://schemas.microsoft.com/office/drawing/2010/main" xmlns="" w="9525">
+                  <a14:hiddenLine xmlns="" xmlns:a14="http://schemas.microsoft.com/office/drawing/2010/main" w="9525">
                     <a:solidFill>
                       <a:srgbClr val="000000"/>
                     </a:solidFill>
@@ -21814,7 +21847,7 @@
               </a:ln>
               <a:extLst>
                 <a:ext uri="{91240B29-F687-4f45-9708-019B960494DF}">
-                  <a14:hiddenLine xmlns:a14="http://schemas.microsoft.com/office/drawing/2010/main" xmlns="" w="9525">
+                  <a14:hiddenLine xmlns="" xmlns:a14="http://schemas.microsoft.com/office/drawing/2010/main" w="9525">
                     <a:solidFill>
                       <a:srgbClr val="000000"/>
                     </a:solidFill>
@@ -21904,7 +21937,7 @@
               </a:ln>
               <a:extLst>
                 <a:ext uri="{91240B29-F687-4f45-9708-019B960494DF}">
-                  <a14:hiddenLine xmlns:a14="http://schemas.microsoft.com/office/drawing/2010/main" xmlns="" w="9525">
+                  <a14:hiddenLine xmlns="" xmlns:a14="http://schemas.microsoft.com/office/drawing/2010/main" w="9525">
                     <a:solidFill>
                       <a:srgbClr val="000000"/>
                     </a:solidFill>
@@ -21969,7 +22002,7 @@
               </a:ln>
               <a:extLst>
                 <a:ext uri="{91240B29-F687-4f45-9708-019B960494DF}">
-                  <a14:hiddenLine xmlns:a14="http://schemas.microsoft.com/office/drawing/2010/main" xmlns="" w="9525">
+                  <a14:hiddenLine xmlns="" xmlns:a14="http://schemas.microsoft.com/office/drawing/2010/main" w="9525">
                     <a:solidFill>
                       <a:srgbClr val="000000"/>
                     </a:solidFill>
@@ -22089,7 +22122,7 @@
               </a:ln>
               <a:extLst>
                 <a:ext uri="{91240B29-F687-4f45-9708-019B960494DF}">
-                  <a14:hiddenLine xmlns:a14="http://schemas.microsoft.com/office/drawing/2010/main" xmlns="" w="9525">
+                  <a14:hiddenLine xmlns="" xmlns:a14="http://schemas.microsoft.com/office/drawing/2010/main" w="9525">
                     <a:solidFill>
                       <a:srgbClr val="000000"/>
                     </a:solidFill>
@@ -22187,7 +22220,7 @@
               </a:ln>
               <a:extLst>
                 <a:ext uri="{91240B29-F687-4f45-9708-019B960494DF}">
-                  <a14:hiddenLine xmlns:a14="http://schemas.microsoft.com/office/drawing/2010/main" xmlns="" w="9525">
+                  <a14:hiddenLine xmlns="" xmlns:a14="http://schemas.microsoft.com/office/drawing/2010/main" w="9525">
                     <a:solidFill>
                       <a:srgbClr val="000000"/>
                     </a:solidFill>
@@ -22302,7 +22335,7 @@
               </a:ln>
               <a:extLst>
                 <a:ext uri="{91240B29-F687-4f45-9708-019B960494DF}">
-                  <a14:hiddenLine xmlns:a14="http://schemas.microsoft.com/office/drawing/2010/main" xmlns="" w="9525">
+                  <a14:hiddenLine xmlns="" xmlns:a14="http://schemas.microsoft.com/office/drawing/2010/main" w="9525">
                     <a:solidFill>
                       <a:srgbClr val="000000"/>
                     </a:solidFill>
@@ -22392,7 +22425,7 @@
               </a:ln>
               <a:extLst>
                 <a:ext uri="{91240B29-F687-4f45-9708-019B960494DF}">
-                  <a14:hiddenLine xmlns:a14="http://schemas.microsoft.com/office/drawing/2010/main" xmlns="" w="9525">
+                  <a14:hiddenLine xmlns="" xmlns:a14="http://schemas.microsoft.com/office/drawing/2010/main" w="9525">
                     <a:solidFill>
                       <a:srgbClr val="000000"/>
                     </a:solidFill>
@@ -22457,7 +22490,7 @@
               </a:ln>
               <a:extLst>
                 <a:ext uri="{91240B29-F687-4f45-9708-019B960494DF}">
-                  <a14:hiddenLine xmlns:a14="http://schemas.microsoft.com/office/drawing/2010/main" xmlns="" w="9525">
+                  <a14:hiddenLine xmlns="" xmlns:a14="http://schemas.microsoft.com/office/drawing/2010/main" w="9525">
                     <a:solidFill>
                       <a:srgbClr val="000000"/>
                     </a:solidFill>
@@ -22547,7 +22580,7 @@
               </a:ln>
               <a:extLst>
                 <a:ext uri="{91240B29-F687-4f45-9708-019B960494DF}">
-                  <a14:hiddenLine xmlns:a14="http://schemas.microsoft.com/office/drawing/2010/main" xmlns="" w="9525">
+                  <a14:hiddenLine xmlns="" xmlns:a14="http://schemas.microsoft.com/office/drawing/2010/main" w="9525">
                     <a:solidFill>
                       <a:srgbClr val="000000"/>
                     </a:solidFill>
@@ -22615,7 +22648,7 @@
               </a:ln>
               <a:extLst>
                 <a:ext uri="{91240B29-F687-4f45-9708-019B960494DF}">
-                  <a14:hiddenLine xmlns:a14="http://schemas.microsoft.com/office/drawing/2010/main" xmlns="" w="9525">
+                  <a14:hiddenLine xmlns="" xmlns:a14="http://schemas.microsoft.com/office/drawing/2010/main" w="9525">
                     <a:solidFill>
                       <a:srgbClr val="000000"/>
                     </a:solidFill>
@@ -22705,7 +22738,7 @@
               </a:ln>
               <a:extLst>
                 <a:ext uri="{91240B29-F687-4f45-9708-019B960494DF}">
-                  <a14:hiddenLine xmlns:a14="http://schemas.microsoft.com/office/drawing/2010/main" xmlns="" w="9525">
+                  <a14:hiddenLine xmlns="" xmlns:a14="http://schemas.microsoft.com/office/drawing/2010/main" w="9525">
                     <a:solidFill>
                       <a:srgbClr val="000000"/>
                     </a:solidFill>
@@ -22773,7 +22806,7 @@
               </a:ln>
               <a:extLst>
                 <a:ext uri="{91240B29-F687-4f45-9708-019B960494DF}">
-                  <a14:hiddenLine xmlns:a14="http://schemas.microsoft.com/office/drawing/2010/main" xmlns="" w="9525">
+                  <a14:hiddenLine xmlns="" xmlns:a14="http://schemas.microsoft.com/office/drawing/2010/main" w="9525">
                     <a:solidFill>
                       <a:srgbClr val="000000"/>
                     </a:solidFill>
@@ -22863,7 +22896,7 @@
               </a:ln>
               <a:extLst>
                 <a:ext uri="{91240B29-F687-4f45-9708-019B960494DF}">
-                  <a14:hiddenLine xmlns:a14="http://schemas.microsoft.com/office/drawing/2010/main" xmlns="" w="9525">
+                  <a14:hiddenLine xmlns="" xmlns:a14="http://schemas.microsoft.com/office/drawing/2010/main" w="9525">
                     <a:solidFill>
                       <a:srgbClr val="000000"/>
                     </a:solidFill>
@@ -22897,7 +22930,7 @@
               </a:ln>
               <a:extLst>
                 <a:ext uri="{91240B29-F687-4f45-9708-019B960494DF}">
-                  <a14:hiddenLine xmlns:a14="http://schemas.microsoft.com/office/drawing/2010/main" xmlns="" w="9525">
+                  <a14:hiddenLine xmlns="" xmlns:a14="http://schemas.microsoft.com/office/drawing/2010/main" w="9525">
                     <a:solidFill>
                       <a:srgbClr val="000000"/>
                     </a:solidFill>
@@ -23827,7 +23860,7 @@
             <a:noFill/>
             <a:extLst>
               <a:ext uri="{909E8E84-426E-40dd-AFC4-6F175D3DCCD1}">
-                <a14:hiddenFill xmlns="" xmlns:a16="http://schemas.microsoft.com/office/drawing/2014/main" xmlns:a14="http://schemas.microsoft.com/office/drawing/2010/main" xmlns:p14="http://schemas.microsoft.com/office/powerpoint/2010/main">
+                <a14:hiddenFill xmlns:p14="http://schemas.microsoft.com/office/powerpoint/2010/main" xmlns:a14="http://schemas.microsoft.com/office/drawing/2010/main" xmlns:a16="http://schemas.microsoft.com/office/drawing/2014/main" xmlns="">
                   <a:solidFill>
                     <a:srgbClr val="FFFFFF"/>
                   </a:solidFill>
@@ -23971,7 +24004,7 @@
             </a:ln>
             <a:extLst>
               <a:ext uri="{91240B29-F687-4f45-9708-019B960494DF}">
-                <a14:hiddenLine xmlns="" xmlns:a16="http://schemas.microsoft.com/office/drawing/2014/main" xmlns:a14="http://schemas.microsoft.com/office/drawing/2010/main" xmlns:p14="http://schemas.microsoft.com/office/powerpoint/2010/main" w="9525">
+                <a14:hiddenLine xmlns:p14="http://schemas.microsoft.com/office/powerpoint/2010/main" xmlns:a14="http://schemas.microsoft.com/office/drawing/2010/main" xmlns:a16="http://schemas.microsoft.com/office/drawing/2014/main" xmlns="" w="9525">
                   <a:solidFill>
                     <a:srgbClr val="000000"/>
                   </a:solidFill>
@@ -24083,7 +24116,7 @@
             </a:ln>
             <a:extLst>
               <a:ext uri="{91240B29-F687-4f45-9708-019B960494DF}">
-                <a14:hiddenLine xmlns="" xmlns:a16="http://schemas.microsoft.com/office/drawing/2014/main" xmlns:a14="http://schemas.microsoft.com/office/drawing/2010/main" xmlns:p14="http://schemas.microsoft.com/office/powerpoint/2010/main" w="9525">
+                <a14:hiddenLine xmlns:p14="http://schemas.microsoft.com/office/powerpoint/2010/main" xmlns:a14="http://schemas.microsoft.com/office/drawing/2010/main" xmlns:a16="http://schemas.microsoft.com/office/drawing/2014/main" xmlns="" w="9525">
                   <a:solidFill>
                     <a:srgbClr val="000000"/>
                   </a:solidFill>
@@ -24195,7 +24228,7 @@
             </a:ln>
             <a:extLst>
               <a:ext uri="{91240B29-F687-4f45-9708-019B960494DF}">
-                <a14:hiddenLine xmlns="" xmlns:a16="http://schemas.microsoft.com/office/drawing/2014/main" xmlns:a14="http://schemas.microsoft.com/office/drawing/2010/main" xmlns:p14="http://schemas.microsoft.com/office/powerpoint/2010/main" w="9525">
+                <a14:hiddenLine xmlns:p14="http://schemas.microsoft.com/office/powerpoint/2010/main" xmlns:a14="http://schemas.microsoft.com/office/drawing/2010/main" xmlns:a16="http://schemas.microsoft.com/office/drawing/2014/main" xmlns="" w="9525">
                   <a:solidFill>
                     <a:srgbClr val="000000"/>
                   </a:solidFill>
@@ -24251,7 +24284,7 @@
             </a:ln>
             <a:extLst>
               <a:ext uri="{91240B29-F687-4f45-9708-019B960494DF}">
-                <a14:hiddenLine xmlns="" xmlns:a16="http://schemas.microsoft.com/office/drawing/2014/main" xmlns:a14="http://schemas.microsoft.com/office/drawing/2010/main" xmlns:p14="http://schemas.microsoft.com/office/powerpoint/2010/main" w="9525">
+                <a14:hiddenLine xmlns:p14="http://schemas.microsoft.com/office/powerpoint/2010/main" xmlns:a14="http://schemas.microsoft.com/office/drawing/2010/main" xmlns:a16="http://schemas.microsoft.com/office/drawing/2014/main" xmlns="" w="9525">
                   <a:solidFill>
                     <a:srgbClr val="000000"/>
                   </a:solidFill>
@@ -24363,7 +24396,7 @@
             </a:ln>
             <a:extLst>
               <a:ext uri="{91240B29-F687-4f45-9708-019B960494DF}">
-                <a14:hiddenLine xmlns="" xmlns:a16="http://schemas.microsoft.com/office/drawing/2014/main" xmlns:a14="http://schemas.microsoft.com/office/drawing/2010/main" xmlns:p14="http://schemas.microsoft.com/office/powerpoint/2010/main" w="9525">
+                <a14:hiddenLine xmlns:p14="http://schemas.microsoft.com/office/powerpoint/2010/main" xmlns:a14="http://schemas.microsoft.com/office/drawing/2010/main" xmlns:a16="http://schemas.microsoft.com/office/drawing/2014/main" xmlns="" w="9525">
                   <a:solidFill>
                     <a:srgbClr val="000000"/>
                   </a:solidFill>
@@ -24447,7 +24480,7 @@
             </a:ln>
             <a:extLst>
               <a:ext uri="{91240B29-F687-4f45-9708-019B960494DF}">
-                <a14:hiddenLine xmlns="" xmlns:a16="http://schemas.microsoft.com/office/drawing/2014/main" xmlns:a14="http://schemas.microsoft.com/office/drawing/2010/main" xmlns:p14="http://schemas.microsoft.com/office/powerpoint/2010/main" w="9525">
+                <a14:hiddenLine xmlns:p14="http://schemas.microsoft.com/office/powerpoint/2010/main" xmlns:a14="http://schemas.microsoft.com/office/drawing/2010/main" xmlns:a16="http://schemas.microsoft.com/office/drawing/2014/main" xmlns="" w="9525">
                   <a:solidFill>
                     <a:srgbClr val="000000"/>
                   </a:solidFill>
@@ -24531,7 +24564,7 @@
             </a:ln>
             <a:extLst>
               <a:ext uri="{91240B29-F687-4f45-9708-019B960494DF}">
-                <a14:hiddenLine xmlns="" xmlns:a16="http://schemas.microsoft.com/office/drawing/2014/main" xmlns:a14="http://schemas.microsoft.com/office/drawing/2010/main" xmlns:p14="http://schemas.microsoft.com/office/powerpoint/2010/main" w="9525">
+                <a14:hiddenLine xmlns:p14="http://schemas.microsoft.com/office/powerpoint/2010/main" xmlns:a14="http://schemas.microsoft.com/office/drawing/2010/main" xmlns:a16="http://schemas.microsoft.com/office/drawing/2014/main" xmlns="" w="9525">
                   <a:solidFill>
                     <a:srgbClr val="000000"/>
                   </a:solidFill>
@@ -24643,7 +24676,7 @@
             </a:ln>
             <a:extLst>
               <a:ext uri="{91240B29-F687-4f45-9708-019B960494DF}">
-                <a14:hiddenLine xmlns="" xmlns:a16="http://schemas.microsoft.com/office/drawing/2014/main" xmlns:a14="http://schemas.microsoft.com/office/drawing/2010/main" xmlns:p14="http://schemas.microsoft.com/office/powerpoint/2010/main" w="9525">
+                <a14:hiddenLine xmlns:p14="http://schemas.microsoft.com/office/powerpoint/2010/main" xmlns:a14="http://schemas.microsoft.com/office/drawing/2010/main" xmlns:a16="http://schemas.microsoft.com/office/drawing/2014/main" xmlns="" w="9525">
                   <a:solidFill>
                     <a:srgbClr val="000000"/>
                   </a:solidFill>
@@ -24727,7 +24760,7 @@
             </a:ln>
             <a:extLst>
               <a:ext uri="{91240B29-F687-4f45-9708-019B960494DF}">
-                <a14:hiddenLine xmlns="" xmlns:a16="http://schemas.microsoft.com/office/drawing/2014/main" xmlns:a14="http://schemas.microsoft.com/office/drawing/2010/main" xmlns:p14="http://schemas.microsoft.com/office/powerpoint/2010/main" w="9525">
+                <a14:hiddenLine xmlns:p14="http://schemas.microsoft.com/office/powerpoint/2010/main" xmlns:a14="http://schemas.microsoft.com/office/drawing/2010/main" xmlns:a16="http://schemas.microsoft.com/office/drawing/2014/main" xmlns="" w="9525">
                   <a:solidFill>
                     <a:srgbClr val="000000"/>
                   </a:solidFill>
@@ -24811,7 +24844,7 @@
             </a:ln>
             <a:extLst>
               <a:ext uri="{91240B29-F687-4f45-9708-019B960494DF}">
-                <a14:hiddenLine xmlns="" xmlns:a16="http://schemas.microsoft.com/office/drawing/2014/main" xmlns:a14="http://schemas.microsoft.com/office/drawing/2010/main" xmlns:p14="http://schemas.microsoft.com/office/powerpoint/2010/main" w="9525">
+                <a14:hiddenLine xmlns:p14="http://schemas.microsoft.com/office/powerpoint/2010/main" xmlns:a14="http://schemas.microsoft.com/office/drawing/2010/main" xmlns:a16="http://schemas.microsoft.com/office/drawing/2014/main" xmlns="" w="9525">
                   <a:solidFill>
                     <a:srgbClr val="000000"/>
                   </a:solidFill>
@@ -24923,7 +24956,7 @@
             </a:ln>
             <a:extLst>
               <a:ext uri="{91240B29-F687-4f45-9708-019B960494DF}">
-                <a14:hiddenLine xmlns="" xmlns:a16="http://schemas.microsoft.com/office/drawing/2014/main" xmlns:a14="http://schemas.microsoft.com/office/drawing/2010/main" xmlns:p14="http://schemas.microsoft.com/office/powerpoint/2010/main" w="9525">
+                <a14:hiddenLine xmlns:p14="http://schemas.microsoft.com/office/powerpoint/2010/main" xmlns:a14="http://schemas.microsoft.com/office/drawing/2010/main" xmlns:a16="http://schemas.microsoft.com/office/drawing/2014/main" xmlns="" w="9525">
                   <a:solidFill>
                     <a:srgbClr val="000000"/>
                   </a:solidFill>
@@ -25035,7 +25068,7 @@
             </a:ln>
             <a:extLst>
               <a:ext uri="{91240B29-F687-4f45-9708-019B960494DF}">
-                <a14:hiddenLine xmlns="" xmlns:a16="http://schemas.microsoft.com/office/drawing/2014/main" xmlns:a14="http://schemas.microsoft.com/office/drawing/2010/main" xmlns:p14="http://schemas.microsoft.com/office/powerpoint/2010/main" w="9525">
+                <a14:hiddenLine xmlns:p14="http://schemas.microsoft.com/office/powerpoint/2010/main" xmlns:a14="http://schemas.microsoft.com/office/drawing/2010/main" xmlns:a16="http://schemas.microsoft.com/office/drawing/2014/main" xmlns="" w="9525">
                   <a:solidFill>
                     <a:srgbClr val="000000"/>
                   </a:solidFill>
@@ -25119,7 +25152,7 @@
             </a:ln>
             <a:extLst>
               <a:ext uri="{91240B29-F687-4f45-9708-019B960494DF}">
-                <a14:hiddenLine xmlns="" xmlns:a16="http://schemas.microsoft.com/office/drawing/2014/main" xmlns:a14="http://schemas.microsoft.com/office/drawing/2010/main" xmlns:p14="http://schemas.microsoft.com/office/powerpoint/2010/main" w="9525">
+                <a14:hiddenLine xmlns:p14="http://schemas.microsoft.com/office/powerpoint/2010/main" xmlns:a14="http://schemas.microsoft.com/office/drawing/2010/main" xmlns:a16="http://schemas.microsoft.com/office/drawing/2014/main" xmlns="" w="9525">
                   <a:solidFill>
                     <a:srgbClr val="000000"/>
                   </a:solidFill>
@@ -25251,7 +25284,7 @@
             </a:ln>
             <a:extLst>
               <a:ext uri="{91240B29-F687-4f45-9708-019B960494DF}">
-                <a14:hiddenLine xmlns="" xmlns:a16="http://schemas.microsoft.com/office/drawing/2014/main" xmlns:a14="http://schemas.microsoft.com/office/drawing/2010/main" xmlns:p14="http://schemas.microsoft.com/office/powerpoint/2010/main" w="9525">
+                <a14:hiddenLine xmlns:p14="http://schemas.microsoft.com/office/powerpoint/2010/main" xmlns:a14="http://schemas.microsoft.com/office/drawing/2010/main" xmlns:a16="http://schemas.microsoft.com/office/drawing/2014/main" xmlns="" w="9525">
                   <a:solidFill>
                     <a:srgbClr val="000000"/>
                   </a:solidFill>
@@ -25335,7 +25368,7 @@
             </a:ln>
             <a:extLst>
               <a:ext uri="{91240B29-F687-4f45-9708-019B960494DF}">
-                <a14:hiddenLine xmlns="" xmlns:a16="http://schemas.microsoft.com/office/drawing/2014/main" xmlns:a14="http://schemas.microsoft.com/office/drawing/2010/main" xmlns:p14="http://schemas.microsoft.com/office/powerpoint/2010/main" w="9525">
+                <a14:hiddenLine xmlns:p14="http://schemas.microsoft.com/office/powerpoint/2010/main" xmlns:a14="http://schemas.microsoft.com/office/drawing/2010/main" xmlns:a16="http://schemas.microsoft.com/office/drawing/2014/main" xmlns="" w="9525">
                   <a:solidFill>
                     <a:srgbClr val="000000"/>
                   </a:solidFill>
@@ -25447,7 +25480,7 @@
             </a:ln>
             <a:extLst>
               <a:ext uri="{91240B29-F687-4f45-9708-019B960494DF}">
-                <a14:hiddenLine xmlns="" xmlns:a16="http://schemas.microsoft.com/office/drawing/2014/main" xmlns:a14="http://schemas.microsoft.com/office/drawing/2010/main" xmlns:p14="http://schemas.microsoft.com/office/powerpoint/2010/main" w="9525">
+                <a14:hiddenLine xmlns:p14="http://schemas.microsoft.com/office/powerpoint/2010/main" xmlns:a14="http://schemas.microsoft.com/office/drawing/2010/main" xmlns:a16="http://schemas.microsoft.com/office/drawing/2014/main" xmlns="" w="9525">
                   <a:solidFill>
                     <a:srgbClr val="000000"/>
                   </a:solidFill>
@@ -25559,7 +25592,7 @@
             </a:ln>
             <a:extLst>
               <a:ext uri="{91240B29-F687-4f45-9708-019B960494DF}">
-                <a14:hiddenLine xmlns="" xmlns:a16="http://schemas.microsoft.com/office/drawing/2014/main" xmlns:a14="http://schemas.microsoft.com/office/drawing/2010/main" xmlns:p14="http://schemas.microsoft.com/office/powerpoint/2010/main" w="9525">
+                <a14:hiddenLine xmlns:p14="http://schemas.microsoft.com/office/powerpoint/2010/main" xmlns:a14="http://schemas.microsoft.com/office/drawing/2010/main" xmlns:a16="http://schemas.microsoft.com/office/drawing/2014/main" xmlns="" w="9525">
                   <a:solidFill>
                     <a:srgbClr val="000000"/>
                   </a:solidFill>
@@ -25643,7 +25676,7 @@
             </a:ln>
             <a:extLst>
               <a:ext uri="{91240B29-F687-4f45-9708-019B960494DF}">
-                <a14:hiddenLine xmlns="" xmlns:a16="http://schemas.microsoft.com/office/drawing/2014/main" xmlns:a14="http://schemas.microsoft.com/office/drawing/2010/main" xmlns:p14="http://schemas.microsoft.com/office/powerpoint/2010/main" w="9525">
+                <a14:hiddenLine xmlns:p14="http://schemas.microsoft.com/office/powerpoint/2010/main" xmlns:a14="http://schemas.microsoft.com/office/drawing/2010/main" xmlns:a16="http://schemas.microsoft.com/office/drawing/2014/main" xmlns="" w="9525">
                   <a:solidFill>
                     <a:srgbClr val="000000"/>
                   </a:solidFill>
@@ -25755,7 +25788,7 @@
             </a:ln>
             <a:extLst>
               <a:ext uri="{91240B29-F687-4f45-9708-019B960494DF}">
-                <a14:hiddenLine xmlns="" xmlns:a16="http://schemas.microsoft.com/office/drawing/2014/main" xmlns:a14="http://schemas.microsoft.com/office/drawing/2010/main" xmlns:p14="http://schemas.microsoft.com/office/powerpoint/2010/main" w="9525">
+                <a14:hiddenLine xmlns:p14="http://schemas.microsoft.com/office/powerpoint/2010/main" xmlns:a14="http://schemas.microsoft.com/office/drawing/2010/main" xmlns:a16="http://schemas.microsoft.com/office/drawing/2014/main" xmlns="" w="9525">
                   <a:solidFill>
                     <a:srgbClr val="000000"/>
                   </a:solidFill>
@@ -25867,7 +25900,7 @@
             </a:ln>
             <a:extLst>
               <a:ext uri="{91240B29-F687-4f45-9708-019B960494DF}">
-                <a14:hiddenLine xmlns="" xmlns:a16="http://schemas.microsoft.com/office/drawing/2014/main" xmlns:a14="http://schemas.microsoft.com/office/drawing/2010/main" xmlns:p14="http://schemas.microsoft.com/office/powerpoint/2010/main" w="9525">
+                <a14:hiddenLine xmlns:p14="http://schemas.microsoft.com/office/powerpoint/2010/main" xmlns:a14="http://schemas.microsoft.com/office/drawing/2010/main" xmlns:a16="http://schemas.microsoft.com/office/drawing/2014/main" xmlns="" w="9525">
                   <a:solidFill>
                     <a:srgbClr val="000000"/>
                   </a:solidFill>
@@ -25945,7 +25978,7 @@
             </a:ln>
             <a:extLst>
               <a:ext uri="{91240B29-F687-4f45-9708-019B960494DF}">
-                <a14:hiddenLine xmlns="" xmlns:a16="http://schemas.microsoft.com/office/drawing/2014/main" xmlns:a14="http://schemas.microsoft.com/office/drawing/2010/main" xmlns:p14="http://schemas.microsoft.com/office/powerpoint/2010/main" w="9525">
+                <a14:hiddenLine xmlns:p14="http://schemas.microsoft.com/office/powerpoint/2010/main" xmlns:a14="http://schemas.microsoft.com/office/drawing/2010/main" xmlns:a16="http://schemas.microsoft.com/office/drawing/2014/main" xmlns="" w="9525">
                   <a:solidFill>
                     <a:srgbClr val="000000"/>
                   </a:solidFill>
@@ -26057,7 +26090,7 @@
             </a:ln>
             <a:extLst>
               <a:ext uri="{91240B29-F687-4f45-9708-019B960494DF}">
-                <a14:hiddenLine xmlns="" xmlns:a16="http://schemas.microsoft.com/office/drawing/2014/main" xmlns:a14="http://schemas.microsoft.com/office/drawing/2010/main" xmlns:p14="http://schemas.microsoft.com/office/powerpoint/2010/main" w="9525">
+                <a14:hiddenLine xmlns:p14="http://schemas.microsoft.com/office/powerpoint/2010/main" xmlns:a14="http://schemas.microsoft.com/office/drawing/2010/main" xmlns:a16="http://schemas.microsoft.com/office/drawing/2014/main" xmlns="" w="9525">
                   <a:solidFill>
                     <a:srgbClr val="000000"/>
                   </a:solidFill>
@@ -26135,7 +26168,7 @@
             </a:ln>
             <a:extLst>
               <a:ext uri="{91240B29-F687-4f45-9708-019B960494DF}">
-                <a14:hiddenLine xmlns="" xmlns:a16="http://schemas.microsoft.com/office/drawing/2014/main" xmlns:a14="http://schemas.microsoft.com/office/drawing/2010/main" xmlns:p14="http://schemas.microsoft.com/office/powerpoint/2010/main" w="9525">
+                <a14:hiddenLine xmlns:p14="http://schemas.microsoft.com/office/powerpoint/2010/main" xmlns:a14="http://schemas.microsoft.com/office/drawing/2010/main" xmlns:a16="http://schemas.microsoft.com/office/drawing/2014/main" xmlns="" w="9525">
                   <a:solidFill>
                     <a:srgbClr val="000000"/>
                   </a:solidFill>
@@ -26247,7 +26280,7 @@
             </a:ln>
             <a:extLst>
               <a:ext uri="{91240B29-F687-4f45-9708-019B960494DF}">
-                <a14:hiddenLine xmlns="" xmlns:a16="http://schemas.microsoft.com/office/drawing/2014/main" xmlns:a14="http://schemas.microsoft.com/office/drawing/2010/main" xmlns:p14="http://schemas.microsoft.com/office/powerpoint/2010/main" w="9525">
+                <a14:hiddenLine xmlns:p14="http://schemas.microsoft.com/office/powerpoint/2010/main" xmlns:a14="http://schemas.microsoft.com/office/drawing/2010/main" xmlns:a16="http://schemas.microsoft.com/office/drawing/2014/main" xmlns="" w="9525">
                   <a:solidFill>
                     <a:srgbClr val="000000"/>
                   </a:solidFill>
@@ -26337,7 +26370,7 @@
             </a:ln>
             <a:extLst>
               <a:ext uri="{91240B29-F687-4f45-9708-019B960494DF}">
-                <a14:hiddenLine xmlns="" xmlns:a16="http://schemas.microsoft.com/office/drawing/2014/main" xmlns:a14="http://schemas.microsoft.com/office/drawing/2010/main" xmlns:p14="http://schemas.microsoft.com/office/powerpoint/2010/main" w="9525">
+                <a14:hiddenLine xmlns:p14="http://schemas.microsoft.com/office/powerpoint/2010/main" xmlns:a14="http://schemas.microsoft.com/office/drawing/2010/main" xmlns:a16="http://schemas.microsoft.com/office/drawing/2014/main" xmlns="" w="9525">
                   <a:solidFill>
                     <a:srgbClr val="000000"/>
                   </a:solidFill>
@@ -26449,7 +26482,7 @@
             </a:ln>
             <a:extLst>
               <a:ext uri="{91240B29-F687-4f45-9708-019B960494DF}">
-                <a14:hiddenLine xmlns="" xmlns:a16="http://schemas.microsoft.com/office/drawing/2014/main" xmlns:a14="http://schemas.microsoft.com/office/drawing/2010/main" xmlns:p14="http://schemas.microsoft.com/office/powerpoint/2010/main" w="9525">
+                <a14:hiddenLine xmlns:p14="http://schemas.microsoft.com/office/powerpoint/2010/main" xmlns:a14="http://schemas.microsoft.com/office/drawing/2010/main" xmlns:a16="http://schemas.microsoft.com/office/drawing/2014/main" xmlns="" w="9525">
                   <a:solidFill>
                     <a:srgbClr val="000000"/>
                   </a:solidFill>
@@ -26539,7 +26572,7 @@
             </a:ln>
             <a:extLst>
               <a:ext uri="{91240B29-F687-4f45-9708-019B960494DF}">
-                <a14:hiddenLine xmlns="" xmlns:a16="http://schemas.microsoft.com/office/drawing/2014/main" xmlns:a14="http://schemas.microsoft.com/office/drawing/2010/main" xmlns:p14="http://schemas.microsoft.com/office/powerpoint/2010/main" w="9525">
+                <a14:hiddenLine xmlns:p14="http://schemas.microsoft.com/office/powerpoint/2010/main" xmlns:a14="http://schemas.microsoft.com/office/drawing/2010/main" xmlns:a16="http://schemas.microsoft.com/office/drawing/2014/main" xmlns="" w="9525">
                   <a:solidFill>
                     <a:srgbClr val="000000"/>
                   </a:solidFill>
@@ -26651,7 +26684,7 @@
             </a:ln>
             <a:extLst>
               <a:ext uri="{91240B29-F687-4f45-9708-019B960494DF}">
-                <a14:hiddenLine xmlns="" xmlns:a16="http://schemas.microsoft.com/office/drawing/2014/main" xmlns:a14="http://schemas.microsoft.com/office/drawing/2010/main" xmlns:p14="http://schemas.microsoft.com/office/powerpoint/2010/main" w="9525">
+                <a14:hiddenLine xmlns:p14="http://schemas.microsoft.com/office/powerpoint/2010/main" xmlns:a14="http://schemas.microsoft.com/office/drawing/2010/main" xmlns:a16="http://schemas.microsoft.com/office/drawing/2014/main" xmlns="" w="9525">
                   <a:solidFill>
                     <a:srgbClr val="000000"/>
                   </a:solidFill>
@@ -26707,7 +26740,7 @@
             </a:ln>
             <a:extLst>
               <a:ext uri="{91240B29-F687-4f45-9708-019B960494DF}">
-                <a14:hiddenLine xmlns="" xmlns:a16="http://schemas.microsoft.com/office/drawing/2014/main" xmlns:a14="http://schemas.microsoft.com/office/drawing/2010/main" xmlns:p14="http://schemas.microsoft.com/office/powerpoint/2010/main" w="9525">
+                <a14:hiddenLine xmlns:p14="http://schemas.microsoft.com/office/powerpoint/2010/main" xmlns:a14="http://schemas.microsoft.com/office/drawing/2010/main" xmlns:a16="http://schemas.microsoft.com/office/drawing/2014/main" xmlns="" w="9525">
                   <a:solidFill>
                     <a:srgbClr val="000000"/>
                   </a:solidFill>
@@ -26819,7 +26852,7 @@
             </a:ln>
             <a:extLst>
               <a:ext uri="{91240B29-F687-4f45-9708-019B960494DF}">
-                <a14:hiddenLine xmlns="" xmlns:a16="http://schemas.microsoft.com/office/drawing/2014/main" xmlns:a14="http://schemas.microsoft.com/office/drawing/2010/main" xmlns:p14="http://schemas.microsoft.com/office/powerpoint/2010/main" w="9525">
+                <a14:hiddenLine xmlns:p14="http://schemas.microsoft.com/office/powerpoint/2010/main" xmlns:a14="http://schemas.microsoft.com/office/drawing/2010/main" xmlns:a16="http://schemas.microsoft.com/office/drawing/2014/main" xmlns="" w="9525">
                   <a:solidFill>
                     <a:srgbClr val="000000"/>
                   </a:solidFill>
@@ -26903,7 +26936,7 @@
             </a:ln>
             <a:extLst>
               <a:ext uri="{91240B29-F687-4f45-9708-019B960494DF}">
-                <a14:hiddenLine xmlns="" xmlns:a16="http://schemas.microsoft.com/office/drawing/2014/main" xmlns:a14="http://schemas.microsoft.com/office/drawing/2010/main" xmlns:p14="http://schemas.microsoft.com/office/powerpoint/2010/main" w="9525">
+                <a14:hiddenLine xmlns:p14="http://schemas.microsoft.com/office/powerpoint/2010/main" xmlns:a14="http://schemas.microsoft.com/office/drawing/2010/main" xmlns:a16="http://schemas.microsoft.com/office/drawing/2014/main" xmlns="" w="9525">
                   <a:solidFill>
                     <a:srgbClr val="000000"/>
                   </a:solidFill>
@@ -26987,7 +27020,7 @@
             </a:ln>
             <a:extLst>
               <a:ext uri="{91240B29-F687-4f45-9708-019B960494DF}">
-                <a14:hiddenLine xmlns="" xmlns:a16="http://schemas.microsoft.com/office/drawing/2014/main" xmlns:a14="http://schemas.microsoft.com/office/drawing/2010/main" xmlns:p14="http://schemas.microsoft.com/office/powerpoint/2010/main" w="9525">
+                <a14:hiddenLine xmlns:p14="http://schemas.microsoft.com/office/powerpoint/2010/main" xmlns:a14="http://schemas.microsoft.com/office/drawing/2010/main" xmlns:a16="http://schemas.microsoft.com/office/drawing/2014/main" xmlns="" w="9525">
                   <a:solidFill>
                     <a:srgbClr val="000000"/>
                   </a:solidFill>
@@ -27099,7 +27132,7 @@
             </a:ln>
             <a:extLst>
               <a:ext uri="{91240B29-F687-4f45-9708-019B960494DF}">
-                <a14:hiddenLine xmlns="" xmlns:a16="http://schemas.microsoft.com/office/drawing/2014/main" xmlns:a14="http://schemas.microsoft.com/office/drawing/2010/main" xmlns:p14="http://schemas.microsoft.com/office/powerpoint/2010/main" w="9525">
+                <a14:hiddenLine xmlns:p14="http://schemas.microsoft.com/office/powerpoint/2010/main" xmlns:a14="http://schemas.microsoft.com/office/drawing/2010/main" xmlns:a16="http://schemas.microsoft.com/office/drawing/2014/main" xmlns="" w="9525">
                   <a:solidFill>
                     <a:srgbClr val="000000"/>
                   </a:solidFill>
@@ -27189,7 +27222,7 @@
             </a:ln>
             <a:extLst>
               <a:ext uri="{91240B29-F687-4f45-9708-019B960494DF}">
-                <a14:hiddenLine xmlns="" xmlns:a16="http://schemas.microsoft.com/office/drawing/2014/main" xmlns:a14="http://schemas.microsoft.com/office/drawing/2010/main" xmlns:p14="http://schemas.microsoft.com/office/powerpoint/2010/main" w="9525">
+                <a14:hiddenLine xmlns:p14="http://schemas.microsoft.com/office/powerpoint/2010/main" xmlns:a14="http://schemas.microsoft.com/office/drawing/2010/main" xmlns:a16="http://schemas.microsoft.com/office/drawing/2014/main" xmlns="" w="9525">
                   <a:solidFill>
                     <a:srgbClr val="000000"/>
                   </a:solidFill>
@@ -27273,7 +27306,7 @@
             </a:ln>
             <a:extLst>
               <a:ext uri="{91240B29-F687-4f45-9708-019B960494DF}">
-                <a14:hiddenLine xmlns="" xmlns:a16="http://schemas.microsoft.com/office/drawing/2014/main" xmlns:a14="http://schemas.microsoft.com/office/drawing/2010/main" xmlns:p14="http://schemas.microsoft.com/office/powerpoint/2010/main" w="9525">
+                <a14:hiddenLine xmlns:p14="http://schemas.microsoft.com/office/powerpoint/2010/main" xmlns:a14="http://schemas.microsoft.com/office/drawing/2010/main" xmlns:a16="http://schemas.microsoft.com/office/drawing/2014/main" xmlns="" w="9525">
                   <a:solidFill>
                     <a:srgbClr val="000000"/>
                   </a:solidFill>
@@ -27385,7 +27418,7 @@
             </a:ln>
             <a:extLst>
               <a:ext uri="{91240B29-F687-4f45-9708-019B960494DF}">
-                <a14:hiddenLine xmlns="" xmlns:a16="http://schemas.microsoft.com/office/drawing/2014/main" xmlns:a14="http://schemas.microsoft.com/office/drawing/2010/main" xmlns:p14="http://schemas.microsoft.com/office/powerpoint/2010/main" w="9525">
+                <a14:hiddenLine xmlns:p14="http://schemas.microsoft.com/office/powerpoint/2010/main" xmlns:a14="http://schemas.microsoft.com/office/drawing/2010/main" xmlns:a16="http://schemas.microsoft.com/office/drawing/2014/main" xmlns="" w="9525">
                   <a:solidFill>
                     <a:srgbClr val="000000"/>
                   </a:solidFill>
@@ -27469,7 +27502,7 @@
             </a:ln>
             <a:extLst>
               <a:ext uri="{91240B29-F687-4f45-9708-019B960494DF}">
-                <a14:hiddenLine xmlns="" xmlns:a16="http://schemas.microsoft.com/office/drawing/2014/main" xmlns:a14="http://schemas.microsoft.com/office/drawing/2010/main" xmlns:p14="http://schemas.microsoft.com/office/powerpoint/2010/main" w="9525">
+                <a14:hiddenLine xmlns:p14="http://schemas.microsoft.com/office/powerpoint/2010/main" xmlns:a14="http://schemas.microsoft.com/office/drawing/2010/main" xmlns:a16="http://schemas.microsoft.com/office/drawing/2014/main" xmlns="" w="9525">
                   <a:solidFill>
                     <a:srgbClr val="000000"/>
                   </a:solidFill>
@@ -27581,7 +27614,7 @@
             </a:ln>
             <a:extLst>
               <a:ext uri="{91240B29-F687-4f45-9708-019B960494DF}">
-                <a14:hiddenLine xmlns="" xmlns:a16="http://schemas.microsoft.com/office/drawing/2014/main" xmlns:a14="http://schemas.microsoft.com/office/drawing/2010/main" xmlns:p14="http://schemas.microsoft.com/office/powerpoint/2010/main" w="9525">
+                <a14:hiddenLine xmlns:p14="http://schemas.microsoft.com/office/powerpoint/2010/main" xmlns:a14="http://schemas.microsoft.com/office/drawing/2010/main" xmlns:a16="http://schemas.microsoft.com/office/drawing/2014/main" xmlns="" w="9525">
                   <a:solidFill>
                     <a:srgbClr val="000000"/>
                   </a:solidFill>
@@ -27665,7 +27698,7 @@
             </a:ln>
             <a:extLst>
               <a:ext uri="{91240B29-F687-4f45-9708-019B960494DF}">
-                <a14:hiddenLine xmlns="" xmlns:a16="http://schemas.microsoft.com/office/drawing/2014/main" xmlns:a14="http://schemas.microsoft.com/office/drawing/2010/main" xmlns:p14="http://schemas.microsoft.com/office/powerpoint/2010/main" w="9525">
+                <a14:hiddenLine xmlns:p14="http://schemas.microsoft.com/office/powerpoint/2010/main" xmlns:a14="http://schemas.microsoft.com/office/drawing/2010/main" xmlns:a16="http://schemas.microsoft.com/office/drawing/2014/main" xmlns="" w="9525">
                   <a:solidFill>
                     <a:srgbClr val="000000"/>
                   </a:solidFill>
@@ -27777,7 +27810,7 @@
             </a:ln>
             <a:extLst>
               <a:ext uri="{91240B29-F687-4f45-9708-019B960494DF}">
-                <a14:hiddenLine xmlns="" xmlns:a16="http://schemas.microsoft.com/office/drawing/2014/main" xmlns:a14="http://schemas.microsoft.com/office/drawing/2010/main" xmlns:p14="http://schemas.microsoft.com/office/powerpoint/2010/main" w="9525">
+                <a14:hiddenLine xmlns:p14="http://schemas.microsoft.com/office/powerpoint/2010/main" xmlns:a14="http://schemas.microsoft.com/office/drawing/2010/main" xmlns:a16="http://schemas.microsoft.com/office/drawing/2014/main" xmlns="" w="9525">
                   <a:solidFill>
                     <a:srgbClr val="000000"/>
                   </a:solidFill>
@@ -27833,7 +27866,7 @@
             </a:ln>
             <a:extLst>
               <a:ext uri="{91240B29-F687-4f45-9708-019B960494DF}">
-                <a14:hiddenLine xmlns="" xmlns:a16="http://schemas.microsoft.com/office/drawing/2014/main" xmlns:a14="http://schemas.microsoft.com/office/drawing/2010/main" xmlns:p14="http://schemas.microsoft.com/office/powerpoint/2010/main" w="9525">
+                <a14:hiddenLine xmlns:p14="http://schemas.microsoft.com/office/powerpoint/2010/main" xmlns:a14="http://schemas.microsoft.com/office/drawing/2010/main" xmlns:a16="http://schemas.microsoft.com/office/drawing/2014/main" xmlns="" w="9525">
                   <a:solidFill>
                     <a:srgbClr val="000000"/>
                   </a:solidFill>
@@ -27920,7 +27953,7 @@
             </a:ln>
             <a:extLst>
               <a:ext uri="{91240B29-F687-4f45-9708-019B960494DF}">
-                <a14:hiddenLine xmlns="" xmlns:a16="http://schemas.microsoft.com/office/drawing/2014/main" xmlns:a14="http://schemas.microsoft.com/office/drawing/2010/main" xmlns:p14="http://schemas.microsoft.com/office/powerpoint/2010/main" w="9525">
+                <a14:hiddenLine xmlns:p14="http://schemas.microsoft.com/office/powerpoint/2010/main" xmlns:a14="http://schemas.microsoft.com/office/drawing/2010/main" xmlns:a16="http://schemas.microsoft.com/office/drawing/2014/main" xmlns="" w="9525">
                   <a:solidFill>
                     <a:srgbClr val="000000"/>
                   </a:solidFill>
@@ -28032,7 +28065,7 @@
             </a:ln>
             <a:extLst>
               <a:ext uri="{91240B29-F687-4f45-9708-019B960494DF}">
-                <a14:hiddenLine xmlns="" xmlns:a16="http://schemas.microsoft.com/office/drawing/2014/main" xmlns:a14="http://schemas.microsoft.com/office/drawing/2010/main" xmlns:p14="http://schemas.microsoft.com/office/powerpoint/2010/main" w="9525">
+                <a14:hiddenLine xmlns:p14="http://schemas.microsoft.com/office/powerpoint/2010/main" xmlns:a14="http://schemas.microsoft.com/office/drawing/2010/main" xmlns:a16="http://schemas.microsoft.com/office/drawing/2014/main" xmlns="" w="9525">
                   <a:solidFill>
                     <a:srgbClr val="000000"/>
                   </a:solidFill>
@@ -28116,7 +28149,7 @@
             </a:ln>
             <a:extLst>
               <a:ext uri="{91240B29-F687-4f45-9708-019B960494DF}">
-                <a14:hiddenLine xmlns="" xmlns:a16="http://schemas.microsoft.com/office/drawing/2014/main" xmlns:a14="http://schemas.microsoft.com/office/drawing/2010/main" xmlns:p14="http://schemas.microsoft.com/office/powerpoint/2010/main" w="9525">
+                <a14:hiddenLine xmlns:p14="http://schemas.microsoft.com/office/powerpoint/2010/main" xmlns:a14="http://schemas.microsoft.com/office/drawing/2010/main" xmlns:a16="http://schemas.microsoft.com/office/drawing/2014/main" xmlns="" w="9525">
                   <a:solidFill>
                     <a:srgbClr val="000000"/>
                   </a:solidFill>
@@ -28228,7 +28261,7 @@
             </a:ln>
             <a:extLst>
               <a:ext uri="{91240B29-F687-4f45-9708-019B960494DF}">
-                <a14:hiddenLine xmlns="" xmlns:a16="http://schemas.microsoft.com/office/drawing/2014/main" xmlns:a14="http://schemas.microsoft.com/office/drawing/2010/main" xmlns:p14="http://schemas.microsoft.com/office/powerpoint/2010/main" w="9525">
+                <a14:hiddenLine xmlns:p14="http://schemas.microsoft.com/office/powerpoint/2010/main" xmlns:a14="http://schemas.microsoft.com/office/drawing/2010/main" xmlns:a16="http://schemas.microsoft.com/office/drawing/2014/main" xmlns="" w="9525">
                   <a:solidFill>
                     <a:srgbClr val="000000"/>
                   </a:solidFill>
@@ -28340,7 +28373,7 @@
             </a:ln>
             <a:extLst>
               <a:ext uri="{91240B29-F687-4f45-9708-019B960494DF}">
-                <a14:hiddenLine xmlns="" xmlns:a16="http://schemas.microsoft.com/office/drawing/2014/main" xmlns:a14="http://schemas.microsoft.com/office/drawing/2010/main" xmlns:p14="http://schemas.microsoft.com/office/powerpoint/2010/main" w="9525">
+                <a14:hiddenLine xmlns:p14="http://schemas.microsoft.com/office/powerpoint/2010/main" xmlns:a14="http://schemas.microsoft.com/office/drawing/2010/main" xmlns:a16="http://schemas.microsoft.com/office/drawing/2014/main" xmlns="" w="9525">
                   <a:solidFill>
                     <a:srgbClr val="000000"/>
                   </a:solidFill>
@@ -28427,7 +28460,7 @@
             </a:ln>
             <a:extLst>
               <a:ext uri="{91240B29-F687-4f45-9708-019B960494DF}">
-                <a14:hiddenLine xmlns="" xmlns:a16="http://schemas.microsoft.com/office/drawing/2014/main" xmlns:a14="http://schemas.microsoft.com/office/drawing/2010/main" xmlns:p14="http://schemas.microsoft.com/office/powerpoint/2010/main" w="9525">
+                <a14:hiddenLine xmlns:p14="http://schemas.microsoft.com/office/powerpoint/2010/main" xmlns:a14="http://schemas.microsoft.com/office/drawing/2010/main" xmlns:a16="http://schemas.microsoft.com/office/drawing/2014/main" xmlns="" w="9525">
                   <a:solidFill>
                     <a:srgbClr val="000000"/>
                   </a:solidFill>
@@ -28511,7 +28544,7 @@
             </a:ln>
             <a:extLst>
               <a:ext uri="{91240B29-F687-4f45-9708-019B960494DF}">
-                <a14:hiddenLine xmlns="" xmlns:a16="http://schemas.microsoft.com/office/drawing/2014/main" xmlns:a14="http://schemas.microsoft.com/office/drawing/2010/main" xmlns:p14="http://schemas.microsoft.com/office/powerpoint/2010/main" w="9525">
+                <a14:hiddenLine xmlns:p14="http://schemas.microsoft.com/office/powerpoint/2010/main" xmlns:a14="http://schemas.microsoft.com/office/drawing/2010/main" xmlns:a16="http://schemas.microsoft.com/office/drawing/2014/main" xmlns="" w="9525">
                   <a:solidFill>
                     <a:srgbClr val="000000"/>
                   </a:solidFill>
@@ -28623,7 +28656,7 @@
             </a:ln>
             <a:extLst>
               <a:ext uri="{91240B29-F687-4f45-9708-019B960494DF}">
-                <a14:hiddenLine xmlns="" xmlns:a16="http://schemas.microsoft.com/office/drawing/2014/main" xmlns:a14="http://schemas.microsoft.com/office/drawing/2010/main" xmlns:p14="http://schemas.microsoft.com/office/powerpoint/2010/main" w="9525">
+                <a14:hiddenLine xmlns:p14="http://schemas.microsoft.com/office/powerpoint/2010/main" xmlns:a14="http://schemas.microsoft.com/office/drawing/2010/main" xmlns:a16="http://schemas.microsoft.com/office/drawing/2014/main" xmlns="" w="9525">
                   <a:solidFill>
                     <a:srgbClr val="000000"/>
                   </a:solidFill>
@@ -28735,7 +28768,7 @@
             </a:ln>
             <a:extLst>
               <a:ext uri="{91240B29-F687-4f45-9708-019B960494DF}">
-                <a14:hiddenLine xmlns="" xmlns:a16="http://schemas.microsoft.com/office/drawing/2014/main" xmlns:a14="http://schemas.microsoft.com/office/drawing/2010/main" xmlns:p14="http://schemas.microsoft.com/office/powerpoint/2010/main" w="9525">
+                <a14:hiddenLine xmlns:p14="http://schemas.microsoft.com/office/powerpoint/2010/main" xmlns:a14="http://schemas.microsoft.com/office/drawing/2010/main" xmlns:a16="http://schemas.microsoft.com/office/drawing/2014/main" xmlns="" w="9525">
                   <a:solidFill>
                     <a:srgbClr val="000000"/>
                   </a:solidFill>
@@ -28819,7 +28852,7 @@
             </a:ln>
             <a:extLst>
               <a:ext uri="{91240B29-F687-4f45-9708-019B960494DF}">
-                <a14:hiddenLine xmlns="" xmlns:a16="http://schemas.microsoft.com/office/drawing/2014/main" xmlns:a14="http://schemas.microsoft.com/office/drawing/2010/main" xmlns:p14="http://schemas.microsoft.com/office/powerpoint/2010/main" w="9525">
+                <a14:hiddenLine xmlns:p14="http://schemas.microsoft.com/office/powerpoint/2010/main" xmlns:a14="http://schemas.microsoft.com/office/drawing/2010/main" xmlns:a16="http://schemas.microsoft.com/office/drawing/2014/main" xmlns="" w="9525">
                   <a:solidFill>
                     <a:srgbClr val="000000"/>
                   </a:solidFill>
@@ -28961,7 +28994,7 @@
             </a:ln>
             <a:extLst>
               <a:ext uri="{91240B29-F687-4f45-9708-019B960494DF}">
-                <a14:hiddenLine xmlns="" xmlns:a16="http://schemas.microsoft.com/office/drawing/2014/main" xmlns:a14="http://schemas.microsoft.com/office/drawing/2010/main" xmlns:p14="http://schemas.microsoft.com/office/powerpoint/2010/main" w="9525">
+                <a14:hiddenLine xmlns:p14="http://schemas.microsoft.com/office/powerpoint/2010/main" xmlns:a14="http://schemas.microsoft.com/office/drawing/2010/main" xmlns:a16="http://schemas.microsoft.com/office/drawing/2014/main" xmlns="" w="9525">
                   <a:solidFill>
                     <a:srgbClr val="000000"/>
                   </a:solidFill>
@@ -29051,7 +29084,7 @@
             </a:ln>
             <a:extLst>
               <a:ext uri="{91240B29-F687-4f45-9708-019B960494DF}">
-                <a14:hiddenLine xmlns="" xmlns:a16="http://schemas.microsoft.com/office/drawing/2014/main" xmlns:a14="http://schemas.microsoft.com/office/drawing/2010/main" xmlns:p14="http://schemas.microsoft.com/office/powerpoint/2010/main" w="9525">
+                <a14:hiddenLine xmlns:p14="http://schemas.microsoft.com/office/powerpoint/2010/main" xmlns:a14="http://schemas.microsoft.com/office/drawing/2010/main" xmlns:a16="http://schemas.microsoft.com/office/drawing/2014/main" xmlns="" w="9525">
                   <a:solidFill>
                     <a:srgbClr val="000000"/>
                   </a:solidFill>
@@ -29163,7 +29196,7 @@
             </a:ln>
             <a:extLst>
               <a:ext uri="{91240B29-F687-4f45-9708-019B960494DF}">
-                <a14:hiddenLine xmlns="" xmlns:a16="http://schemas.microsoft.com/office/drawing/2014/main" xmlns:a14="http://schemas.microsoft.com/office/drawing/2010/main" xmlns:p14="http://schemas.microsoft.com/office/powerpoint/2010/main" w="9525">
+                <a14:hiddenLine xmlns:p14="http://schemas.microsoft.com/office/powerpoint/2010/main" xmlns:a14="http://schemas.microsoft.com/office/drawing/2010/main" xmlns:a16="http://schemas.microsoft.com/office/drawing/2014/main" xmlns="" w="9525">
                   <a:solidFill>
                     <a:srgbClr val="000000"/>
                   </a:solidFill>
@@ -29455,7 +29488,7 @@
             <a:noFill/>
             <a:extLst>
               <a:ext uri="{909E8E84-426E-40dd-AFC4-6F175D3DCCD1}">
-                <a14:hiddenFill xmlns="" xmlns:a16="http://schemas.microsoft.com/office/drawing/2014/main" xmlns:a14="http://schemas.microsoft.com/office/drawing/2010/main" xmlns:p14="http://schemas.microsoft.com/office/powerpoint/2010/main">
+                <a14:hiddenFill xmlns:p14="http://schemas.microsoft.com/office/powerpoint/2010/main" xmlns:a14="http://schemas.microsoft.com/office/drawing/2010/main" xmlns:a16="http://schemas.microsoft.com/office/drawing/2014/main" xmlns="">
                   <a:solidFill>
                     <a:srgbClr val="FFFFFF"/>
                   </a:solidFill>
@@ -29598,7 +29631,7 @@
             </a:ln>
             <a:extLst>
               <a:ext uri="{91240B29-F687-4f45-9708-019B960494DF}">
-                <a14:hiddenLine xmlns="" xmlns:a16="http://schemas.microsoft.com/office/drawing/2014/main" xmlns:a14="http://schemas.microsoft.com/office/drawing/2010/main" xmlns:p14="http://schemas.microsoft.com/office/powerpoint/2010/main" w="9525">
+                <a14:hiddenLine xmlns:p14="http://schemas.microsoft.com/office/powerpoint/2010/main" xmlns:a14="http://schemas.microsoft.com/office/drawing/2010/main" xmlns:a16="http://schemas.microsoft.com/office/drawing/2014/main" xmlns="" w="9525">
                   <a:solidFill>
                     <a:srgbClr val="000000"/>
                   </a:solidFill>
@@ -29710,7 +29743,7 @@
             </a:ln>
             <a:extLst>
               <a:ext uri="{91240B29-F687-4f45-9708-019B960494DF}">
-                <a14:hiddenLine xmlns="" xmlns:a16="http://schemas.microsoft.com/office/drawing/2014/main" xmlns:a14="http://schemas.microsoft.com/office/drawing/2010/main" xmlns:p14="http://schemas.microsoft.com/office/powerpoint/2010/main" w="9525">
+                <a14:hiddenLine xmlns:p14="http://schemas.microsoft.com/office/powerpoint/2010/main" xmlns:a14="http://schemas.microsoft.com/office/drawing/2010/main" xmlns:a16="http://schemas.microsoft.com/office/drawing/2014/main" xmlns="" w="9525">
                   <a:solidFill>
                     <a:srgbClr val="000000"/>
                   </a:solidFill>
@@ -29822,7 +29855,7 @@
             </a:ln>
             <a:extLst>
               <a:ext uri="{91240B29-F687-4f45-9708-019B960494DF}">
-                <a14:hiddenLine xmlns="" xmlns:a16="http://schemas.microsoft.com/office/drawing/2014/main" xmlns:a14="http://schemas.microsoft.com/office/drawing/2010/main" xmlns:p14="http://schemas.microsoft.com/office/powerpoint/2010/main" w="9525">
+                <a14:hiddenLine xmlns:p14="http://schemas.microsoft.com/office/powerpoint/2010/main" xmlns:a14="http://schemas.microsoft.com/office/drawing/2010/main" xmlns:a16="http://schemas.microsoft.com/office/drawing/2014/main" xmlns="" w="9525">
                   <a:solidFill>
                     <a:srgbClr val="000000"/>
                   </a:solidFill>
@@ -29878,7 +29911,7 @@
             </a:ln>
             <a:extLst>
               <a:ext uri="{91240B29-F687-4f45-9708-019B960494DF}">
-                <a14:hiddenLine xmlns="" xmlns:a16="http://schemas.microsoft.com/office/drawing/2014/main" xmlns:a14="http://schemas.microsoft.com/office/drawing/2010/main" xmlns:p14="http://schemas.microsoft.com/office/powerpoint/2010/main" w="9525">
+                <a14:hiddenLine xmlns:p14="http://schemas.microsoft.com/office/powerpoint/2010/main" xmlns:a14="http://schemas.microsoft.com/office/drawing/2010/main" xmlns:a16="http://schemas.microsoft.com/office/drawing/2014/main" xmlns="" w="9525">
                   <a:solidFill>
                     <a:srgbClr val="000000"/>
                   </a:solidFill>
@@ -29990,7 +30023,7 @@
             </a:ln>
             <a:extLst>
               <a:ext uri="{91240B29-F687-4f45-9708-019B960494DF}">
-                <a14:hiddenLine xmlns="" xmlns:a16="http://schemas.microsoft.com/office/drawing/2014/main" xmlns:a14="http://schemas.microsoft.com/office/drawing/2010/main" xmlns:p14="http://schemas.microsoft.com/office/powerpoint/2010/main" w="9525">
+                <a14:hiddenLine xmlns:p14="http://schemas.microsoft.com/office/powerpoint/2010/main" xmlns:a14="http://schemas.microsoft.com/office/drawing/2010/main" xmlns:a16="http://schemas.microsoft.com/office/drawing/2014/main" xmlns="" w="9525">
                   <a:solidFill>
                     <a:srgbClr val="000000"/>
                   </a:solidFill>
@@ -30074,7 +30107,7 @@
             </a:ln>
             <a:extLst>
               <a:ext uri="{91240B29-F687-4f45-9708-019B960494DF}">
-                <a14:hiddenLine xmlns="" xmlns:a16="http://schemas.microsoft.com/office/drawing/2014/main" xmlns:a14="http://schemas.microsoft.com/office/drawing/2010/main" xmlns:p14="http://schemas.microsoft.com/office/powerpoint/2010/main" w="9525">
+                <a14:hiddenLine xmlns:p14="http://schemas.microsoft.com/office/powerpoint/2010/main" xmlns:a14="http://schemas.microsoft.com/office/drawing/2010/main" xmlns:a16="http://schemas.microsoft.com/office/drawing/2014/main" xmlns="" w="9525">
                   <a:solidFill>
                     <a:srgbClr val="000000"/>
                   </a:solidFill>
@@ -30158,7 +30191,7 @@
             </a:ln>
             <a:extLst>
               <a:ext uri="{91240B29-F687-4f45-9708-019B960494DF}">
-                <a14:hiddenLine xmlns="" xmlns:a16="http://schemas.microsoft.com/office/drawing/2014/main" xmlns:a14="http://schemas.microsoft.com/office/drawing/2010/main" xmlns:p14="http://schemas.microsoft.com/office/powerpoint/2010/main" w="9525">
+                <a14:hiddenLine xmlns:p14="http://schemas.microsoft.com/office/powerpoint/2010/main" xmlns:a14="http://schemas.microsoft.com/office/drawing/2010/main" xmlns:a16="http://schemas.microsoft.com/office/drawing/2014/main" xmlns="" w="9525">
                   <a:solidFill>
                     <a:srgbClr val="000000"/>
                   </a:solidFill>
@@ -30270,7 +30303,7 @@
             </a:ln>
             <a:extLst>
               <a:ext uri="{91240B29-F687-4f45-9708-019B960494DF}">
-                <a14:hiddenLine xmlns="" xmlns:a16="http://schemas.microsoft.com/office/drawing/2014/main" xmlns:a14="http://schemas.microsoft.com/office/drawing/2010/main" xmlns:p14="http://schemas.microsoft.com/office/powerpoint/2010/main" w="9525">
+                <a14:hiddenLine xmlns:p14="http://schemas.microsoft.com/office/powerpoint/2010/main" xmlns:a14="http://schemas.microsoft.com/office/drawing/2010/main" xmlns:a16="http://schemas.microsoft.com/office/drawing/2014/main" xmlns="" w="9525">
                   <a:solidFill>
                     <a:srgbClr val="000000"/>
                   </a:solidFill>
@@ -30354,7 +30387,7 @@
             </a:ln>
             <a:extLst>
               <a:ext uri="{91240B29-F687-4f45-9708-019B960494DF}">
-                <a14:hiddenLine xmlns="" xmlns:a16="http://schemas.microsoft.com/office/drawing/2014/main" xmlns:a14="http://schemas.microsoft.com/office/drawing/2010/main" xmlns:p14="http://schemas.microsoft.com/office/powerpoint/2010/main" w="9525">
+                <a14:hiddenLine xmlns:p14="http://schemas.microsoft.com/office/powerpoint/2010/main" xmlns:a14="http://schemas.microsoft.com/office/drawing/2010/main" xmlns:a16="http://schemas.microsoft.com/office/drawing/2014/main" xmlns="" w="9525">
                   <a:solidFill>
                     <a:srgbClr val="000000"/>
                   </a:solidFill>
@@ -30438,7 +30471,7 @@
             </a:ln>
             <a:extLst>
               <a:ext uri="{91240B29-F687-4f45-9708-019B960494DF}">
-                <a14:hiddenLine xmlns="" xmlns:a16="http://schemas.microsoft.com/office/drawing/2014/main" xmlns:a14="http://schemas.microsoft.com/office/drawing/2010/main" xmlns:p14="http://schemas.microsoft.com/office/powerpoint/2010/main" w="9525">
+                <a14:hiddenLine xmlns:p14="http://schemas.microsoft.com/office/powerpoint/2010/main" xmlns:a14="http://schemas.microsoft.com/office/drawing/2010/main" xmlns:a16="http://schemas.microsoft.com/office/drawing/2014/main" xmlns="" w="9525">
                   <a:solidFill>
                     <a:srgbClr val="000000"/>
                   </a:solidFill>
@@ -30550,7 +30583,7 @@
             </a:ln>
             <a:extLst>
               <a:ext uri="{91240B29-F687-4f45-9708-019B960494DF}">
-                <a14:hiddenLine xmlns="" xmlns:a16="http://schemas.microsoft.com/office/drawing/2014/main" xmlns:a14="http://schemas.microsoft.com/office/drawing/2010/main" xmlns:p14="http://schemas.microsoft.com/office/powerpoint/2010/main" w="9525">
+                <a14:hiddenLine xmlns:p14="http://schemas.microsoft.com/office/powerpoint/2010/main" xmlns:a14="http://schemas.microsoft.com/office/drawing/2010/main" xmlns:a16="http://schemas.microsoft.com/office/drawing/2014/main" xmlns="" w="9525">
                   <a:solidFill>
                     <a:srgbClr val="000000"/>
                   </a:solidFill>
@@ -30662,7 +30695,7 @@
             </a:ln>
             <a:extLst>
               <a:ext uri="{91240B29-F687-4f45-9708-019B960494DF}">
-                <a14:hiddenLine xmlns="" xmlns:a16="http://schemas.microsoft.com/office/drawing/2014/main" xmlns:a14="http://schemas.microsoft.com/office/drawing/2010/main" xmlns:p14="http://schemas.microsoft.com/office/powerpoint/2010/main" w="9525">
+                <a14:hiddenLine xmlns:p14="http://schemas.microsoft.com/office/powerpoint/2010/main" xmlns:a14="http://schemas.microsoft.com/office/drawing/2010/main" xmlns:a16="http://schemas.microsoft.com/office/drawing/2014/main" xmlns="" w="9525">
                   <a:solidFill>
                     <a:srgbClr val="000000"/>
                   </a:solidFill>
@@ -30746,7 +30779,7 @@
             </a:ln>
             <a:extLst>
               <a:ext uri="{91240B29-F687-4f45-9708-019B960494DF}">
-                <a14:hiddenLine xmlns="" xmlns:a16="http://schemas.microsoft.com/office/drawing/2014/main" xmlns:a14="http://schemas.microsoft.com/office/drawing/2010/main" xmlns:p14="http://schemas.microsoft.com/office/powerpoint/2010/main" w="9525">
+                <a14:hiddenLine xmlns:p14="http://schemas.microsoft.com/office/powerpoint/2010/main" xmlns:a14="http://schemas.microsoft.com/office/drawing/2010/main" xmlns:a16="http://schemas.microsoft.com/office/drawing/2014/main" xmlns="" w="9525">
                   <a:solidFill>
                     <a:srgbClr val="000000"/>
                   </a:solidFill>
@@ -30878,7 +30911,7 @@
             </a:ln>
             <a:extLst>
               <a:ext uri="{91240B29-F687-4f45-9708-019B960494DF}">
-                <a14:hiddenLine xmlns="" xmlns:a16="http://schemas.microsoft.com/office/drawing/2014/main" xmlns:a14="http://schemas.microsoft.com/office/drawing/2010/main" xmlns:p14="http://schemas.microsoft.com/office/powerpoint/2010/main" w="9525">
+                <a14:hiddenLine xmlns:p14="http://schemas.microsoft.com/office/powerpoint/2010/main" xmlns:a14="http://schemas.microsoft.com/office/drawing/2010/main" xmlns:a16="http://schemas.microsoft.com/office/drawing/2014/main" xmlns="" w="9525">
                   <a:solidFill>
                     <a:srgbClr val="000000"/>
                   </a:solidFill>
@@ -30962,7 +30995,7 @@
             </a:ln>
             <a:extLst>
               <a:ext uri="{91240B29-F687-4f45-9708-019B960494DF}">
-                <a14:hiddenLine xmlns="" xmlns:a16="http://schemas.microsoft.com/office/drawing/2014/main" xmlns:a14="http://schemas.microsoft.com/office/drawing/2010/main" xmlns:p14="http://schemas.microsoft.com/office/powerpoint/2010/main" w="9525">
+                <a14:hiddenLine xmlns:p14="http://schemas.microsoft.com/office/powerpoint/2010/main" xmlns:a14="http://schemas.microsoft.com/office/drawing/2010/main" xmlns:a16="http://schemas.microsoft.com/office/drawing/2014/main" xmlns="" w="9525">
                   <a:solidFill>
                     <a:srgbClr val="000000"/>
                   </a:solidFill>
@@ -31074,7 +31107,7 @@
             </a:ln>
             <a:extLst>
               <a:ext uri="{91240B29-F687-4f45-9708-019B960494DF}">
-                <a14:hiddenLine xmlns="" xmlns:a16="http://schemas.microsoft.com/office/drawing/2014/main" xmlns:a14="http://schemas.microsoft.com/office/drawing/2010/main" xmlns:p14="http://schemas.microsoft.com/office/powerpoint/2010/main" w="9525">
+                <a14:hiddenLine xmlns:p14="http://schemas.microsoft.com/office/powerpoint/2010/main" xmlns:a14="http://schemas.microsoft.com/office/drawing/2010/main" xmlns:a16="http://schemas.microsoft.com/office/drawing/2014/main" xmlns="" w="9525">
                   <a:solidFill>
                     <a:srgbClr val="000000"/>
                   </a:solidFill>
@@ -31186,7 +31219,7 @@
             </a:ln>
             <a:extLst>
               <a:ext uri="{91240B29-F687-4f45-9708-019B960494DF}">
-                <a14:hiddenLine xmlns="" xmlns:a16="http://schemas.microsoft.com/office/drawing/2014/main" xmlns:a14="http://schemas.microsoft.com/office/drawing/2010/main" xmlns:p14="http://schemas.microsoft.com/office/powerpoint/2010/main" w="9525">
+                <a14:hiddenLine xmlns:p14="http://schemas.microsoft.com/office/powerpoint/2010/main" xmlns:a14="http://schemas.microsoft.com/office/drawing/2010/main" xmlns:a16="http://schemas.microsoft.com/office/drawing/2014/main" xmlns="" w="9525">
                   <a:solidFill>
                     <a:srgbClr val="000000"/>
                   </a:solidFill>
@@ -31270,7 +31303,7 @@
             </a:ln>
             <a:extLst>
               <a:ext uri="{91240B29-F687-4f45-9708-019B960494DF}">
-                <a14:hiddenLine xmlns="" xmlns:a16="http://schemas.microsoft.com/office/drawing/2014/main" xmlns:a14="http://schemas.microsoft.com/office/drawing/2010/main" xmlns:p14="http://schemas.microsoft.com/office/powerpoint/2010/main" w="9525">
+                <a14:hiddenLine xmlns:p14="http://schemas.microsoft.com/office/powerpoint/2010/main" xmlns:a14="http://schemas.microsoft.com/office/drawing/2010/main" xmlns:a16="http://schemas.microsoft.com/office/drawing/2014/main" xmlns="" w="9525">
                   <a:solidFill>
                     <a:srgbClr val="000000"/>
                   </a:solidFill>
@@ -31382,7 +31415,7 @@
             </a:ln>
             <a:extLst>
               <a:ext uri="{91240B29-F687-4f45-9708-019B960494DF}">
-                <a14:hiddenLine xmlns="" xmlns:a16="http://schemas.microsoft.com/office/drawing/2014/main" xmlns:a14="http://schemas.microsoft.com/office/drawing/2010/main" xmlns:p14="http://schemas.microsoft.com/office/powerpoint/2010/main" w="9525">
+                <a14:hiddenLine xmlns:p14="http://schemas.microsoft.com/office/powerpoint/2010/main" xmlns:a14="http://schemas.microsoft.com/office/drawing/2010/main" xmlns:a16="http://schemas.microsoft.com/office/drawing/2014/main" xmlns="" w="9525">
                   <a:solidFill>
                     <a:srgbClr val="000000"/>
                   </a:solidFill>
@@ -31494,7 +31527,7 @@
             </a:ln>
             <a:extLst>
               <a:ext uri="{91240B29-F687-4f45-9708-019B960494DF}">
-                <a14:hiddenLine xmlns="" xmlns:a16="http://schemas.microsoft.com/office/drawing/2014/main" xmlns:a14="http://schemas.microsoft.com/office/drawing/2010/main" xmlns:p14="http://schemas.microsoft.com/office/powerpoint/2010/main" w="9525">
+                <a14:hiddenLine xmlns:p14="http://schemas.microsoft.com/office/powerpoint/2010/main" xmlns:a14="http://schemas.microsoft.com/office/drawing/2010/main" xmlns:a16="http://schemas.microsoft.com/office/drawing/2014/main" xmlns="" w="9525">
                   <a:solidFill>
                     <a:srgbClr val="000000"/>
                   </a:solidFill>
@@ -31572,7 +31605,7 @@
             </a:ln>
             <a:extLst>
               <a:ext uri="{91240B29-F687-4f45-9708-019B960494DF}">
-                <a14:hiddenLine xmlns="" xmlns:a16="http://schemas.microsoft.com/office/drawing/2014/main" xmlns:a14="http://schemas.microsoft.com/office/drawing/2010/main" xmlns:p14="http://schemas.microsoft.com/office/powerpoint/2010/main" w="9525">
+                <a14:hiddenLine xmlns:p14="http://schemas.microsoft.com/office/powerpoint/2010/main" xmlns:a14="http://schemas.microsoft.com/office/drawing/2010/main" xmlns:a16="http://schemas.microsoft.com/office/drawing/2014/main" xmlns="" w="9525">
                   <a:solidFill>
                     <a:srgbClr val="000000"/>
                   </a:solidFill>
@@ -31684,7 +31717,7 @@
             </a:ln>
             <a:extLst>
               <a:ext uri="{91240B29-F687-4f45-9708-019B960494DF}">
-                <a14:hiddenLine xmlns="" xmlns:a16="http://schemas.microsoft.com/office/drawing/2014/main" xmlns:a14="http://schemas.microsoft.com/office/drawing/2010/main" xmlns:p14="http://schemas.microsoft.com/office/powerpoint/2010/main" w="9525">
+                <a14:hiddenLine xmlns:p14="http://schemas.microsoft.com/office/powerpoint/2010/main" xmlns:a14="http://schemas.microsoft.com/office/drawing/2010/main" xmlns:a16="http://schemas.microsoft.com/office/drawing/2014/main" xmlns="" w="9525">
                   <a:solidFill>
                     <a:srgbClr val="000000"/>
                   </a:solidFill>
@@ -31762,7 +31795,7 @@
             </a:ln>
             <a:extLst>
               <a:ext uri="{91240B29-F687-4f45-9708-019B960494DF}">
-                <a14:hiddenLine xmlns="" xmlns:a16="http://schemas.microsoft.com/office/drawing/2014/main" xmlns:a14="http://schemas.microsoft.com/office/drawing/2010/main" xmlns:p14="http://schemas.microsoft.com/office/powerpoint/2010/main" w="9525">
+                <a14:hiddenLine xmlns:p14="http://schemas.microsoft.com/office/powerpoint/2010/main" xmlns:a14="http://schemas.microsoft.com/office/drawing/2010/main" xmlns:a16="http://schemas.microsoft.com/office/drawing/2014/main" xmlns="" w="9525">
                   <a:solidFill>
                     <a:srgbClr val="000000"/>
                   </a:solidFill>
@@ -31874,7 +31907,7 @@
             </a:ln>
             <a:extLst>
               <a:ext uri="{91240B29-F687-4f45-9708-019B960494DF}">
-                <a14:hiddenLine xmlns="" xmlns:a16="http://schemas.microsoft.com/office/drawing/2014/main" xmlns:a14="http://schemas.microsoft.com/office/drawing/2010/main" xmlns:p14="http://schemas.microsoft.com/office/powerpoint/2010/main" w="9525">
+                <a14:hiddenLine xmlns:p14="http://schemas.microsoft.com/office/powerpoint/2010/main" xmlns:a14="http://schemas.microsoft.com/office/drawing/2010/main" xmlns:a16="http://schemas.microsoft.com/office/drawing/2014/main" xmlns="" w="9525">
                   <a:solidFill>
                     <a:srgbClr val="000000"/>
                   </a:solidFill>
@@ -31964,7 +31997,7 @@
             </a:ln>
             <a:extLst>
               <a:ext uri="{91240B29-F687-4f45-9708-019B960494DF}">
-                <a14:hiddenLine xmlns="" xmlns:a16="http://schemas.microsoft.com/office/drawing/2014/main" xmlns:a14="http://schemas.microsoft.com/office/drawing/2010/main" xmlns:p14="http://schemas.microsoft.com/office/powerpoint/2010/main" w="9525">
+                <a14:hiddenLine xmlns:p14="http://schemas.microsoft.com/office/powerpoint/2010/main" xmlns:a14="http://schemas.microsoft.com/office/drawing/2010/main" xmlns:a16="http://schemas.microsoft.com/office/drawing/2014/main" xmlns="" w="9525">
                   <a:solidFill>
                     <a:srgbClr val="000000"/>
                   </a:solidFill>
@@ -32076,7 +32109,7 @@
             </a:ln>
             <a:extLst>
               <a:ext uri="{91240B29-F687-4f45-9708-019B960494DF}">
-                <a14:hiddenLine xmlns="" xmlns:a16="http://schemas.microsoft.com/office/drawing/2014/main" xmlns:a14="http://schemas.microsoft.com/office/drawing/2010/main" xmlns:p14="http://schemas.microsoft.com/office/powerpoint/2010/main" w="9525">
+                <a14:hiddenLine xmlns:p14="http://schemas.microsoft.com/office/powerpoint/2010/main" xmlns:a14="http://schemas.microsoft.com/office/drawing/2010/main" xmlns:a16="http://schemas.microsoft.com/office/drawing/2014/main" xmlns="" w="9525">
                   <a:solidFill>
                     <a:srgbClr val="000000"/>
                   </a:solidFill>
@@ -32166,7 +32199,7 @@
             </a:ln>
             <a:extLst>
               <a:ext uri="{91240B29-F687-4f45-9708-019B960494DF}">
-                <a14:hiddenLine xmlns="" xmlns:a16="http://schemas.microsoft.com/office/drawing/2014/main" xmlns:a14="http://schemas.microsoft.com/office/drawing/2010/main" xmlns:p14="http://schemas.microsoft.com/office/powerpoint/2010/main" w="9525">
+                <a14:hiddenLine xmlns:p14="http://schemas.microsoft.com/office/powerpoint/2010/main" xmlns:a14="http://schemas.microsoft.com/office/drawing/2010/main" xmlns:a16="http://schemas.microsoft.com/office/drawing/2014/main" xmlns="" w="9525">
                   <a:solidFill>
                     <a:srgbClr val="000000"/>
                   </a:solidFill>
@@ -32278,7 +32311,7 @@
             </a:ln>
             <a:extLst>
               <a:ext uri="{91240B29-F687-4f45-9708-019B960494DF}">
-                <a14:hiddenLine xmlns="" xmlns:a16="http://schemas.microsoft.com/office/drawing/2014/main" xmlns:a14="http://schemas.microsoft.com/office/drawing/2010/main" xmlns:p14="http://schemas.microsoft.com/office/powerpoint/2010/main" w="9525">
+                <a14:hiddenLine xmlns:p14="http://schemas.microsoft.com/office/powerpoint/2010/main" xmlns:a14="http://schemas.microsoft.com/office/drawing/2010/main" xmlns:a16="http://schemas.microsoft.com/office/drawing/2014/main" xmlns="" w="9525">
                   <a:solidFill>
                     <a:srgbClr val="000000"/>
                   </a:solidFill>
@@ -32334,7 +32367,7 @@
             </a:ln>
             <a:extLst>
               <a:ext uri="{91240B29-F687-4f45-9708-019B960494DF}">
-                <a14:hiddenLine xmlns="" xmlns:a16="http://schemas.microsoft.com/office/drawing/2014/main" xmlns:a14="http://schemas.microsoft.com/office/drawing/2010/main" xmlns:p14="http://schemas.microsoft.com/office/powerpoint/2010/main" w="9525">
+                <a14:hiddenLine xmlns:p14="http://schemas.microsoft.com/office/powerpoint/2010/main" xmlns:a14="http://schemas.microsoft.com/office/drawing/2010/main" xmlns:a16="http://schemas.microsoft.com/office/drawing/2014/main" xmlns="" w="9525">
                   <a:solidFill>
                     <a:srgbClr val="000000"/>
                   </a:solidFill>
@@ -32446,7 +32479,7 @@
             </a:ln>
             <a:extLst>
               <a:ext uri="{91240B29-F687-4f45-9708-019B960494DF}">
-                <a14:hiddenLine xmlns="" xmlns:a16="http://schemas.microsoft.com/office/drawing/2014/main" xmlns:a14="http://schemas.microsoft.com/office/drawing/2010/main" xmlns:p14="http://schemas.microsoft.com/office/powerpoint/2010/main" w="9525">
+                <a14:hiddenLine xmlns:p14="http://schemas.microsoft.com/office/powerpoint/2010/main" xmlns:a14="http://schemas.microsoft.com/office/drawing/2010/main" xmlns:a16="http://schemas.microsoft.com/office/drawing/2014/main" xmlns="" w="9525">
                   <a:solidFill>
                     <a:srgbClr val="000000"/>
                   </a:solidFill>
@@ -32530,7 +32563,7 @@
             </a:ln>
             <a:extLst>
               <a:ext uri="{91240B29-F687-4f45-9708-019B960494DF}">
-                <a14:hiddenLine xmlns="" xmlns:a16="http://schemas.microsoft.com/office/drawing/2014/main" xmlns:a14="http://schemas.microsoft.com/office/drawing/2010/main" xmlns:p14="http://schemas.microsoft.com/office/powerpoint/2010/main" w="9525">
+                <a14:hiddenLine xmlns:p14="http://schemas.microsoft.com/office/powerpoint/2010/main" xmlns:a14="http://schemas.microsoft.com/office/drawing/2010/main" xmlns:a16="http://schemas.microsoft.com/office/drawing/2014/main" xmlns="" w="9525">
                   <a:solidFill>
                     <a:srgbClr val="000000"/>
                   </a:solidFill>
@@ -32614,7 +32647,7 @@
             </a:ln>
             <a:extLst>
               <a:ext uri="{91240B29-F687-4f45-9708-019B960494DF}">
-                <a14:hiddenLine xmlns="" xmlns:a16="http://schemas.microsoft.com/office/drawing/2014/main" xmlns:a14="http://schemas.microsoft.com/office/drawing/2010/main" xmlns:p14="http://schemas.microsoft.com/office/powerpoint/2010/main" w="9525">
+                <a14:hiddenLine xmlns:p14="http://schemas.microsoft.com/office/powerpoint/2010/main" xmlns:a14="http://schemas.microsoft.com/office/drawing/2010/main" xmlns:a16="http://schemas.microsoft.com/office/drawing/2014/main" xmlns="" w="9525">
                   <a:solidFill>
                     <a:srgbClr val="000000"/>
                   </a:solidFill>
@@ -32726,7 +32759,7 @@
             </a:ln>
             <a:extLst>
               <a:ext uri="{91240B29-F687-4f45-9708-019B960494DF}">
-                <a14:hiddenLine xmlns="" xmlns:a16="http://schemas.microsoft.com/office/drawing/2014/main" xmlns:a14="http://schemas.microsoft.com/office/drawing/2010/main" xmlns:p14="http://schemas.microsoft.com/office/powerpoint/2010/main" w="9525">
+                <a14:hiddenLine xmlns:p14="http://schemas.microsoft.com/office/powerpoint/2010/main" xmlns:a14="http://schemas.microsoft.com/office/drawing/2010/main" xmlns:a16="http://schemas.microsoft.com/office/drawing/2014/main" xmlns="" w="9525">
                   <a:solidFill>
                     <a:srgbClr val="000000"/>
                   </a:solidFill>
@@ -32816,7 +32849,7 @@
             </a:ln>
             <a:extLst>
               <a:ext uri="{91240B29-F687-4f45-9708-019B960494DF}">
-                <a14:hiddenLine xmlns="" xmlns:a16="http://schemas.microsoft.com/office/drawing/2014/main" xmlns:a14="http://schemas.microsoft.com/office/drawing/2010/main" xmlns:p14="http://schemas.microsoft.com/office/powerpoint/2010/main" w="9525">
+                <a14:hiddenLine xmlns:p14="http://schemas.microsoft.com/office/powerpoint/2010/main" xmlns:a14="http://schemas.microsoft.com/office/drawing/2010/main" xmlns:a16="http://schemas.microsoft.com/office/drawing/2014/main" xmlns="" w="9525">
                   <a:solidFill>
                     <a:srgbClr val="000000"/>
                   </a:solidFill>
@@ -32900,7 +32933,7 @@
             </a:ln>
             <a:extLst>
               <a:ext uri="{91240B29-F687-4f45-9708-019B960494DF}">
-                <a14:hiddenLine xmlns="" xmlns:a16="http://schemas.microsoft.com/office/drawing/2014/main" xmlns:a14="http://schemas.microsoft.com/office/drawing/2010/main" xmlns:p14="http://schemas.microsoft.com/office/powerpoint/2010/main" w="9525">
+                <a14:hiddenLine xmlns:p14="http://schemas.microsoft.com/office/powerpoint/2010/main" xmlns:a14="http://schemas.microsoft.com/office/drawing/2010/main" xmlns:a16="http://schemas.microsoft.com/office/drawing/2014/main" xmlns="" w="9525">
                   <a:solidFill>
                     <a:srgbClr val="000000"/>
                   </a:solidFill>
@@ -33012,7 +33045,7 @@
             </a:ln>
             <a:extLst>
               <a:ext uri="{91240B29-F687-4f45-9708-019B960494DF}">
-                <a14:hiddenLine xmlns="" xmlns:a16="http://schemas.microsoft.com/office/drawing/2014/main" xmlns:a14="http://schemas.microsoft.com/office/drawing/2010/main" xmlns:p14="http://schemas.microsoft.com/office/powerpoint/2010/main" w="9525">
+                <a14:hiddenLine xmlns:p14="http://schemas.microsoft.com/office/powerpoint/2010/main" xmlns:a14="http://schemas.microsoft.com/office/drawing/2010/main" xmlns:a16="http://schemas.microsoft.com/office/drawing/2014/main" xmlns="" w="9525">
                   <a:solidFill>
                     <a:srgbClr val="000000"/>
                   </a:solidFill>
@@ -33096,7 +33129,7 @@
             </a:ln>
             <a:extLst>
               <a:ext uri="{91240B29-F687-4f45-9708-019B960494DF}">
-                <a14:hiddenLine xmlns="" xmlns:a16="http://schemas.microsoft.com/office/drawing/2014/main" xmlns:a14="http://schemas.microsoft.com/office/drawing/2010/main" xmlns:p14="http://schemas.microsoft.com/office/powerpoint/2010/main" w="9525">
+                <a14:hiddenLine xmlns:p14="http://schemas.microsoft.com/office/powerpoint/2010/main" xmlns:a14="http://schemas.microsoft.com/office/drawing/2010/main" xmlns:a16="http://schemas.microsoft.com/office/drawing/2014/main" xmlns="" w="9525">
                   <a:solidFill>
                     <a:srgbClr val="000000"/>
                   </a:solidFill>
@@ -33208,7 +33241,7 @@
             </a:ln>
             <a:extLst>
               <a:ext uri="{91240B29-F687-4f45-9708-019B960494DF}">
-                <a14:hiddenLine xmlns="" xmlns:a16="http://schemas.microsoft.com/office/drawing/2014/main" xmlns:a14="http://schemas.microsoft.com/office/drawing/2010/main" xmlns:p14="http://schemas.microsoft.com/office/powerpoint/2010/main" w="9525">
+                <a14:hiddenLine xmlns:p14="http://schemas.microsoft.com/office/powerpoint/2010/main" xmlns:a14="http://schemas.microsoft.com/office/drawing/2010/main" xmlns:a16="http://schemas.microsoft.com/office/drawing/2014/main" xmlns="" w="9525">
                   <a:solidFill>
                     <a:srgbClr val="000000"/>
                   </a:solidFill>
@@ -33292,7 +33325,7 @@
             </a:ln>
             <a:extLst>
               <a:ext uri="{91240B29-F687-4f45-9708-019B960494DF}">
-                <a14:hiddenLine xmlns="" xmlns:a16="http://schemas.microsoft.com/office/drawing/2014/main" xmlns:a14="http://schemas.microsoft.com/office/drawing/2010/main" xmlns:p14="http://schemas.microsoft.com/office/powerpoint/2010/main" w="9525">
+                <a14:hiddenLine xmlns:p14="http://schemas.microsoft.com/office/powerpoint/2010/main" xmlns:a14="http://schemas.microsoft.com/office/drawing/2010/main" xmlns:a16="http://schemas.microsoft.com/office/drawing/2014/main" xmlns="" w="9525">
                   <a:solidFill>
                     <a:srgbClr val="000000"/>
                   </a:solidFill>
@@ -33404,7 +33437,7 @@
             </a:ln>
             <a:extLst>
               <a:ext uri="{91240B29-F687-4f45-9708-019B960494DF}">
-                <a14:hiddenLine xmlns="" xmlns:a16="http://schemas.microsoft.com/office/drawing/2014/main" xmlns:a14="http://schemas.microsoft.com/office/drawing/2010/main" xmlns:p14="http://schemas.microsoft.com/office/powerpoint/2010/main" w="9525">
+                <a14:hiddenLine xmlns:p14="http://schemas.microsoft.com/office/powerpoint/2010/main" xmlns:a14="http://schemas.microsoft.com/office/drawing/2010/main" xmlns:a16="http://schemas.microsoft.com/office/drawing/2014/main" xmlns="" w="9525">
                   <a:solidFill>
                     <a:srgbClr val="000000"/>
                   </a:solidFill>
@@ -33460,7 +33493,7 @@
             </a:ln>
             <a:extLst>
               <a:ext uri="{91240B29-F687-4f45-9708-019B960494DF}">
-                <a14:hiddenLine xmlns="" xmlns:a16="http://schemas.microsoft.com/office/drawing/2014/main" xmlns:a14="http://schemas.microsoft.com/office/drawing/2010/main" xmlns:p14="http://schemas.microsoft.com/office/powerpoint/2010/main" w="9525">
+                <a14:hiddenLine xmlns:p14="http://schemas.microsoft.com/office/powerpoint/2010/main" xmlns:a14="http://schemas.microsoft.com/office/drawing/2010/main" xmlns:a16="http://schemas.microsoft.com/office/drawing/2014/main" xmlns="" w="9525">
                   <a:solidFill>
                     <a:srgbClr val="000000"/>
                   </a:solidFill>
@@ -33547,7 +33580,7 @@
             </a:ln>
             <a:extLst>
               <a:ext uri="{91240B29-F687-4f45-9708-019B960494DF}">
-                <a14:hiddenLine xmlns="" xmlns:a16="http://schemas.microsoft.com/office/drawing/2014/main" xmlns:a14="http://schemas.microsoft.com/office/drawing/2010/main" xmlns:p14="http://schemas.microsoft.com/office/powerpoint/2010/main" w="9525">
+                <a14:hiddenLine xmlns:p14="http://schemas.microsoft.com/office/powerpoint/2010/main" xmlns:a14="http://schemas.microsoft.com/office/drawing/2010/main" xmlns:a16="http://schemas.microsoft.com/office/drawing/2014/main" xmlns="" w="9525">
                   <a:solidFill>
                     <a:srgbClr val="000000"/>
                   </a:solidFill>
@@ -33659,7 +33692,7 @@
             </a:ln>
             <a:extLst>
               <a:ext uri="{91240B29-F687-4f45-9708-019B960494DF}">
-                <a14:hiddenLine xmlns="" xmlns:a16="http://schemas.microsoft.com/office/drawing/2014/main" xmlns:a14="http://schemas.microsoft.com/office/drawing/2010/main" xmlns:p14="http://schemas.microsoft.com/office/powerpoint/2010/main" w="9525">
+                <a14:hiddenLine xmlns:p14="http://schemas.microsoft.com/office/powerpoint/2010/main" xmlns:a14="http://schemas.microsoft.com/office/drawing/2010/main" xmlns:a16="http://schemas.microsoft.com/office/drawing/2014/main" xmlns="" w="9525">
                   <a:solidFill>
                     <a:srgbClr val="000000"/>
                   </a:solidFill>
@@ -33743,7 +33776,7 @@
             </a:ln>
             <a:extLst>
               <a:ext uri="{91240B29-F687-4f45-9708-019B960494DF}">
-                <a14:hiddenLine xmlns="" xmlns:a16="http://schemas.microsoft.com/office/drawing/2014/main" xmlns:a14="http://schemas.microsoft.com/office/drawing/2010/main" xmlns:p14="http://schemas.microsoft.com/office/powerpoint/2010/main" w="9525">
+                <a14:hiddenLine xmlns:p14="http://schemas.microsoft.com/office/powerpoint/2010/main" xmlns:a14="http://schemas.microsoft.com/office/drawing/2010/main" xmlns:a16="http://schemas.microsoft.com/office/drawing/2014/main" xmlns="" w="9525">
                   <a:solidFill>
                     <a:srgbClr val="000000"/>
                   </a:solidFill>
@@ -33855,7 +33888,7 @@
             </a:ln>
             <a:extLst>
               <a:ext uri="{91240B29-F687-4f45-9708-019B960494DF}">
-                <a14:hiddenLine xmlns="" xmlns:a16="http://schemas.microsoft.com/office/drawing/2014/main" xmlns:a14="http://schemas.microsoft.com/office/drawing/2010/main" xmlns:p14="http://schemas.microsoft.com/office/powerpoint/2010/main" w="9525">
+                <a14:hiddenLine xmlns:p14="http://schemas.microsoft.com/office/powerpoint/2010/main" xmlns:a14="http://schemas.microsoft.com/office/drawing/2010/main" xmlns:a16="http://schemas.microsoft.com/office/drawing/2014/main" xmlns="" w="9525">
                   <a:solidFill>
                     <a:srgbClr val="000000"/>
                   </a:solidFill>
@@ -33967,7 +34000,7 @@
             </a:ln>
             <a:extLst>
               <a:ext uri="{91240B29-F687-4f45-9708-019B960494DF}">
-                <a14:hiddenLine xmlns="" xmlns:a16="http://schemas.microsoft.com/office/drawing/2014/main" xmlns:a14="http://schemas.microsoft.com/office/drawing/2010/main" xmlns:p14="http://schemas.microsoft.com/office/powerpoint/2010/main" w="9525">
+                <a14:hiddenLine xmlns:p14="http://schemas.microsoft.com/office/powerpoint/2010/main" xmlns:a14="http://schemas.microsoft.com/office/drawing/2010/main" xmlns:a16="http://schemas.microsoft.com/office/drawing/2014/main" xmlns="" w="9525">
                   <a:solidFill>
                     <a:srgbClr val="000000"/>
                   </a:solidFill>
@@ -34054,7 +34087,7 @@
             </a:ln>
             <a:extLst>
               <a:ext uri="{91240B29-F687-4f45-9708-019B960494DF}">
-                <a14:hiddenLine xmlns="" xmlns:a16="http://schemas.microsoft.com/office/drawing/2014/main" xmlns:a14="http://schemas.microsoft.com/office/drawing/2010/main" xmlns:p14="http://schemas.microsoft.com/office/powerpoint/2010/main" w="9525">
+                <a14:hiddenLine xmlns:p14="http://schemas.microsoft.com/office/powerpoint/2010/main" xmlns:a14="http://schemas.microsoft.com/office/drawing/2010/main" xmlns:a16="http://schemas.microsoft.com/office/drawing/2014/main" xmlns="" w="9525">
                   <a:solidFill>
                     <a:srgbClr val="000000"/>
                   </a:solidFill>
@@ -34138,7 +34171,7 @@
             </a:ln>
             <a:extLst>
               <a:ext uri="{91240B29-F687-4f45-9708-019B960494DF}">
-                <a14:hiddenLine xmlns="" xmlns:a16="http://schemas.microsoft.com/office/drawing/2014/main" xmlns:a14="http://schemas.microsoft.com/office/drawing/2010/main" xmlns:p14="http://schemas.microsoft.com/office/powerpoint/2010/main" w="9525">
+                <a14:hiddenLine xmlns:p14="http://schemas.microsoft.com/office/powerpoint/2010/main" xmlns:a14="http://schemas.microsoft.com/office/drawing/2010/main" xmlns:a16="http://schemas.microsoft.com/office/drawing/2014/main" xmlns="" w="9525">
                   <a:solidFill>
                     <a:srgbClr val="000000"/>
                   </a:solidFill>
@@ -34250,7 +34283,7 @@
             </a:ln>
             <a:extLst>
               <a:ext uri="{91240B29-F687-4f45-9708-019B960494DF}">
-                <a14:hiddenLine xmlns="" xmlns:a16="http://schemas.microsoft.com/office/drawing/2014/main" xmlns:a14="http://schemas.microsoft.com/office/drawing/2010/main" xmlns:p14="http://schemas.microsoft.com/office/powerpoint/2010/main" w="9525">
+                <a14:hiddenLine xmlns:p14="http://schemas.microsoft.com/office/powerpoint/2010/main" xmlns:a14="http://schemas.microsoft.com/office/drawing/2010/main" xmlns:a16="http://schemas.microsoft.com/office/drawing/2014/main" xmlns="" w="9525">
                   <a:solidFill>
                     <a:srgbClr val="000000"/>
                   </a:solidFill>
@@ -34362,7 +34395,7 @@
             </a:ln>
             <a:extLst>
               <a:ext uri="{91240B29-F687-4f45-9708-019B960494DF}">
-                <a14:hiddenLine xmlns="" xmlns:a16="http://schemas.microsoft.com/office/drawing/2014/main" xmlns:a14="http://schemas.microsoft.com/office/drawing/2010/main" xmlns:p14="http://schemas.microsoft.com/office/powerpoint/2010/main" w="9525">
+                <a14:hiddenLine xmlns:p14="http://schemas.microsoft.com/office/powerpoint/2010/main" xmlns:a14="http://schemas.microsoft.com/office/drawing/2010/main" xmlns:a16="http://schemas.microsoft.com/office/drawing/2014/main" xmlns="" w="9525">
                   <a:solidFill>
                     <a:srgbClr val="000000"/>
                   </a:solidFill>
@@ -34446,7 +34479,7 @@
             </a:ln>
             <a:extLst>
               <a:ext uri="{91240B29-F687-4f45-9708-019B960494DF}">
-                <a14:hiddenLine xmlns="" xmlns:a16="http://schemas.microsoft.com/office/drawing/2014/main" xmlns:a14="http://schemas.microsoft.com/office/drawing/2010/main" xmlns:p14="http://schemas.microsoft.com/office/powerpoint/2010/main" w="9525">
+                <a14:hiddenLine xmlns:p14="http://schemas.microsoft.com/office/powerpoint/2010/main" xmlns:a14="http://schemas.microsoft.com/office/drawing/2010/main" xmlns:a16="http://schemas.microsoft.com/office/drawing/2014/main" xmlns="" w="9525">
                   <a:solidFill>
                     <a:srgbClr val="000000"/>
                   </a:solidFill>
@@ -34588,7 +34621,7 @@
             </a:ln>
             <a:extLst>
               <a:ext uri="{91240B29-F687-4f45-9708-019B960494DF}">
-                <a14:hiddenLine xmlns="" xmlns:a16="http://schemas.microsoft.com/office/drawing/2014/main" xmlns:a14="http://schemas.microsoft.com/office/drawing/2010/main" xmlns:p14="http://schemas.microsoft.com/office/powerpoint/2010/main" w="9525">
+                <a14:hiddenLine xmlns:p14="http://schemas.microsoft.com/office/powerpoint/2010/main" xmlns:a14="http://schemas.microsoft.com/office/drawing/2010/main" xmlns:a16="http://schemas.microsoft.com/office/drawing/2014/main" xmlns="" w="9525">
                   <a:solidFill>
                     <a:srgbClr val="000000"/>
                   </a:solidFill>
@@ -34678,7 +34711,7 @@
             </a:ln>
             <a:extLst>
               <a:ext uri="{91240B29-F687-4f45-9708-019B960494DF}">
-                <a14:hiddenLine xmlns="" xmlns:a16="http://schemas.microsoft.com/office/drawing/2014/main" xmlns:a14="http://schemas.microsoft.com/office/drawing/2010/main" xmlns:p14="http://schemas.microsoft.com/office/powerpoint/2010/main" w="9525">
+                <a14:hiddenLine xmlns:p14="http://schemas.microsoft.com/office/powerpoint/2010/main" xmlns:a14="http://schemas.microsoft.com/office/drawing/2010/main" xmlns:a16="http://schemas.microsoft.com/office/drawing/2014/main" xmlns="" w="9525">
                   <a:solidFill>
                     <a:srgbClr val="000000"/>
                   </a:solidFill>
@@ -34790,7 +34823,7 @@
             </a:ln>
             <a:extLst>
               <a:ext uri="{91240B29-F687-4f45-9708-019B960494DF}">
-                <a14:hiddenLine xmlns="" xmlns:a16="http://schemas.microsoft.com/office/drawing/2014/main" xmlns:a14="http://schemas.microsoft.com/office/drawing/2010/main" xmlns:p14="http://schemas.microsoft.com/office/powerpoint/2010/main" w="9525">
+                <a14:hiddenLine xmlns:p14="http://schemas.microsoft.com/office/powerpoint/2010/main" xmlns:a14="http://schemas.microsoft.com/office/drawing/2010/main" xmlns:a16="http://schemas.microsoft.com/office/drawing/2014/main" xmlns="" w="9525">
                   <a:solidFill>
                     <a:srgbClr val="000000"/>
                   </a:solidFill>
@@ -35077,7 +35110,7 @@
             <a:noFill/>
             <a:extLst>
               <a:ext uri="{909E8E84-426E-40dd-AFC4-6F175D3DCCD1}">
-                <a14:hiddenFill xmlns="" xmlns:a16="http://schemas.microsoft.com/office/drawing/2014/main" xmlns:a14="http://schemas.microsoft.com/office/drawing/2010/main" xmlns:p14="http://schemas.microsoft.com/office/powerpoint/2010/main">
+                <a14:hiddenFill xmlns:p14="http://schemas.microsoft.com/office/powerpoint/2010/main" xmlns:a14="http://schemas.microsoft.com/office/drawing/2010/main" xmlns:a16="http://schemas.microsoft.com/office/drawing/2014/main" xmlns="">
                   <a:solidFill>
                     <a:srgbClr val="FFFFFF"/>
                   </a:solidFill>
@@ -35221,7 +35254,7 @@
             </a:ln>
             <a:extLst>
               <a:ext uri="{91240B29-F687-4f45-9708-019B960494DF}">
-                <a14:hiddenLine xmlns="" xmlns:a16="http://schemas.microsoft.com/office/drawing/2014/main" xmlns:a14="http://schemas.microsoft.com/office/drawing/2010/main" xmlns:p14="http://schemas.microsoft.com/office/powerpoint/2010/main" w="9525">
+                <a14:hiddenLine xmlns:p14="http://schemas.microsoft.com/office/powerpoint/2010/main" xmlns:a14="http://schemas.microsoft.com/office/drawing/2010/main" xmlns:a16="http://schemas.microsoft.com/office/drawing/2014/main" xmlns="" w="9525">
                   <a:solidFill>
                     <a:srgbClr val="000000"/>
                   </a:solidFill>
@@ -35333,7 +35366,7 @@
             </a:ln>
             <a:extLst>
               <a:ext uri="{91240B29-F687-4f45-9708-019B960494DF}">
-                <a14:hiddenLine xmlns="" xmlns:a16="http://schemas.microsoft.com/office/drawing/2014/main" xmlns:a14="http://schemas.microsoft.com/office/drawing/2010/main" xmlns:p14="http://schemas.microsoft.com/office/powerpoint/2010/main" w="9525">
+                <a14:hiddenLine xmlns:p14="http://schemas.microsoft.com/office/powerpoint/2010/main" xmlns:a14="http://schemas.microsoft.com/office/drawing/2010/main" xmlns:a16="http://schemas.microsoft.com/office/drawing/2014/main" xmlns="" w="9525">
                   <a:solidFill>
                     <a:srgbClr val="000000"/>
                   </a:solidFill>
@@ -35445,7 +35478,7 @@
             </a:ln>
             <a:extLst>
               <a:ext uri="{91240B29-F687-4f45-9708-019B960494DF}">
-                <a14:hiddenLine xmlns="" xmlns:a16="http://schemas.microsoft.com/office/drawing/2014/main" xmlns:a14="http://schemas.microsoft.com/office/drawing/2010/main" xmlns:p14="http://schemas.microsoft.com/office/powerpoint/2010/main" w="9525">
+                <a14:hiddenLine xmlns:p14="http://schemas.microsoft.com/office/powerpoint/2010/main" xmlns:a14="http://schemas.microsoft.com/office/drawing/2010/main" xmlns:a16="http://schemas.microsoft.com/office/drawing/2014/main" xmlns="" w="9525">
                   <a:solidFill>
                     <a:srgbClr val="000000"/>
                   </a:solidFill>
@@ -35501,7 +35534,7 @@
             </a:ln>
             <a:extLst>
               <a:ext uri="{91240B29-F687-4f45-9708-019B960494DF}">
-                <a14:hiddenLine xmlns="" xmlns:a16="http://schemas.microsoft.com/office/drawing/2014/main" xmlns:a14="http://schemas.microsoft.com/office/drawing/2010/main" xmlns:p14="http://schemas.microsoft.com/office/powerpoint/2010/main" w="9525">
+                <a14:hiddenLine xmlns:p14="http://schemas.microsoft.com/office/powerpoint/2010/main" xmlns:a14="http://schemas.microsoft.com/office/drawing/2010/main" xmlns:a16="http://schemas.microsoft.com/office/drawing/2014/main" xmlns="" w="9525">
                   <a:solidFill>
                     <a:srgbClr val="000000"/>
                   </a:solidFill>
@@ -35613,7 +35646,7 @@
             </a:ln>
             <a:extLst>
               <a:ext uri="{91240B29-F687-4f45-9708-019B960494DF}">
-                <a14:hiddenLine xmlns="" xmlns:a16="http://schemas.microsoft.com/office/drawing/2014/main" xmlns:a14="http://schemas.microsoft.com/office/drawing/2010/main" xmlns:p14="http://schemas.microsoft.com/office/powerpoint/2010/main" w="9525">
+                <a14:hiddenLine xmlns:p14="http://schemas.microsoft.com/office/powerpoint/2010/main" xmlns:a14="http://schemas.microsoft.com/office/drawing/2010/main" xmlns:a16="http://schemas.microsoft.com/office/drawing/2014/main" xmlns="" w="9525">
                   <a:solidFill>
                     <a:srgbClr val="000000"/>
                   </a:solidFill>
@@ -35697,7 +35730,7 @@
             </a:ln>
             <a:extLst>
               <a:ext uri="{91240B29-F687-4f45-9708-019B960494DF}">
-                <a14:hiddenLine xmlns="" xmlns:a16="http://schemas.microsoft.com/office/drawing/2014/main" xmlns:a14="http://schemas.microsoft.com/office/drawing/2010/main" xmlns:p14="http://schemas.microsoft.com/office/powerpoint/2010/main" w="9525">
+                <a14:hiddenLine xmlns:p14="http://schemas.microsoft.com/office/powerpoint/2010/main" xmlns:a14="http://schemas.microsoft.com/office/drawing/2010/main" xmlns:a16="http://schemas.microsoft.com/office/drawing/2014/main" xmlns="" w="9525">
                   <a:solidFill>
                     <a:srgbClr val="000000"/>
                   </a:solidFill>
@@ -35781,7 +35814,7 @@
             </a:ln>
             <a:extLst>
               <a:ext uri="{91240B29-F687-4f45-9708-019B960494DF}">
-                <a14:hiddenLine xmlns="" xmlns:a16="http://schemas.microsoft.com/office/drawing/2014/main" xmlns:a14="http://schemas.microsoft.com/office/drawing/2010/main" xmlns:p14="http://schemas.microsoft.com/office/powerpoint/2010/main" w="9525">
+                <a14:hiddenLine xmlns:p14="http://schemas.microsoft.com/office/powerpoint/2010/main" xmlns:a14="http://schemas.microsoft.com/office/drawing/2010/main" xmlns:a16="http://schemas.microsoft.com/office/drawing/2014/main" xmlns="" w="9525">
                   <a:solidFill>
                     <a:srgbClr val="000000"/>
                   </a:solidFill>
@@ -35893,7 +35926,7 @@
             </a:ln>
             <a:extLst>
               <a:ext uri="{91240B29-F687-4f45-9708-019B960494DF}">
-                <a14:hiddenLine xmlns="" xmlns:a16="http://schemas.microsoft.com/office/drawing/2014/main" xmlns:a14="http://schemas.microsoft.com/office/drawing/2010/main" xmlns:p14="http://schemas.microsoft.com/office/powerpoint/2010/main" w="9525">
+                <a14:hiddenLine xmlns:p14="http://schemas.microsoft.com/office/powerpoint/2010/main" xmlns:a14="http://schemas.microsoft.com/office/drawing/2010/main" xmlns:a16="http://schemas.microsoft.com/office/drawing/2014/main" xmlns="" w="9525">
                   <a:solidFill>
                     <a:srgbClr val="000000"/>
                   </a:solidFill>
@@ -35977,7 +36010,7 @@
             </a:ln>
             <a:extLst>
               <a:ext uri="{91240B29-F687-4f45-9708-019B960494DF}">
-                <a14:hiddenLine xmlns="" xmlns:a16="http://schemas.microsoft.com/office/drawing/2014/main" xmlns:a14="http://schemas.microsoft.com/office/drawing/2010/main" xmlns:p14="http://schemas.microsoft.com/office/powerpoint/2010/main" w="9525">
+                <a14:hiddenLine xmlns:p14="http://schemas.microsoft.com/office/powerpoint/2010/main" xmlns:a14="http://schemas.microsoft.com/office/drawing/2010/main" xmlns:a16="http://schemas.microsoft.com/office/drawing/2014/main" xmlns="" w="9525">
                   <a:solidFill>
                     <a:srgbClr val="000000"/>
                   </a:solidFill>
@@ -36061,7 +36094,7 @@
             </a:ln>
             <a:extLst>
               <a:ext uri="{91240B29-F687-4f45-9708-019B960494DF}">
-                <a14:hiddenLine xmlns="" xmlns:a16="http://schemas.microsoft.com/office/drawing/2014/main" xmlns:a14="http://schemas.microsoft.com/office/drawing/2010/main" xmlns:p14="http://schemas.microsoft.com/office/powerpoint/2010/main" w="9525">
+                <a14:hiddenLine xmlns:p14="http://schemas.microsoft.com/office/powerpoint/2010/main" xmlns:a14="http://schemas.microsoft.com/office/drawing/2010/main" xmlns:a16="http://schemas.microsoft.com/office/drawing/2014/main" xmlns="" w="9525">
                   <a:solidFill>
                     <a:srgbClr val="000000"/>
                   </a:solidFill>
@@ -36173,7 +36206,7 @@
             </a:ln>
             <a:extLst>
               <a:ext uri="{91240B29-F687-4f45-9708-019B960494DF}">
-                <a14:hiddenLine xmlns="" xmlns:a16="http://schemas.microsoft.com/office/drawing/2014/main" xmlns:a14="http://schemas.microsoft.com/office/drawing/2010/main" xmlns:p14="http://schemas.microsoft.com/office/powerpoint/2010/main" w="9525">
+                <a14:hiddenLine xmlns:p14="http://schemas.microsoft.com/office/powerpoint/2010/main" xmlns:a14="http://schemas.microsoft.com/office/drawing/2010/main" xmlns:a16="http://schemas.microsoft.com/office/drawing/2014/main" xmlns="" w="9525">
                   <a:solidFill>
                     <a:srgbClr val="000000"/>
                   </a:solidFill>
@@ -36285,7 +36318,7 @@
             </a:ln>
             <a:extLst>
               <a:ext uri="{91240B29-F687-4f45-9708-019B960494DF}">
-                <a14:hiddenLine xmlns="" xmlns:a16="http://schemas.microsoft.com/office/drawing/2014/main" xmlns:a14="http://schemas.microsoft.com/office/drawing/2010/main" xmlns:p14="http://schemas.microsoft.com/office/powerpoint/2010/main" w="9525">
+                <a14:hiddenLine xmlns:p14="http://schemas.microsoft.com/office/powerpoint/2010/main" xmlns:a14="http://schemas.microsoft.com/office/drawing/2010/main" xmlns:a16="http://schemas.microsoft.com/office/drawing/2014/main" xmlns="" w="9525">
                   <a:solidFill>
                     <a:srgbClr val="000000"/>
                   </a:solidFill>
@@ -36369,7 +36402,7 @@
             </a:ln>
             <a:extLst>
               <a:ext uri="{91240B29-F687-4f45-9708-019B960494DF}">
-                <a14:hiddenLine xmlns="" xmlns:a16="http://schemas.microsoft.com/office/drawing/2014/main" xmlns:a14="http://schemas.microsoft.com/office/drawing/2010/main" xmlns:p14="http://schemas.microsoft.com/office/powerpoint/2010/main" w="9525">
+                <a14:hiddenLine xmlns:p14="http://schemas.microsoft.com/office/powerpoint/2010/main" xmlns:a14="http://schemas.microsoft.com/office/drawing/2010/main" xmlns:a16="http://schemas.microsoft.com/office/drawing/2014/main" xmlns="" w="9525">
                   <a:solidFill>
                     <a:srgbClr val="000000"/>
                   </a:solidFill>
@@ -36501,7 +36534,7 @@
             </a:ln>
             <a:extLst>
               <a:ext uri="{91240B29-F687-4f45-9708-019B960494DF}">
-                <a14:hiddenLine xmlns="" xmlns:a16="http://schemas.microsoft.com/office/drawing/2014/main" xmlns:a14="http://schemas.microsoft.com/office/drawing/2010/main" xmlns:p14="http://schemas.microsoft.com/office/powerpoint/2010/main" w="9525">
+                <a14:hiddenLine xmlns:p14="http://schemas.microsoft.com/office/powerpoint/2010/main" xmlns:a14="http://schemas.microsoft.com/office/drawing/2010/main" xmlns:a16="http://schemas.microsoft.com/office/drawing/2014/main" xmlns="" w="9525">
                   <a:solidFill>
                     <a:srgbClr val="000000"/>
                   </a:solidFill>
@@ -36585,7 +36618,7 @@
             </a:ln>
             <a:extLst>
               <a:ext uri="{91240B29-F687-4f45-9708-019B960494DF}">
-                <a14:hiddenLine xmlns="" xmlns:a16="http://schemas.microsoft.com/office/drawing/2014/main" xmlns:a14="http://schemas.microsoft.com/office/drawing/2010/main" xmlns:p14="http://schemas.microsoft.com/office/powerpoint/2010/main" w="9525">
+                <a14:hiddenLine xmlns:p14="http://schemas.microsoft.com/office/powerpoint/2010/main" xmlns:a14="http://schemas.microsoft.com/office/drawing/2010/main" xmlns:a16="http://schemas.microsoft.com/office/drawing/2014/main" xmlns="" w="9525">
                   <a:solidFill>
                     <a:srgbClr val="000000"/>
                   </a:solidFill>
@@ -36697,7 +36730,7 @@
             </a:ln>
             <a:extLst>
               <a:ext uri="{91240B29-F687-4f45-9708-019B960494DF}">
-                <a14:hiddenLine xmlns="" xmlns:a16="http://schemas.microsoft.com/office/drawing/2014/main" xmlns:a14="http://schemas.microsoft.com/office/drawing/2010/main" xmlns:p14="http://schemas.microsoft.com/office/powerpoint/2010/main" w="9525">
+                <a14:hiddenLine xmlns:p14="http://schemas.microsoft.com/office/powerpoint/2010/main" xmlns:a14="http://schemas.microsoft.com/office/drawing/2010/main" xmlns:a16="http://schemas.microsoft.com/office/drawing/2014/main" xmlns="" w="9525">
                   <a:solidFill>
                     <a:srgbClr val="000000"/>
                   </a:solidFill>
@@ -36809,7 +36842,7 @@
             </a:ln>
             <a:extLst>
               <a:ext uri="{91240B29-F687-4f45-9708-019B960494DF}">
-                <a14:hiddenLine xmlns="" xmlns:a16="http://schemas.microsoft.com/office/drawing/2014/main" xmlns:a14="http://schemas.microsoft.com/office/drawing/2010/main" xmlns:p14="http://schemas.microsoft.com/office/powerpoint/2010/main" w="9525">
+                <a14:hiddenLine xmlns:p14="http://schemas.microsoft.com/office/powerpoint/2010/main" xmlns:a14="http://schemas.microsoft.com/office/drawing/2010/main" xmlns:a16="http://schemas.microsoft.com/office/drawing/2014/main" xmlns="" w="9525">
                   <a:solidFill>
                     <a:srgbClr val="000000"/>
                   </a:solidFill>
@@ -36893,7 +36926,7 @@
             </a:ln>
             <a:extLst>
               <a:ext uri="{91240B29-F687-4f45-9708-019B960494DF}">
-                <a14:hiddenLine xmlns="" xmlns:a16="http://schemas.microsoft.com/office/drawing/2014/main" xmlns:a14="http://schemas.microsoft.com/office/drawing/2010/main" xmlns:p14="http://schemas.microsoft.com/office/powerpoint/2010/main" w="9525">
+                <a14:hiddenLine xmlns:p14="http://schemas.microsoft.com/office/powerpoint/2010/main" xmlns:a14="http://schemas.microsoft.com/office/drawing/2010/main" xmlns:a16="http://schemas.microsoft.com/office/drawing/2014/main" xmlns="" w="9525">
                   <a:solidFill>
                     <a:srgbClr val="000000"/>
                   </a:solidFill>
@@ -37005,7 +37038,7 @@
             </a:ln>
             <a:extLst>
               <a:ext uri="{91240B29-F687-4f45-9708-019B960494DF}">
-                <a14:hiddenLine xmlns="" xmlns:a16="http://schemas.microsoft.com/office/drawing/2014/main" xmlns:a14="http://schemas.microsoft.com/office/drawing/2010/main" xmlns:p14="http://schemas.microsoft.com/office/powerpoint/2010/main" w="9525">
+                <a14:hiddenLine xmlns:p14="http://schemas.microsoft.com/office/powerpoint/2010/main" xmlns:a14="http://schemas.microsoft.com/office/drawing/2010/main" xmlns:a16="http://schemas.microsoft.com/office/drawing/2014/main" xmlns="" w="9525">
                   <a:solidFill>
                     <a:srgbClr val="000000"/>
                   </a:solidFill>
@@ -37117,7 +37150,7 @@
             </a:ln>
             <a:extLst>
               <a:ext uri="{91240B29-F687-4f45-9708-019B960494DF}">
-                <a14:hiddenLine xmlns="" xmlns:a16="http://schemas.microsoft.com/office/drawing/2014/main" xmlns:a14="http://schemas.microsoft.com/office/drawing/2010/main" xmlns:p14="http://schemas.microsoft.com/office/powerpoint/2010/main" w="9525">
+                <a14:hiddenLine xmlns:p14="http://schemas.microsoft.com/office/powerpoint/2010/main" xmlns:a14="http://schemas.microsoft.com/office/drawing/2010/main" xmlns:a16="http://schemas.microsoft.com/office/drawing/2014/main" xmlns="" w="9525">
                   <a:solidFill>
                     <a:srgbClr val="000000"/>
                   </a:solidFill>
@@ -37195,7 +37228,7 @@
             </a:ln>
             <a:extLst>
               <a:ext uri="{91240B29-F687-4f45-9708-019B960494DF}">
-                <a14:hiddenLine xmlns="" xmlns:a16="http://schemas.microsoft.com/office/drawing/2014/main" xmlns:a14="http://schemas.microsoft.com/office/drawing/2010/main" xmlns:p14="http://schemas.microsoft.com/office/powerpoint/2010/main" w="9525">
+                <a14:hiddenLine xmlns:p14="http://schemas.microsoft.com/office/powerpoint/2010/main" xmlns:a14="http://schemas.microsoft.com/office/drawing/2010/main" xmlns:a16="http://schemas.microsoft.com/office/drawing/2014/main" xmlns="" w="9525">
                   <a:solidFill>
                     <a:srgbClr val="000000"/>
                   </a:solidFill>
@@ -37307,7 +37340,7 @@
             </a:ln>
             <a:extLst>
               <a:ext uri="{91240B29-F687-4f45-9708-019B960494DF}">
-                <a14:hiddenLine xmlns="" xmlns:a16="http://schemas.microsoft.com/office/drawing/2014/main" xmlns:a14="http://schemas.microsoft.com/office/drawing/2010/main" xmlns:p14="http://schemas.microsoft.com/office/powerpoint/2010/main" w="9525">
+                <a14:hiddenLine xmlns:p14="http://schemas.microsoft.com/office/powerpoint/2010/main" xmlns:a14="http://schemas.microsoft.com/office/drawing/2010/main" xmlns:a16="http://schemas.microsoft.com/office/drawing/2014/main" xmlns="" w="9525">
                   <a:solidFill>
                     <a:srgbClr val="000000"/>
                   </a:solidFill>
@@ -37385,7 +37418,7 @@
             </a:ln>
             <a:extLst>
               <a:ext uri="{91240B29-F687-4f45-9708-019B960494DF}">
-                <a14:hiddenLine xmlns="" xmlns:a16="http://schemas.microsoft.com/office/drawing/2014/main" xmlns:a14="http://schemas.microsoft.com/office/drawing/2010/main" xmlns:p14="http://schemas.microsoft.com/office/powerpoint/2010/main" w="9525">
+                <a14:hiddenLine xmlns:p14="http://schemas.microsoft.com/office/powerpoint/2010/main" xmlns:a14="http://schemas.microsoft.com/office/drawing/2010/main" xmlns:a16="http://schemas.microsoft.com/office/drawing/2014/main" xmlns="" w="9525">
                   <a:solidFill>
                     <a:srgbClr val="000000"/>
                   </a:solidFill>
@@ -37497,7 +37530,7 @@
             </a:ln>
             <a:extLst>
               <a:ext uri="{91240B29-F687-4f45-9708-019B960494DF}">
-                <a14:hiddenLine xmlns="" xmlns:a16="http://schemas.microsoft.com/office/drawing/2014/main" xmlns:a14="http://schemas.microsoft.com/office/drawing/2010/main" xmlns:p14="http://schemas.microsoft.com/office/powerpoint/2010/main" w="9525">
+                <a14:hiddenLine xmlns:p14="http://schemas.microsoft.com/office/powerpoint/2010/main" xmlns:a14="http://schemas.microsoft.com/office/drawing/2010/main" xmlns:a16="http://schemas.microsoft.com/office/drawing/2014/main" xmlns="" w="9525">
                   <a:solidFill>
                     <a:srgbClr val="000000"/>
                   </a:solidFill>
@@ -37587,7 +37620,7 @@
             </a:ln>
             <a:extLst>
               <a:ext uri="{91240B29-F687-4f45-9708-019B960494DF}">
-                <a14:hiddenLine xmlns="" xmlns:a16="http://schemas.microsoft.com/office/drawing/2014/main" xmlns:a14="http://schemas.microsoft.com/office/drawing/2010/main" xmlns:p14="http://schemas.microsoft.com/office/powerpoint/2010/main" w="9525">
+                <a14:hiddenLine xmlns:p14="http://schemas.microsoft.com/office/powerpoint/2010/main" xmlns:a14="http://schemas.microsoft.com/office/drawing/2010/main" xmlns:a16="http://schemas.microsoft.com/office/drawing/2014/main" xmlns="" w="9525">
                   <a:solidFill>
                     <a:srgbClr val="000000"/>
                   </a:solidFill>
@@ -37699,7 +37732,7 @@
             </a:ln>
             <a:extLst>
               <a:ext uri="{91240B29-F687-4f45-9708-019B960494DF}">
-                <a14:hiddenLine xmlns="" xmlns:a16="http://schemas.microsoft.com/office/drawing/2014/main" xmlns:a14="http://schemas.microsoft.com/office/drawing/2010/main" xmlns:p14="http://schemas.microsoft.com/office/powerpoint/2010/main" w="9525">
+                <a14:hiddenLine xmlns:p14="http://schemas.microsoft.com/office/powerpoint/2010/main" xmlns:a14="http://schemas.microsoft.com/office/drawing/2010/main" xmlns:a16="http://schemas.microsoft.com/office/drawing/2014/main" xmlns="" w="9525">
                   <a:solidFill>
                     <a:srgbClr val="000000"/>
                   </a:solidFill>
@@ -37789,7 +37822,7 @@
             </a:ln>
             <a:extLst>
               <a:ext uri="{91240B29-F687-4f45-9708-019B960494DF}">
-                <a14:hiddenLine xmlns="" xmlns:a16="http://schemas.microsoft.com/office/drawing/2014/main" xmlns:a14="http://schemas.microsoft.com/office/drawing/2010/main" xmlns:p14="http://schemas.microsoft.com/office/powerpoint/2010/main" w="9525">
+                <a14:hiddenLine xmlns:p14="http://schemas.microsoft.com/office/powerpoint/2010/main" xmlns:a14="http://schemas.microsoft.com/office/drawing/2010/main" xmlns:a16="http://schemas.microsoft.com/office/drawing/2014/main" xmlns="" w="9525">
                   <a:solidFill>
                     <a:srgbClr val="000000"/>
                   </a:solidFill>
@@ -37901,7 +37934,7 @@
             </a:ln>
             <a:extLst>
               <a:ext uri="{91240B29-F687-4f45-9708-019B960494DF}">
-                <a14:hiddenLine xmlns="" xmlns:a16="http://schemas.microsoft.com/office/drawing/2014/main" xmlns:a14="http://schemas.microsoft.com/office/drawing/2010/main" xmlns:p14="http://schemas.microsoft.com/office/powerpoint/2010/main" w="9525">
+                <a14:hiddenLine xmlns:p14="http://schemas.microsoft.com/office/powerpoint/2010/main" xmlns:a14="http://schemas.microsoft.com/office/drawing/2010/main" xmlns:a16="http://schemas.microsoft.com/office/drawing/2014/main" xmlns="" w="9525">
                   <a:solidFill>
                     <a:srgbClr val="000000"/>
                   </a:solidFill>
@@ -37957,7 +37990,7 @@
             </a:ln>
             <a:extLst>
               <a:ext uri="{91240B29-F687-4f45-9708-019B960494DF}">
-                <a14:hiddenLine xmlns="" xmlns:a16="http://schemas.microsoft.com/office/drawing/2014/main" xmlns:a14="http://schemas.microsoft.com/office/drawing/2010/main" xmlns:p14="http://schemas.microsoft.com/office/powerpoint/2010/main" w="9525">
+                <a14:hiddenLine xmlns:p14="http://schemas.microsoft.com/office/powerpoint/2010/main" xmlns:a14="http://schemas.microsoft.com/office/drawing/2010/main" xmlns:a16="http://schemas.microsoft.com/office/drawing/2014/main" xmlns="" w="9525">
                   <a:solidFill>
                     <a:srgbClr val="000000"/>
                   </a:solidFill>
@@ -38069,7 +38102,7 @@
             </a:ln>
             <a:extLst>
               <a:ext uri="{91240B29-F687-4f45-9708-019B960494DF}">
-                <a14:hiddenLine xmlns="" xmlns:a16="http://schemas.microsoft.com/office/drawing/2014/main" xmlns:a14="http://schemas.microsoft.com/office/drawing/2010/main" xmlns:p14="http://schemas.microsoft.com/office/powerpoint/2010/main" w="9525">
+                <a14:hiddenLine xmlns:p14="http://schemas.microsoft.com/office/powerpoint/2010/main" xmlns:a14="http://schemas.microsoft.com/office/drawing/2010/main" xmlns:a16="http://schemas.microsoft.com/office/drawing/2014/main" xmlns="" w="9525">
                   <a:solidFill>
                     <a:srgbClr val="000000"/>
                   </a:solidFill>
@@ -38153,7 +38186,7 @@
             </a:ln>
             <a:extLst>
               <a:ext uri="{91240B29-F687-4f45-9708-019B960494DF}">
-                <a14:hiddenLine xmlns="" xmlns:a16="http://schemas.microsoft.com/office/drawing/2014/main" xmlns:a14="http://schemas.microsoft.com/office/drawing/2010/main" xmlns:p14="http://schemas.microsoft.com/office/powerpoint/2010/main" w="9525">
+                <a14:hiddenLine xmlns:p14="http://schemas.microsoft.com/office/powerpoint/2010/main" xmlns:a14="http://schemas.microsoft.com/office/drawing/2010/main" xmlns:a16="http://schemas.microsoft.com/office/drawing/2014/main" xmlns="" w="9525">
                   <a:solidFill>
                     <a:srgbClr val="000000"/>
                   </a:solidFill>
@@ -38237,7 +38270,7 @@
             </a:ln>
             <a:extLst>
               <a:ext uri="{91240B29-F687-4f45-9708-019B960494DF}">
-                <a14:hiddenLine xmlns="" xmlns:a16="http://schemas.microsoft.com/office/drawing/2014/main" xmlns:a14="http://schemas.microsoft.com/office/drawing/2010/main" xmlns:p14="http://schemas.microsoft.com/office/powerpoint/2010/main" w="9525">
+                <a14:hiddenLine xmlns:p14="http://schemas.microsoft.com/office/powerpoint/2010/main" xmlns:a14="http://schemas.microsoft.com/office/drawing/2010/main" xmlns:a16="http://schemas.microsoft.com/office/drawing/2014/main" xmlns="" w="9525">
                   <a:solidFill>
                     <a:srgbClr val="000000"/>
                   </a:solidFill>
@@ -38349,7 +38382,7 @@
             </a:ln>
             <a:extLst>
               <a:ext uri="{91240B29-F687-4f45-9708-019B960494DF}">
-                <a14:hiddenLine xmlns="" xmlns:a16="http://schemas.microsoft.com/office/drawing/2014/main" xmlns:a14="http://schemas.microsoft.com/office/drawing/2010/main" xmlns:p14="http://schemas.microsoft.com/office/powerpoint/2010/main" w="9525">
+                <a14:hiddenLine xmlns:p14="http://schemas.microsoft.com/office/powerpoint/2010/main" xmlns:a14="http://schemas.microsoft.com/office/drawing/2010/main" xmlns:a16="http://schemas.microsoft.com/office/drawing/2014/main" xmlns="" w="9525">
                   <a:solidFill>
                     <a:srgbClr val="000000"/>
                   </a:solidFill>
@@ -38439,7 +38472,7 @@
             </a:ln>
             <a:extLst>
               <a:ext uri="{91240B29-F687-4f45-9708-019B960494DF}">
-                <a14:hiddenLine xmlns="" xmlns:a16="http://schemas.microsoft.com/office/drawing/2014/main" xmlns:a14="http://schemas.microsoft.com/office/drawing/2010/main" xmlns:p14="http://schemas.microsoft.com/office/powerpoint/2010/main" w="9525">
+                <a14:hiddenLine xmlns:p14="http://schemas.microsoft.com/office/powerpoint/2010/main" xmlns:a14="http://schemas.microsoft.com/office/drawing/2010/main" xmlns:a16="http://schemas.microsoft.com/office/drawing/2014/main" xmlns="" w="9525">
                   <a:solidFill>
                     <a:srgbClr val="000000"/>
                   </a:solidFill>
@@ -38523,7 +38556,7 @@
             </a:ln>
             <a:extLst>
               <a:ext uri="{91240B29-F687-4f45-9708-019B960494DF}">
-                <a14:hiddenLine xmlns="" xmlns:a16="http://schemas.microsoft.com/office/drawing/2014/main" xmlns:a14="http://schemas.microsoft.com/office/drawing/2010/main" xmlns:p14="http://schemas.microsoft.com/office/powerpoint/2010/main" w="9525">
+                <a14:hiddenLine xmlns:p14="http://schemas.microsoft.com/office/powerpoint/2010/main" xmlns:a14="http://schemas.microsoft.com/office/drawing/2010/main" xmlns:a16="http://schemas.microsoft.com/office/drawing/2014/main" xmlns="" w="9525">
                   <a:solidFill>
                     <a:srgbClr val="000000"/>
                   </a:solidFill>
@@ -38635,7 +38668,7 @@
             </a:ln>
             <a:extLst>
               <a:ext uri="{91240B29-F687-4f45-9708-019B960494DF}">
-                <a14:hiddenLine xmlns="" xmlns:a16="http://schemas.microsoft.com/office/drawing/2014/main" xmlns:a14="http://schemas.microsoft.com/office/drawing/2010/main" xmlns:p14="http://schemas.microsoft.com/office/powerpoint/2010/main" w="9525">
+                <a14:hiddenLine xmlns:p14="http://schemas.microsoft.com/office/powerpoint/2010/main" xmlns:a14="http://schemas.microsoft.com/office/drawing/2010/main" xmlns:a16="http://schemas.microsoft.com/office/drawing/2014/main" xmlns="" w="9525">
                   <a:solidFill>
                     <a:srgbClr val="000000"/>
                   </a:solidFill>
@@ -38719,7 +38752,7 @@
             </a:ln>
             <a:extLst>
               <a:ext uri="{91240B29-F687-4f45-9708-019B960494DF}">
-                <a14:hiddenLine xmlns="" xmlns:a16="http://schemas.microsoft.com/office/drawing/2014/main" xmlns:a14="http://schemas.microsoft.com/office/drawing/2010/main" xmlns:p14="http://schemas.microsoft.com/office/powerpoint/2010/main" w="9525">
+                <a14:hiddenLine xmlns:p14="http://schemas.microsoft.com/office/powerpoint/2010/main" xmlns:a14="http://schemas.microsoft.com/office/drawing/2010/main" xmlns:a16="http://schemas.microsoft.com/office/drawing/2014/main" xmlns="" w="9525">
                   <a:solidFill>
                     <a:srgbClr val="000000"/>
                   </a:solidFill>
@@ -38831,7 +38864,7 @@
             </a:ln>
             <a:extLst>
               <a:ext uri="{91240B29-F687-4f45-9708-019B960494DF}">
-                <a14:hiddenLine xmlns="" xmlns:a16="http://schemas.microsoft.com/office/drawing/2014/main" xmlns:a14="http://schemas.microsoft.com/office/drawing/2010/main" xmlns:p14="http://schemas.microsoft.com/office/powerpoint/2010/main" w="9525">
+                <a14:hiddenLine xmlns:p14="http://schemas.microsoft.com/office/powerpoint/2010/main" xmlns:a14="http://schemas.microsoft.com/office/drawing/2010/main" xmlns:a16="http://schemas.microsoft.com/office/drawing/2014/main" xmlns="" w="9525">
                   <a:solidFill>
                     <a:srgbClr val="000000"/>
                   </a:solidFill>
@@ -38915,7 +38948,7 @@
             </a:ln>
             <a:extLst>
               <a:ext uri="{91240B29-F687-4f45-9708-019B960494DF}">
-                <a14:hiddenLine xmlns="" xmlns:a16="http://schemas.microsoft.com/office/drawing/2014/main" xmlns:a14="http://schemas.microsoft.com/office/drawing/2010/main" xmlns:p14="http://schemas.microsoft.com/office/powerpoint/2010/main" w="9525">
+                <a14:hiddenLine xmlns:p14="http://schemas.microsoft.com/office/powerpoint/2010/main" xmlns:a14="http://schemas.microsoft.com/office/drawing/2010/main" xmlns:a16="http://schemas.microsoft.com/office/drawing/2014/main" xmlns="" w="9525">
                   <a:solidFill>
                     <a:srgbClr val="000000"/>
                   </a:solidFill>
@@ -39027,7 +39060,7 @@
             </a:ln>
             <a:extLst>
               <a:ext uri="{91240B29-F687-4f45-9708-019B960494DF}">
-                <a14:hiddenLine xmlns="" xmlns:a16="http://schemas.microsoft.com/office/drawing/2014/main" xmlns:a14="http://schemas.microsoft.com/office/drawing/2010/main" xmlns:p14="http://schemas.microsoft.com/office/powerpoint/2010/main" w="9525">
+                <a14:hiddenLine xmlns:p14="http://schemas.microsoft.com/office/powerpoint/2010/main" xmlns:a14="http://schemas.microsoft.com/office/drawing/2010/main" xmlns:a16="http://schemas.microsoft.com/office/drawing/2014/main" xmlns="" w="9525">
                   <a:solidFill>
                     <a:srgbClr val="000000"/>
                   </a:solidFill>
@@ -39083,7 +39116,7 @@
             </a:ln>
             <a:extLst>
               <a:ext uri="{91240B29-F687-4f45-9708-019B960494DF}">
-                <a14:hiddenLine xmlns="" xmlns:a16="http://schemas.microsoft.com/office/drawing/2014/main" xmlns:a14="http://schemas.microsoft.com/office/drawing/2010/main" xmlns:p14="http://schemas.microsoft.com/office/powerpoint/2010/main" w="9525">
+                <a14:hiddenLine xmlns:p14="http://schemas.microsoft.com/office/powerpoint/2010/main" xmlns:a14="http://schemas.microsoft.com/office/drawing/2010/main" xmlns:a16="http://schemas.microsoft.com/office/drawing/2014/main" xmlns="" w="9525">
                   <a:solidFill>
                     <a:srgbClr val="000000"/>
                   </a:solidFill>
@@ -39170,7 +39203,7 @@
             </a:ln>
             <a:extLst>
               <a:ext uri="{91240B29-F687-4f45-9708-019B960494DF}">
-                <a14:hiddenLine xmlns="" xmlns:a16="http://schemas.microsoft.com/office/drawing/2014/main" xmlns:a14="http://schemas.microsoft.com/office/drawing/2010/main" xmlns:p14="http://schemas.microsoft.com/office/powerpoint/2010/main" w="9525">
+                <a14:hiddenLine xmlns:p14="http://schemas.microsoft.com/office/powerpoint/2010/main" xmlns:a14="http://schemas.microsoft.com/office/drawing/2010/main" xmlns:a16="http://schemas.microsoft.com/office/drawing/2014/main" xmlns="" w="9525">
                   <a:solidFill>
                     <a:srgbClr val="000000"/>
                   </a:solidFill>
@@ -39282,7 +39315,7 @@
             </a:ln>
             <a:extLst>
               <a:ext uri="{91240B29-F687-4f45-9708-019B960494DF}">
-                <a14:hiddenLine xmlns="" xmlns:a16="http://schemas.microsoft.com/office/drawing/2014/main" xmlns:a14="http://schemas.microsoft.com/office/drawing/2010/main" xmlns:p14="http://schemas.microsoft.com/office/powerpoint/2010/main" w="9525">
+                <a14:hiddenLine xmlns:p14="http://schemas.microsoft.com/office/powerpoint/2010/main" xmlns:a14="http://schemas.microsoft.com/office/drawing/2010/main" xmlns:a16="http://schemas.microsoft.com/office/drawing/2014/main" xmlns="" w="9525">
                   <a:solidFill>
                     <a:srgbClr val="000000"/>
                   </a:solidFill>
@@ -39366,7 +39399,7 @@
             </a:ln>
             <a:extLst>
               <a:ext uri="{91240B29-F687-4f45-9708-019B960494DF}">
-                <a14:hiddenLine xmlns="" xmlns:a16="http://schemas.microsoft.com/office/drawing/2014/main" xmlns:a14="http://schemas.microsoft.com/office/drawing/2010/main" xmlns:p14="http://schemas.microsoft.com/office/powerpoint/2010/main" w="9525">
+                <a14:hiddenLine xmlns:p14="http://schemas.microsoft.com/office/powerpoint/2010/main" xmlns:a14="http://schemas.microsoft.com/office/drawing/2010/main" xmlns:a16="http://schemas.microsoft.com/office/drawing/2014/main" xmlns="" w="9525">
                   <a:solidFill>
                     <a:srgbClr val="000000"/>
                   </a:solidFill>
@@ -39478,7 +39511,7 @@
             </a:ln>
             <a:extLst>
               <a:ext uri="{91240B29-F687-4f45-9708-019B960494DF}">
-                <a14:hiddenLine xmlns="" xmlns:a16="http://schemas.microsoft.com/office/drawing/2014/main" xmlns:a14="http://schemas.microsoft.com/office/drawing/2010/main" xmlns:p14="http://schemas.microsoft.com/office/powerpoint/2010/main" w="9525">
+                <a14:hiddenLine xmlns:p14="http://schemas.microsoft.com/office/powerpoint/2010/main" xmlns:a14="http://schemas.microsoft.com/office/drawing/2010/main" xmlns:a16="http://schemas.microsoft.com/office/drawing/2014/main" xmlns="" w="9525">
                   <a:solidFill>
                     <a:srgbClr val="000000"/>
                   </a:solidFill>
@@ -39590,7 +39623,7 @@
             </a:ln>
             <a:extLst>
               <a:ext uri="{91240B29-F687-4f45-9708-019B960494DF}">
-                <a14:hiddenLine xmlns="" xmlns:a16="http://schemas.microsoft.com/office/drawing/2014/main" xmlns:a14="http://schemas.microsoft.com/office/drawing/2010/main" xmlns:p14="http://schemas.microsoft.com/office/powerpoint/2010/main" w="9525">
+                <a14:hiddenLine xmlns:p14="http://schemas.microsoft.com/office/powerpoint/2010/main" xmlns:a14="http://schemas.microsoft.com/office/drawing/2010/main" xmlns:a16="http://schemas.microsoft.com/office/drawing/2014/main" xmlns="" w="9525">
                   <a:solidFill>
                     <a:srgbClr val="000000"/>
                   </a:solidFill>
@@ -39677,7 +39710,7 @@
             </a:ln>
             <a:extLst>
               <a:ext uri="{91240B29-F687-4f45-9708-019B960494DF}">
-                <a14:hiddenLine xmlns="" xmlns:a16="http://schemas.microsoft.com/office/drawing/2014/main" xmlns:a14="http://schemas.microsoft.com/office/drawing/2010/main" xmlns:p14="http://schemas.microsoft.com/office/powerpoint/2010/main" w="9525">
+                <a14:hiddenLine xmlns:p14="http://schemas.microsoft.com/office/powerpoint/2010/main" xmlns:a14="http://schemas.microsoft.com/office/drawing/2010/main" xmlns:a16="http://schemas.microsoft.com/office/drawing/2014/main" xmlns="" w="9525">
                   <a:solidFill>
                     <a:srgbClr val="000000"/>
                   </a:solidFill>
@@ -39761,7 +39794,7 @@
             </a:ln>
             <a:extLst>
               <a:ext uri="{91240B29-F687-4f45-9708-019B960494DF}">
-                <a14:hiddenLine xmlns="" xmlns:a16="http://schemas.microsoft.com/office/drawing/2014/main" xmlns:a14="http://schemas.microsoft.com/office/drawing/2010/main" xmlns:p14="http://schemas.microsoft.com/office/powerpoint/2010/main" w="9525">
+                <a14:hiddenLine xmlns:p14="http://schemas.microsoft.com/office/powerpoint/2010/main" xmlns:a14="http://schemas.microsoft.com/office/drawing/2010/main" xmlns:a16="http://schemas.microsoft.com/office/drawing/2014/main" xmlns="" w="9525">
                   <a:solidFill>
                     <a:srgbClr val="000000"/>
                   </a:solidFill>
@@ -39873,7 +39906,7 @@
             </a:ln>
             <a:extLst>
               <a:ext uri="{91240B29-F687-4f45-9708-019B960494DF}">
-                <a14:hiddenLine xmlns="" xmlns:a16="http://schemas.microsoft.com/office/drawing/2014/main" xmlns:a14="http://schemas.microsoft.com/office/drawing/2010/main" xmlns:p14="http://schemas.microsoft.com/office/powerpoint/2010/main" w="9525">
+                <a14:hiddenLine xmlns:p14="http://schemas.microsoft.com/office/powerpoint/2010/main" xmlns:a14="http://schemas.microsoft.com/office/drawing/2010/main" xmlns:a16="http://schemas.microsoft.com/office/drawing/2014/main" xmlns="" w="9525">
                   <a:solidFill>
                     <a:srgbClr val="000000"/>
                   </a:solidFill>
@@ -39985,7 +40018,7 @@
             </a:ln>
             <a:extLst>
               <a:ext uri="{91240B29-F687-4f45-9708-019B960494DF}">
-                <a14:hiddenLine xmlns="" xmlns:a16="http://schemas.microsoft.com/office/drawing/2014/main" xmlns:a14="http://schemas.microsoft.com/office/drawing/2010/main" xmlns:p14="http://schemas.microsoft.com/office/powerpoint/2010/main" w="9525">
+                <a14:hiddenLine xmlns:p14="http://schemas.microsoft.com/office/powerpoint/2010/main" xmlns:a14="http://schemas.microsoft.com/office/drawing/2010/main" xmlns:a16="http://schemas.microsoft.com/office/drawing/2014/main" xmlns="" w="9525">
                   <a:solidFill>
                     <a:srgbClr val="000000"/>
                   </a:solidFill>
@@ -40069,7 +40102,7 @@
             </a:ln>
             <a:extLst>
               <a:ext uri="{91240B29-F687-4f45-9708-019B960494DF}">
-                <a14:hiddenLine xmlns="" xmlns:a16="http://schemas.microsoft.com/office/drawing/2014/main" xmlns:a14="http://schemas.microsoft.com/office/drawing/2010/main" xmlns:p14="http://schemas.microsoft.com/office/powerpoint/2010/main" w="9525">
+                <a14:hiddenLine xmlns:p14="http://schemas.microsoft.com/office/powerpoint/2010/main" xmlns:a14="http://schemas.microsoft.com/office/drawing/2010/main" xmlns:a16="http://schemas.microsoft.com/office/drawing/2014/main" xmlns="" w="9525">
                   <a:solidFill>
                     <a:srgbClr val="000000"/>
                   </a:solidFill>
@@ -40211,7 +40244,7 @@
             </a:ln>
             <a:extLst>
               <a:ext uri="{91240B29-F687-4f45-9708-019B960494DF}">
-                <a14:hiddenLine xmlns="" xmlns:a16="http://schemas.microsoft.com/office/drawing/2014/main" xmlns:a14="http://schemas.microsoft.com/office/drawing/2010/main" xmlns:p14="http://schemas.microsoft.com/office/powerpoint/2010/main" w="9525">
+                <a14:hiddenLine xmlns:p14="http://schemas.microsoft.com/office/powerpoint/2010/main" xmlns:a14="http://schemas.microsoft.com/office/drawing/2010/main" xmlns:a16="http://schemas.microsoft.com/office/drawing/2014/main" xmlns="" w="9525">
                   <a:solidFill>
                     <a:srgbClr val="000000"/>
                   </a:solidFill>
@@ -40301,7 +40334,7 @@
             </a:ln>
             <a:extLst>
               <a:ext uri="{91240B29-F687-4f45-9708-019B960494DF}">
-                <a14:hiddenLine xmlns="" xmlns:a16="http://schemas.microsoft.com/office/drawing/2014/main" xmlns:a14="http://schemas.microsoft.com/office/drawing/2010/main" xmlns:p14="http://schemas.microsoft.com/office/powerpoint/2010/main" w="9525">
+                <a14:hiddenLine xmlns:p14="http://schemas.microsoft.com/office/powerpoint/2010/main" xmlns:a14="http://schemas.microsoft.com/office/drawing/2010/main" xmlns:a16="http://schemas.microsoft.com/office/drawing/2014/main" xmlns="" w="9525">
                   <a:solidFill>
                     <a:srgbClr val="000000"/>
                   </a:solidFill>
@@ -40413,7 +40446,7 @@
             </a:ln>
             <a:extLst>
               <a:ext uri="{91240B29-F687-4f45-9708-019B960494DF}">
-                <a14:hiddenLine xmlns="" xmlns:a16="http://schemas.microsoft.com/office/drawing/2014/main" xmlns:a14="http://schemas.microsoft.com/office/drawing/2010/main" xmlns:p14="http://schemas.microsoft.com/office/powerpoint/2010/main" w="9525">
+                <a14:hiddenLine xmlns:p14="http://schemas.microsoft.com/office/powerpoint/2010/main" xmlns:a14="http://schemas.microsoft.com/office/drawing/2010/main" xmlns:a16="http://schemas.microsoft.com/office/drawing/2014/main" xmlns="" w="9525">
                   <a:solidFill>
                     <a:srgbClr val="000000"/>
                   </a:solidFill>
@@ -41107,7 +41140,7 @@
             </a:ln>
             <a:extLst>
               <a:ext uri="{91240B29-F687-4f45-9708-019B960494DF}">
-                <a14:hiddenLine xmlns="" xmlns:a16="http://schemas.microsoft.com/office/drawing/2014/main" xmlns:p14="http://schemas.microsoft.com/office/powerpoint/2010/main" xmlns:a14="http://schemas.microsoft.com/office/drawing/2010/main" w="9525">
+                <a14:hiddenLine xmlns:a14="http://schemas.microsoft.com/office/drawing/2010/main" xmlns:p14="http://schemas.microsoft.com/office/powerpoint/2010/main" xmlns:a16="http://schemas.microsoft.com/office/drawing/2014/main" xmlns="" w="9525">
                   <a:solidFill>
                     <a:srgbClr val="000000"/>
                   </a:solidFill>
@@ -41219,7 +41252,7 @@
             </a:ln>
             <a:extLst>
               <a:ext uri="{91240B29-F687-4f45-9708-019B960494DF}">
-                <a14:hiddenLine xmlns="" xmlns:a16="http://schemas.microsoft.com/office/drawing/2014/main" xmlns:p14="http://schemas.microsoft.com/office/powerpoint/2010/main" xmlns:a14="http://schemas.microsoft.com/office/drawing/2010/main" w="9525">
+                <a14:hiddenLine xmlns:a14="http://schemas.microsoft.com/office/drawing/2010/main" xmlns:p14="http://schemas.microsoft.com/office/powerpoint/2010/main" xmlns:a16="http://schemas.microsoft.com/office/drawing/2014/main" xmlns="" w="9525">
                   <a:solidFill>
                     <a:srgbClr val="000000"/>
                   </a:solidFill>
@@ -41331,7 +41364,7 @@
             </a:ln>
             <a:extLst>
               <a:ext uri="{91240B29-F687-4f45-9708-019B960494DF}">
-                <a14:hiddenLine xmlns="" xmlns:a16="http://schemas.microsoft.com/office/drawing/2014/main" xmlns:p14="http://schemas.microsoft.com/office/powerpoint/2010/main" xmlns:a14="http://schemas.microsoft.com/office/drawing/2010/main" w="9525">
+                <a14:hiddenLine xmlns:a14="http://schemas.microsoft.com/office/drawing/2010/main" xmlns:p14="http://schemas.microsoft.com/office/powerpoint/2010/main" xmlns:a16="http://schemas.microsoft.com/office/drawing/2014/main" xmlns="" w="9525">
                   <a:solidFill>
                     <a:srgbClr val="000000"/>
                   </a:solidFill>
@@ -41415,7 +41448,7 @@
             </a:ln>
             <a:extLst>
               <a:ext uri="{91240B29-F687-4f45-9708-019B960494DF}">
-                <a14:hiddenLine xmlns="" xmlns:a16="http://schemas.microsoft.com/office/drawing/2014/main" xmlns:p14="http://schemas.microsoft.com/office/powerpoint/2010/main" xmlns:a14="http://schemas.microsoft.com/office/drawing/2010/main" w="9525">
+                <a14:hiddenLine xmlns:a14="http://schemas.microsoft.com/office/drawing/2010/main" xmlns:p14="http://schemas.microsoft.com/office/powerpoint/2010/main" xmlns:a16="http://schemas.microsoft.com/office/drawing/2014/main" xmlns="" w="9525">
                   <a:solidFill>
                     <a:srgbClr val="000000"/>
                   </a:solidFill>
@@ -41527,7 +41560,7 @@
             </a:ln>
             <a:extLst>
               <a:ext uri="{91240B29-F687-4f45-9708-019B960494DF}">
-                <a14:hiddenLine xmlns="" xmlns:a16="http://schemas.microsoft.com/office/drawing/2014/main" xmlns:p14="http://schemas.microsoft.com/office/powerpoint/2010/main" xmlns:a14="http://schemas.microsoft.com/office/drawing/2010/main" w="9525">
+                <a14:hiddenLine xmlns:a14="http://schemas.microsoft.com/office/drawing/2010/main" xmlns:p14="http://schemas.microsoft.com/office/powerpoint/2010/main" xmlns:a16="http://schemas.microsoft.com/office/drawing/2014/main" xmlns="" w="9525">
                   <a:solidFill>
                     <a:srgbClr val="000000"/>
                   </a:solidFill>
@@ -41611,7 +41644,7 @@
             </a:ln>
             <a:extLst>
               <a:ext uri="{91240B29-F687-4f45-9708-019B960494DF}">
-                <a14:hiddenLine xmlns="" xmlns:a16="http://schemas.microsoft.com/office/drawing/2014/main" xmlns:p14="http://schemas.microsoft.com/office/powerpoint/2010/main" xmlns:a14="http://schemas.microsoft.com/office/drawing/2010/main" w="9525">
+                <a14:hiddenLine xmlns:a14="http://schemas.microsoft.com/office/drawing/2010/main" xmlns:p14="http://schemas.microsoft.com/office/powerpoint/2010/main" xmlns:a16="http://schemas.microsoft.com/office/drawing/2014/main" xmlns="" w="9525">
                   <a:solidFill>
                     <a:srgbClr val="000000"/>
                   </a:solidFill>
@@ -41695,7 +41728,7 @@
             </a:ln>
             <a:extLst>
               <a:ext uri="{91240B29-F687-4f45-9708-019B960494DF}">
-                <a14:hiddenLine xmlns="" xmlns:a16="http://schemas.microsoft.com/office/drawing/2014/main" xmlns:p14="http://schemas.microsoft.com/office/powerpoint/2010/main" xmlns:a14="http://schemas.microsoft.com/office/drawing/2010/main" w="9525">
+                <a14:hiddenLine xmlns:a14="http://schemas.microsoft.com/office/drawing/2010/main" xmlns:p14="http://schemas.microsoft.com/office/powerpoint/2010/main" xmlns:a16="http://schemas.microsoft.com/office/drawing/2014/main" xmlns="" w="9525">
                   <a:solidFill>
                     <a:srgbClr val="000000"/>
                   </a:solidFill>
@@ -41807,7 +41840,7 @@
             </a:ln>
             <a:extLst>
               <a:ext uri="{91240B29-F687-4f45-9708-019B960494DF}">
-                <a14:hiddenLine xmlns="" xmlns:a16="http://schemas.microsoft.com/office/drawing/2014/main" xmlns:p14="http://schemas.microsoft.com/office/powerpoint/2010/main" xmlns:a14="http://schemas.microsoft.com/office/drawing/2010/main" w="9525">
+                <a14:hiddenLine xmlns:a14="http://schemas.microsoft.com/office/drawing/2010/main" xmlns:p14="http://schemas.microsoft.com/office/powerpoint/2010/main" xmlns:a16="http://schemas.microsoft.com/office/drawing/2014/main" xmlns="" w="9525">
                   <a:solidFill>
                     <a:srgbClr val="000000"/>
                   </a:solidFill>
@@ -41919,7 +41952,7 @@
             </a:ln>
             <a:extLst>
               <a:ext uri="{91240B29-F687-4f45-9708-019B960494DF}">
-                <a14:hiddenLine xmlns="" xmlns:a16="http://schemas.microsoft.com/office/drawing/2014/main" xmlns:p14="http://schemas.microsoft.com/office/powerpoint/2010/main" xmlns:a14="http://schemas.microsoft.com/office/drawing/2010/main" w="9525">
+                <a14:hiddenLine xmlns:a14="http://schemas.microsoft.com/office/drawing/2010/main" xmlns:p14="http://schemas.microsoft.com/office/powerpoint/2010/main" xmlns:a16="http://schemas.microsoft.com/office/drawing/2014/main" xmlns="" w="9525">
                   <a:solidFill>
                     <a:srgbClr val="000000"/>
                   </a:solidFill>
@@ -42003,7 +42036,7 @@
             </a:ln>
             <a:extLst>
               <a:ext uri="{91240B29-F687-4f45-9708-019B960494DF}">
-                <a14:hiddenLine xmlns="" xmlns:a16="http://schemas.microsoft.com/office/drawing/2014/main" xmlns:p14="http://schemas.microsoft.com/office/powerpoint/2010/main" xmlns:a14="http://schemas.microsoft.com/office/drawing/2010/main" w="9525">
+                <a14:hiddenLine xmlns:a14="http://schemas.microsoft.com/office/drawing/2010/main" xmlns:p14="http://schemas.microsoft.com/office/powerpoint/2010/main" xmlns:a16="http://schemas.microsoft.com/office/drawing/2014/main" xmlns="" w="9525">
                   <a:solidFill>
                     <a:srgbClr val="000000"/>
                   </a:solidFill>
@@ -42135,7 +42168,7 @@
             </a:ln>
             <a:extLst>
               <a:ext uri="{91240B29-F687-4f45-9708-019B960494DF}">
-                <a14:hiddenLine xmlns="" xmlns:a16="http://schemas.microsoft.com/office/drawing/2014/main" xmlns:p14="http://schemas.microsoft.com/office/powerpoint/2010/main" xmlns:a14="http://schemas.microsoft.com/office/drawing/2010/main" w="9525">
+                <a14:hiddenLine xmlns:a14="http://schemas.microsoft.com/office/drawing/2010/main" xmlns:p14="http://schemas.microsoft.com/office/powerpoint/2010/main" xmlns:a16="http://schemas.microsoft.com/office/drawing/2014/main" xmlns="" w="9525">
                   <a:solidFill>
                     <a:srgbClr val="000000"/>
                   </a:solidFill>
@@ -42263,7 +42296,7 @@
             </a:ln>
             <a:extLst>
               <a:ext uri="{91240B29-F687-4f45-9708-019B960494DF}">
-                <a14:hiddenLine xmlns="" xmlns:a16="http://schemas.microsoft.com/office/drawing/2014/main" xmlns:p14="http://schemas.microsoft.com/office/powerpoint/2010/main" xmlns:a14="http://schemas.microsoft.com/office/drawing/2010/main" w="9525">
+                <a14:hiddenLine xmlns:a14="http://schemas.microsoft.com/office/drawing/2010/main" xmlns:p14="http://schemas.microsoft.com/office/powerpoint/2010/main" xmlns:a16="http://schemas.microsoft.com/office/drawing/2014/main" xmlns="" w="9525">
                   <a:solidFill>
                     <a:srgbClr val="000000"/>
                   </a:solidFill>
@@ -42347,7 +42380,7 @@
             </a:ln>
             <a:extLst>
               <a:ext uri="{91240B29-F687-4f45-9708-019B960494DF}">
-                <a14:hiddenLine xmlns="" xmlns:a16="http://schemas.microsoft.com/office/drawing/2014/main" xmlns:p14="http://schemas.microsoft.com/office/powerpoint/2010/main" xmlns:a14="http://schemas.microsoft.com/office/drawing/2010/main" w="9525">
+                <a14:hiddenLine xmlns:a14="http://schemas.microsoft.com/office/drawing/2010/main" xmlns:p14="http://schemas.microsoft.com/office/powerpoint/2010/main" xmlns:a16="http://schemas.microsoft.com/office/drawing/2014/main" xmlns="" w="9525">
                   <a:solidFill>
                     <a:srgbClr val="000000"/>
                   </a:solidFill>
@@ -42431,7 +42464,7 @@
             </a:ln>
             <a:extLst>
               <a:ext uri="{91240B29-F687-4f45-9708-019B960494DF}">
-                <a14:hiddenLine xmlns="" xmlns:a16="http://schemas.microsoft.com/office/drawing/2014/main" xmlns:p14="http://schemas.microsoft.com/office/powerpoint/2010/main" xmlns:a14="http://schemas.microsoft.com/office/drawing/2010/main" w="9525">
+                <a14:hiddenLine xmlns:a14="http://schemas.microsoft.com/office/drawing/2010/main" xmlns:p14="http://schemas.microsoft.com/office/powerpoint/2010/main" xmlns:a16="http://schemas.microsoft.com/office/drawing/2014/main" xmlns="" w="9525">
                   <a:solidFill>
                     <a:srgbClr val="000000"/>
                   </a:solidFill>
@@ -42543,7 +42576,7 @@
             </a:ln>
             <a:extLst>
               <a:ext uri="{91240B29-F687-4f45-9708-019B960494DF}">
-                <a14:hiddenLine xmlns="" xmlns:a16="http://schemas.microsoft.com/office/drawing/2014/main" xmlns:p14="http://schemas.microsoft.com/office/powerpoint/2010/main" xmlns:a14="http://schemas.microsoft.com/office/drawing/2010/main" w="9525">
+                <a14:hiddenLine xmlns:a14="http://schemas.microsoft.com/office/drawing/2010/main" xmlns:p14="http://schemas.microsoft.com/office/powerpoint/2010/main" xmlns:a16="http://schemas.microsoft.com/office/drawing/2014/main" xmlns="" w="9525">
                   <a:solidFill>
                     <a:srgbClr val="000000"/>
                   </a:solidFill>
@@ -42599,7 +42632,7 @@
             </a:ln>
             <a:extLst>
               <a:ext uri="{91240B29-F687-4f45-9708-019B960494DF}">
-                <a14:hiddenLine xmlns="" xmlns:a16="http://schemas.microsoft.com/office/drawing/2014/main" xmlns:p14="http://schemas.microsoft.com/office/powerpoint/2010/main" xmlns:a14="http://schemas.microsoft.com/office/drawing/2010/main" w="9525">
+                <a14:hiddenLine xmlns:a14="http://schemas.microsoft.com/office/drawing/2010/main" xmlns:p14="http://schemas.microsoft.com/office/powerpoint/2010/main" xmlns:a16="http://schemas.microsoft.com/office/drawing/2014/main" xmlns="" w="9525">
                   <a:solidFill>
                     <a:srgbClr val="000000"/>
                   </a:solidFill>
@@ -42686,7 +42719,7 @@
             </a:ln>
             <a:extLst>
               <a:ext uri="{91240B29-F687-4f45-9708-019B960494DF}">
-                <a14:hiddenLine xmlns="" xmlns:a16="http://schemas.microsoft.com/office/drawing/2014/main" xmlns:p14="http://schemas.microsoft.com/office/powerpoint/2010/main" xmlns:a14="http://schemas.microsoft.com/office/drawing/2010/main" w="9525">
+                <a14:hiddenLine xmlns:a14="http://schemas.microsoft.com/office/drawing/2010/main" xmlns:p14="http://schemas.microsoft.com/office/powerpoint/2010/main" xmlns:a16="http://schemas.microsoft.com/office/drawing/2014/main" xmlns="" w="9525">
                   <a:solidFill>
                     <a:srgbClr val="000000"/>
                   </a:solidFill>
@@ -42798,7 +42831,7 @@
             </a:ln>
             <a:extLst>
               <a:ext uri="{91240B29-F687-4f45-9708-019B960494DF}">
-                <a14:hiddenLine xmlns="" xmlns:a16="http://schemas.microsoft.com/office/drawing/2014/main" xmlns:p14="http://schemas.microsoft.com/office/powerpoint/2010/main" xmlns:a14="http://schemas.microsoft.com/office/drawing/2010/main" w="9525">
+                <a14:hiddenLine xmlns:a14="http://schemas.microsoft.com/office/drawing/2010/main" xmlns:p14="http://schemas.microsoft.com/office/powerpoint/2010/main" xmlns:a16="http://schemas.microsoft.com/office/drawing/2014/main" xmlns="" w="9525">
                   <a:solidFill>
                     <a:srgbClr val="000000"/>
                   </a:solidFill>
@@ -42882,7 +42915,7 @@
             </a:ln>
             <a:extLst>
               <a:ext uri="{91240B29-F687-4f45-9708-019B960494DF}">
-                <a14:hiddenLine xmlns="" xmlns:a16="http://schemas.microsoft.com/office/drawing/2014/main" xmlns:p14="http://schemas.microsoft.com/office/powerpoint/2010/main" xmlns:a14="http://schemas.microsoft.com/office/drawing/2010/main" w="9525">
+                <a14:hiddenLine xmlns:a14="http://schemas.microsoft.com/office/drawing/2010/main" xmlns:p14="http://schemas.microsoft.com/office/powerpoint/2010/main" xmlns:a16="http://schemas.microsoft.com/office/drawing/2014/main" xmlns="" w="9525">
                   <a:solidFill>
                     <a:srgbClr val="000000"/>
                   </a:solidFill>
@@ -42994,7 +43027,7 @@
             </a:ln>
             <a:extLst>
               <a:ext uri="{91240B29-F687-4f45-9708-019B960494DF}">
-                <a14:hiddenLine xmlns="" xmlns:a16="http://schemas.microsoft.com/office/drawing/2014/main" xmlns:p14="http://schemas.microsoft.com/office/powerpoint/2010/main" xmlns:a14="http://schemas.microsoft.com/office/drawing/2010/main" w="9525">
+                <a14:hiddenLine xmlns:a14="http://schemas.microsoft.com/office/drawing/2010/main" xmlns:p14="http://schemas.microsoft.com/office/powerpoint/2010/main" xmlns:a16="http://schemas.microsoft.com/office/drawing/2014/main" xmlns="" w="9525">
                   <a:solidFill>
                     <a:srgbClr val="000000"/>
                   </a:solidFill>
@@ -43081,7 +43114,7 @@
             </a:ln>
             <a:extLst>
               <a:ext uri="{91240B29-F687-4f45-9708-019B960494DF}">
-                <a14:hiddenLine xmlns="" xmlns:a16="http://schemas.microsoft.com/office/drawing/2014/main" xmlns:p14="http://schemas.microsoft.com/office/powerpoint/2010/main" xmlns:a14="http://schemas.microsoft.com/office/drawing/2010/main" w="9525">
+                <a14:hiddenLine xmlns:a14="http://schemas.microsoft.com/office/drawing/2010/main" xmlns:p14="http://schemas.microsoft.com/office/powerpoint/2010/main" xmlns:a16="http://schemas.microsoft.com/office/drawing/2014/main" xmlns="" w="9525">
                   <a:solidFill>
                     <a:srgbClr val="000000"/>
                   </a:solidFill>
@@ -43165,7 +43198,7 @@
             </a:ln>
             <a:extLst>
               <a:ext uri="{91240B29-F687-4f45-9708-019B960494DF}">
-                <a14:hiddenLine xmlns="" xmlns:a16="http://schemas.microsoft.com/office/drawing/2014/main" xmlns:p14="http://schemas.microsoft.com/office/powerpoint/2010/main" xmlns:a14="http://schemas.microsoft.com/office/drawing/2010/main" w="9525">
+                <a14:hiddenLine xmlns:a14="http://schemas.microsoft.com/office/drawing/2010/main" xmlns:p14="http://schemas.microsoft.com/office/powerpoint/2010/main" xmlns:a16="http://schemas.microsoft.com/office/drawing/2014/main" xmlns="" w="9525">
                   <a:solidFill>
                     <a:srgbClr val="000000"/>
                   </a:solidFill>
@@ -43277,7 +43310,7 @@
             </a:ln>
             <a:extLst>
               <a:ext uri="{91240B29-F687-4f45-9708-019B960494DF}">
-                <a14:hiddenLine xmlns="" xmlns:a16="http://schemas.microsoft.com/office/drawing/2014/main" xmlns:p14="http://schemas.microsoft.com/office/powerpoint/2010/main" xmlns:a14="http://schemas.microsoft.com/office/drawing/2010/main" w="9525">
+                <a14:hiddenLine xmlns:a14="http://schemas.microsoft.com/office/drawing/2010/main" xmlns:p14="http://schemas.microsoft.com/office/powerpoint/2010/main" xmlns:a16="http://schemas.microsoft.com/office/drawing/2014/main" xmlns="" w="9525">
                   <a:solidFill>
                     <a:srgbClr val="000000"/>
                   </a:solidFill>
@@ -43389,7 +43422,7 @@
             </a:ln>
             <a:extLst>
               <a:ext uri="{91240B29-F687-4f45-9708-019B960494DF}">
-                <a14:hiddenLine xmlns="" xmlns:a16="http://schemas.microsoft.com/office/drawing/2014/main" xmlns:p14="http://schemas.microsoft.com/office/powerpoint/2010/main" xmlns:a14="http://schemas.microsoft.com/office/drawing/2010/main" w="9525">
+                <a14:hiddenLine xmlns:a14="http://schemas.microsoft.com/office/drawing/2010/main" xmlns:p14="http://schemas.microsoft.com/office/powerpoint/2010/main" xmlns:a16="http://schemas.microsoft.com/office/drawing/2014/main" xmlns="" w="9525">
                   <a:solidFill>
                     <a:srgbClr val="000000"/>
                   </a:solidFill>
@@ -43476,7 +43509,7 @@
             </a:ln>
             <a:extLst>
               <a:ext uri="{91240B29-F687-4f45-9708-019B960494DF}">
-                <a14:hiddenLine xmlns="" xmlns:a16="http://schemas.microsoft.com/office/drawing/2014/main" xmlns:p14="http://schemas.microsoft.com/office/powerpoint/2010/main" xmlns:a14="http://schemas.microsoft.com/office/drawing/2010/main" w="9525">
+                <a14:hiddenLine xmlns:a14="http://schemas.microsoft.com/office/drawing/2010/main" xmlns:p14="http://schemas.microsoft.com/office/powerpoint/2010/main" xmlns:a16="http://schemas.microsoft.com/office/drawing/2014/main" xmlns="" w="9525">
                   <a:solidFill>
                     <a:srgbClr val="000000"/>
                   </a:solidFill>
@@ -43618,7 +43651,7 @@
             </a:ln>
             <a:extLst>
               <a:ext uri="{91240B29-F687-4f45-9708-019B960494DF}">
-                <a14:hiddenLine xmlns="" xmlns:a16="http://schemas.microsoft.com/office/drawing/2014/main" xmlns:p14="http://schemas.microsoft.com/office/powerpoint/2010/main" xmlns:a14="http://schemas.microsoft.com/office/drawing/2010/main" w="9525">
+                <a14:hiddenLine xmlns:a14="http://schemas.microsoft.com/office/drawing/2010/main" xmlns:p14="http://schemas.microsoft.com/office/powerpoint/2010/main" xmlns:a16="http://schemas.microsoft.com/office/drawing/2014/main" xmlns="" w="9525">
                   <a:solidFill>
                     <a:srgbClr val="000000"/>
                   </a:solidFill>
@@ -43855,7 +43888,7 @@
             </a:ln>
             <a:extLst>
               <a:ext uri="{91240B29-F687-4f45-9708-019B960494DF}">
-                <a14:hiddenLine xmlns="" xmlns:a16="http://schemas.microsoft.com/office/drawing/2014/main" xmlns:p14="http://schemas.microsoft.com/office/powerpoint/2010/main" xmlns:a14="http://schemas.microsoft.com/office/drawing/2010/main" w="9525">
+                <a14:hiddenLine xmlns:a14="http://schemas.microsoft.com/office/drawing/2010/main" xmlns:p14="http://schemas.microsoft.com/office/powerpoint/2010/main" xmlns:a16="http://schemas.microsoft.com/office/drawing/2014/main" xmlns="" w="9525">
                   <a:solidFill>
                     <a:srgbClr val="000000"/>
                   </a:solidFill>
@@ -43992,7 +44025,7 @@
             </a:ln>
             <a:extLst>
               <a:ext uri="{91240B29-F687-4f45-9708-019B960494DF}">
-                <a14:hiddenLine xmlns="" xmlns:a16="http://schemas.microsoft.com/office/drawing/2014/main" xmlns:p14="http://schemas.microsoft.com/office/powerpoint/2010/main" xmlns:a14="http://schemas.microsoft.com/office/drawing/2010/main" w="9525">
+                <a14:hiddenLine xmlns:a14="http://schemas.microsoft.com/office/drawing/2010/main" xmlns:p14="http://schemas.microsoft.com/office/powerpoint/2010/main" xmlns:a16="http://schemas.microsoft.com/office/drawing/2014/main" xmlns="" w="9525">
                   <a:solidFill>
                     <a:srgbClr val="000000"/>
                   </a:solidFill>
@@ -44104,7 +44137,7 @@
             </a:ln>
             <a:extLst>
               <a:ext uri="{91240B29-F687-4f45-9708-019B960494DF}">
-                <a14:hiddenLine xmlns="" xmlns:a16="http://schemas.microsoft.com/office/drawing/2014/main" xmlns:p14="http://schemas.microsoft.com/office/powerpoint/2010/main" xmlns:a14="http://schemas.microsoft.com/office/drawing/2010/main" w="9525">
+                <a14:hiddenLine xmlns:a14="http://schemas.microsoft.com/office/drawing/2010/main" xmlns:p14="http://schemas.microsoft.com/office/powerpoint/2010/main" xmlns:a16="http://schemas.microsoft.com/office/drawing/2014/main" xmlns="" w="9525">
                   <a:solidFill>
                     <a:srgbClr val="000000"/>
                   </a:solidFill>
@@ -44191,7 +44224,7 @@
             </a:ln>
             <a:extLst>
               <a:ext uri="{91240B29-F687-4f45-9708-019B960494DF}">
-                <a14:hiddenLine xmlns="" xmlns:a16="http://schemas.microsoft.com/office/drawing/2014/main" xmlns:p14="http://schemas.microsoft.com/office/powerpoint/2010/main" xmlns:a14="http://schemas.microsoft.com/office/drawing/2010/main" w="9525">
+                <a14:hiddenLine xmlns:a14="http://schemas.microsoft.com/office/drawing/2010/main" xmlns:p14="http://schemas.microsoft.com/office/powerpoint/2010/main" xmlns:a16="http://schemas.microsoft.com/office/drawing/2014/main" xmlns="" w="9525">
                   <a:solidFill>
                     <a:srgbClr val="000000"/>
                   </a:solidFill>
@@ -44303,7 +44336,7 @@
             </a:ln>
             <a:extLst>
               <a:ext uri="{91240B29-F687-4f45-9708-019B960494DF}">
-                <a14:hiddenLine xmlns="" xmlns:a16="http://schemas.microsoft.com/office/drawing/2014/main" xmlns:p14="http://schemas.microsoft.com/office/powerpoint/2010/main" xmlns:a14="http://schemas.microsoft.com/office/drawing/2010/main" w="9525">
+                <a14:hiddenLine xmlns:a14="http://schemas.microsoft.com/office/drawing/2010/main" xmlns:p14="http://schemas.microsoft.com/office/powerpoint/2010/main" xmlns:a16="http://schemas.microsoft.com/office/drawing/2014/main" xmlns="" w="9525">
                   <a:solidFill>
                     <a:srgbClr val="000000"/>
                   </a:solidFill>
@@ -44393,7 +44426,7 @@
             </a:ln>
             <a:extLst>
               <a:ext uri="{91240B29-F687-4f45-9708-019B960494DF}">
-                <a14:hiddenLine xmlns="" xmlns:a16="http://schemas.microsoft.com/office/drawing/2014/main" xmlns:p14="http://schemas.microsoft.com/office/powerpoint/2010/main" xmlns:a14="http://schemas.microsoft.com/office/drawing/2010/main" w="9525">
+                <a14:hiddenLine xmlns:a14="http://schemas.microsoft.com/office/drawing/2010/main" xmlns:p14="http://schemas.microsoft.com/office/powerpoint/2010/main" xmlns:a16="http://schemas.microsoft.com/office/drawing/2014/main" xmlns="" w="9525">
                   <a:solidFill>
                     <a:srgbClr val="000000"/>
                   </a:solidFill>
@@ -44505,7 +44538,7 @@
             </a:ln>
             <a:extLst>
               <a:ext uri="{91240B29-F687-4f45-9708-019B960494DF}">
-                <a14:hiddenLine xmlns="" xmlns:a16="http://schemas.microsoft.com/office/drawing/2014/main" xmlns:p14="http://schemas.microsoft.com/office/powerpoint/2010/main" xmlns:a14="http://schemas.microsoft.com/office/drawing/2010/main" w="9525">
+                <a14:hiddenLine xmlns:a14="http://schemas.microsoft.com/office/drawing/2010/main" xmlns:p14="http://schemas.microsoft.com/office/powerpoint/2010/main" xmlns:a16="http://schemas.microsoft.com/office/drawing/2014/main" xmlns="" w="9525">
                   <a:solidFill>
                     <a:srgbClr val="000000"/>
                   </a:solidFill>
@@ -44595,7 +44628,7 @@
             </a:ln>
             <a:extLst>
               <a:ext uri="{91240B29-F687-4f45-9708-019B960494DF}">
-                <a14:hiddenLine xmlns="" xmlns:a16="http://schemas.microsoft.com/office/drawing/2014/main" xmlns:p14="http://schemas.microsoft.com/office/powerpoint/2010/main" xmlns:a14="http://schemas.microsoft.com/office/drawing/2010/main" w="9525">
+                <a14:hiddenLine xmlns:a14="http://schemas.microsoft.com/office/drawing/2010/main" xmlns:p14="http://schemas.microsoft.com/office/powerpoint/2010/main" xmlns:a16="http://schemas.microsoft.com/office/drawing/2014/main" xmlns="" w="9525">
                   <a:solidFill>
                     <a:srgbClr val="000000"/>
                   </a:solidFill>
@@ -44707,7 +44740,7 @@
             </a:ln>
             <a:extLst>
               <a:ext uri="{91240B29-F687-4f45-9708-019B960494DF}">
-                <a14:hiddenLine xmlns="" xmlns:a16="http://schemas.microsoft.com/office/drawing/2014/main" xmlns:p14="http://schemas.microsoft.com/office/powerpoint/2010/main" xmlns:a14="http://schemas.microsoft.com/office/drawing/2010/main" w="9525">
+                <a14:hiddenLine xmlns:a14="http://schemas.microsoft.com/office/drawing/2010/main" xmlns:p14="http://schemas.microsoft.com/office/powerpoint/2010/main" xmlns:a16="http://schemas.microsoft.com/office/drawing/2014/main" xmlns="" w="9525">
                   <a:solidFill>
                     <a:srgbClr val="000000"/>
                   </a:solidFill>
@@ -44763,7 +44796,7 @@
             </a:ln>
             <a:extLst>
               <a:ext uri="{91240B29-F687-4f45-9708-019B960494DF}">
-                <a14:hiddenLine xmlns="" xmlns:a16="http://schemas.microsoft.com/office/drawing/2014/main" xmlns:p14="http://schemas.microsoft.com/office/powerpoint/2010/main" xmlns:a14="http://schemas.microsoft.com/office/drawing/2010/main" w="9525">
+                <a14:hiddenLine xmlns:a14="http://schemas.microsoft.com/office/drawing/2010/main" xmlns:p14="http://schemas.microsoft.com/office/powerpoint/2010/main" xmlns:a16="http://schemas.microsoft.com/office/drawing/2014/main" xmlns="" w="9525">
                   <a:solidFill>
                     <a:srgbClr val="000000"/>
                   </a:solidFill>
@@ -45215,76 +45248,61 @@
           </a:bodyPr>
           <a:lstStyle/>
           <a:p>
-            <a:pPr marL="0" indent="0">
-              <a:buNone/>
-            </a:pPr>
-            <a:endParaRPr sz="2000" dirty="0"/>
+            <a:r>
+              <a:rPr lang="en-US" sz="2000" dirty="0" err="1"/>
+              <a:t>GeeksforGeeks</a:t>
+            </a:r>
+            <a:r>
+              <a:rPr lang="en-US" sz="2000" dirty="0"/>
+              <a:t>. (2025a, August 28). Unified Modeling Language (UML) Diagrams. </a:t>
+            </a:r>
+            <a:r>
+              <a:rPr lang="en-US" sz="2000" dirty="0" err="1"/>
+              <a:t>GeeksforGeeks</a:t>
+            </a:r>
+            <a:r>
+              <a:rPr lang="en-US" sz="2000" dirty="0"/>
+              <a:t>. </a:t>
+            </a:r>
+            <a:r>
+              <a:rPr lang="en-US" sz="2000" dirty="0">
+                <a:hlinkClick r:id="rId2"/>
+              </a:rPr>
+              <a:t>https://www.geeksforgeeks.org/system-design/unified-modeling-language-uml-introduction/</a:t>
+            </a:r>
+            <a:endParaRPr lang="en-US" sz="2000" dirty="0"/>
           </a:p>
           <a:p>
             <a:r>
-              <a:rPr sz="2000" dirty="0" err="1"/>
+              <a:rPr lang="en-US" sz="2000" dirty="0" err="1"/>
               <a:t>GeeksforGeeks</a:t>
             </a:r>
             <a:r>
-              <a:rPr sz="2000" dirty="0"/>
-              <a:t>. (2018, June 19). Classification of Software Requirements Software Engineering. </a:t>
+              <a:rPr lang="en-US" sz="2000" dirty="0"/>
+              <a:t>. (2025b, September 27). Classification of Software Requirements Software Engineering. </a:t>
             </a:r>
             <a:r>
-              <a:rPr sz="2000" dirty="0">
-                <a:hlinkClick r:id="rId2"/>
-              </a:rPr>
-              <a:t>https://www.geeksforgeeks.org/software-engineering/software-engineering-classification-of-software-requirements/</a:t>
+              <a:rPr lang="en-US" sz="2000" dirty="0" err="1"/>
+              <a:t>GeeksforGeeks</a:t>
             </a:r>
             <a:r>
               <a:rPr lang="en-US" sz="2000" dirty="0"/>
-              <a:t> </a:t>
-            </a:r>
-            <a:endParaRPr sz="2000" dirty="0"/>
-          </a:p>
-          <a:p>
-            <a:endParaRPr sz="2000" dirty="0"/>
-          </a:p>
-          <a:p>
-            <a:r>
-              <a:rPr sz="2000" dirty="0"/>
-              <a:t>Gullberg, M. (2025, July 28). A detailed website requirements document [free template]. </a:t>
-            </a:r>
-            <a:r>
-              <a:rPr sz="2000" dirty="0" err="1"/>
-              <a:t>Feedbucket.app</a:t>
-            </a:r>
-            <a:r>
-              <a:rPr sz="2000" dirty="0"/>
               <a:t>. </a:t>
             </a:r>
             <a:r>
-              <a:rPr sz="2000" dirty="0">
+              <a:rPr lang="en-US" sz="2000" dirty="0">
                 <a:hlinkClick r:id="rId3"/>
               </a:rPr>
-              <a:t>https://www.feedbucket.app/blog/website-requirements-document-template/</a:t>
+              <a:t>https://www.geeksforgeeks.org/software-engineering/</a:t>
             </a:r>
             <a:r>
-              <a:rPr lang="en-US" sz="2000" dirty="0"/>
-              <a:t> </a:t>
-            </a:r>
-            <a:endParaRPr sz="2000" dirty="0"/>
-          </a:p>
-          <a:p>
-            <a:endParaRPr sz="2000" dirty="0"/>
-          </a:p>
-          <a:p>
-            <a:r>
-              <a:rPr sz="2000" dirty="0"/>
-              <a:t>Process Impact. (2023). Training and Presentations. </a:t>
+              <a:rPr lang="en-US" sz="2000">
+                <a:hlinkClick r:id="rId3"/>
+              </a:rPr>
+              <a:t>software-engineering-classification-of-software-requirements/</a:t>
             </a:r>
             <a:r>
-              <a:rPr sz="2000" dirty="0">
-                <a:hlinkClick r:id="rId4"/>
-              </a:rPr>
-              <a:t>https://www.processimpact.com/training.html</a:t>
-            </a:r>
-            <a:r>
-              <a:rPr lang="en-US" sz="2000" dirty="0"/>
+              <a:rPr lang="en-US" sz="2000"/>
               <a:t> </a:t>
             </a:r>
             <a:endParaRPr sz="2000" dirty="0"/>
@@ -45311,10 +45329,10 @@
           <p:nvPr/>
         </p:nvPicPr>
         <p:blipFill>
-          <a:blip r:embed="rId5">
+          <a:blip r:embed="rId4">
             <a:extLst>
               <a:ext uri="{96DAC541-7B7A-43D3-8B79-37D633B846F1}">
-                <asvg:svgBlip xmlns:asvg="http://schemas.microsoft.com/office/drawing/2016/SVG/main" r:embed="rId6"/>
+                <asvg:svgBlip xmlns:asvg="http://schemas.microsoft.com/office/drawing/2016/SVG/main" r:embed="rId5"/>
               </a:ext>
             </a:extLst>
           </a:blip>
@@ -45352,10 +45370,10 @@
           <p:nvPr/>
         </p:nvPicPr>
         <p:blipFill>
-          <a:blip r:embed="rId5">
+          <a:blip r:embed="rId4">
             <a:extLst>
               <a:ext uri="{96DAC541-7B7A-43D3-8B79-37D633B846F1}">
-                <asvg:svgBlip xmlns:asvg="http://schemas.microsoft.com/office/drawing/2016/SVG/main" r:embed="rId6"/>
+                <asvg:svgBlip xmlns:asvg="http://schemas.microsoft.com/office/drawing/2016/SVG/main" r:embed="rId5"/>
               </a:ext>
             </a:extLst>
           </a:blip>
@@ -45534,7 +45552,7 @@
           <a:noFill/>
           <a:extLst>
             <a:ext uri="{909E8E84-426E-40dd-AFC4-6F175D3DCCD1}">
-              <a14:hiddenFill xmlns="" xmlns:a16="http://schemas.microsoft.com/office/drawing/2014/main" xmlns:p14="http://schemas.microsoft.com/office/powerpoint/2010/main" xmlns:a14="http://schemas.microsoft.com/office/drawing/2010/main">
+              <a14:hiddenFill xmlns:a14="http://schemas.microsoft.com/office/drawing/2010/main" xmlns:p14="http://schemas.microsoft.com/office/powerpoint/2010/main" xmlns:a16="http://schemas.microsoft.com/office/drawing/2014/main" xmlns="">
                 <a:solidFill>
                   <a:srgbClr val="FFFFFF"/>
                 </a:solidFill>
@@ -45688,7 +45706,7 @@
             </a:ln>
             <a:extLst>
               <a:ext uri="{91240B29-F687-4f45-9708-019B960494DF}">
-                <a14:hiddenLine xmlns="" xmlns:a16="http://schemas.microsoft.com/office/drawing/2014/main" xmlns:p14="http://schemas.microsoft.com/office/powerpoint/2010/main" xmlns:a14="http://schemas.microsoft.com/office/drawing/2010/main" w="9525">
+                <a14:hiddenLine xmlns:a14="http://schemas.microsoft.com/office/drawing/2010/main" xmlns:p14="http://schemas.microsoft.com/office/powerpoint/2010/main" xmlns:a16="http://schemas.microsoft.com/office/drawing/2014/main" xmlns="" w="9525">
                   <a:solidFill>
                     <a:srgbClr val="000000"/>
                   </a:solidFill>
@@ -45800,7 +45818,7 @@
             </a:ln>
             <a:extLst>
               <a:ext uri="{91240B29-F687-4f45-9708-019B960494DF}">
-                <a14:hiddenLine xmlns="" xmlns:a16="http://schemas.microsoft.com/office/drawing/2014/main" xmlns:p14="http://schemas.microsoft.com/office/powerpoint/2010/main" xmlns:a14="http://schemas.microsoft.com/office/drawing/2010/main" w="9525">
+                <a14:hiddenLine xmlns:a14="http://schemas.microsoft.com/office/drawing/2010/main" xmlns:p14="http://schemas.microsoft.com/office/powerpoint/2010/main" xmlns:a16="http://schemas.microsoft.com/office/drawing/2014/main" xmlns="" w="9525">
                   <a:solidFill>
                     <a:srgbClr val="000000"/>
                   </a:solidFill>
@@ -45912,7 +45930,7 @@
             </a:ln>
             <a:extLst>
               <a:ext uri="{91240B29-F687-4f45-9708-019B960494DF}">
-                <a14:hiddenLine xmlns="" xmlns:a16="http://schemas.microsoft.com/office/drawing/2014/main" xmlns:p14="http://schemas.microsoft.com/office/powerpoint/2010/main" xmlns:a14="http://schemas.microsoft.com/office/drawing/2010/main" w="9525">
+                <a14:hiddenLine xmlns:a14="http://schemas.microsoft.com/office/drawing/2010/main" xmlns:p14="http://schemas.microsoft.com/office/powerpoint/2010/main" xmlns:a16="http://schemas.microsoft.com/office/drawing/2014/main" xmlns="" w="9525">
                   <a:solidFill>
                     <a:srgbClr val="000000"/>
                   </a:solidFill>
@@ -45996,7 +46014,7 @@
             </a:ln>
             <a:extLst>
               <a:ext uri="{91240B29-F687-4f45-9708-019B960494DF}">
-                <a14:hiddenLine xmlns="" xmlns:a16="http://schemas.microsoft.com/office/drawing/2014/main" xmlns:p14="http://schemas.microsoft.com/office/powerpoint/2010/main" xmlns:a14="http://schemas.microsoft.com/office/drawing/2010/main" w="9525">
+                <a14:hiddenLine xmlns:a14="http://schemas.microsoft.com/office/drawing/2010/main" xmlns:p14="http://schemas.microsoft.com/office/powerpoint/2010/main" xmlns:a16="http://schemas.microsoft.com/office/drawing/2014/main" xmlns="" w="9525">
                   <a:solidFill>
                     <a:srgbClr val="000000"/>
                   </a:solidFill>
@@ -46108,7 +46126,7 @@
             </a:ln>
             <a:extLst>
               <a:ext uri="{91240B29-F687-4f45-9708-019B960494DF}">
-                <a14:hiddenLine xmlns="" xmlns:a16="http://schemas.microsoft.com/office/drawing/2014/main" xmlns:p14="http://schemas.microsoft.com/office/powerpoint/2010/main" xmlns:a14="http://schemas.microsoft.com/office/drawing/2010/main" w="9525">
+                <a14:hiddenLine xmlns:a14="http://schemas.microsoft.com/office/drawing/2010/main" xmlns:p14="http://schemas.microsoft.com/office/powerpoint/2010/main" xmlns:a16="http://schemas.microsoft.com/office/drawing/2014/main" xmlns="" w="9525">
                   <a:solidFill>
                     <a:srgbClr val="000000"/>
                   </a:solidFill>
@@ -46192,7 +46210,7 @@
             </a:ln>
             <a:extLst>
               <a:ext uri="{91240B29-F687-4f45-9708-019B960494DF}">
-                <a14:hiddenLine xmlns="" xmlns:a16="http://schemas.microsoft.com/office/drawing/2014/main" xmlns:p14="http://schemas.microsoft.com/office/powerpoint/2010/main" xmlns:a14="http://schemas.microsoft.com/office/drawing/2010/main" w="9525">
+                <a14:hiddenLine xmlns:a14="http://schemas.microsoft.com/office/drawing/2010/main" xmlns:p14="http://schemas.microsoft.com/office/powerpoint/2010/main" xmlns:a16="http://schemas.microsoft.com/office/drawing/2014/main" xmlns="" w="9525">
                   <a:solidFill>
                     <a:srgbClr val="000000"/>
                   </a:solidFill>
@@ -46276,7 +46294,7 @@
             </a:ln>
             <a:extLst>
               <a:ext uri="{91240B29-F687-4f45-9708-019B960494DF}">
-                <a14:hiddenLine xmlns="" xmlns:a16="http://schemas.microsoft.com/office/drawing/2014/main" xmlns:p14="http://schemas.microsoft.com/office/powerpoint/2010/main" xmlns:a14="http://schemas.microsoft.com/office/drawing/2010/main" w="9525">
+                <a14:hiddenLine xmlns:a14="http://schemas.microsoft.com/office/drawing/2010/main" xmlns:p14="http://schemas.microsoft.com/office/powerpoint/2010/main" xmlns:a16="http://schemas.microsoft.com/office/drawing/2014/main" xmlns="" w="9525">
                   <a:solidFill>
                     <a:srgbClr val="000000"/>
                   </a:solidFill>
@@ -46388,7 +46406,7 @@
             </a:ln>
             <a:extLst>
               <a:ext uri="{91240B29-F687-4f45-9708-019B960494DF}">
-                <a14:hiddenLine xmlns="" xmlns:a16="http://schemas.microsoft.com/office/drawing/2014/main" xmlns:p14="http://schemas.microsoft.com/office/powerpoint/2010/main" xmlns:a14="http://schemas.microsoft.com/office/drawing/2010/main" w="9525">
+                <a14:hiddenLine xmlns:a14="http://schemas.microsoft.com/office/drawing/2010/main" xmlns:p14="http://schemas.microsoft.com/office/powerpoint/2010/main" xmlns:a16="http://schemas.microsoft.com/office/drawing/2014/main" xmlns="" w="9525">
                   <a:solidFill>
                     <a:srgbClr val="000000"/>
                   </a:solidFill>
@@ -46500,7 +46518,7 @@
             </a:ln>
             <a:extLst>
               <a:ext uri="{91240B29-F687-4f45-9708-019B960494DF}">
-                <a14:hiddenLine xmlns="" xmlns:a16="http://schemas.microsoft.com/office/drawing/2014/main" xmlns:p14="http://schemas.microsoft.com/office/powerpoint/2010/main" xmlns:a14="http://schemas.microsoft.com/office/drawing/2010/main" w="9525">
+                <a14:hiddenLine xmlns:a14="http://schemas.microsoft.com/office/drawing/2010/main" xmlns:p14="http://schemas.microsoft.com/office/powerpoint/2010/main" xmlns:a16="http://schemas.microsoft.com/office/drawing/2014/main" xmlns="" w="9525">
                   <a:solidFill>
                     <a:srgbClr val="000000"/>
                   </a:solidFill>
@@ -46584,7 +46602,7 @@
             </a:ln>
             <a:extLst>
               <a:ext uri="{91240B29-F687-4f45-9708-019B960494DF}">
-                <a14:hiddenLine xmlns="" xmlns:a16="http://schemas.microsoft.com/office/drawing/2014/main" xmlns:p14="http://schemas.microsoft.com/office/powerpoint/2010/main" xmlns:a14="http://schemas.microsoft.com/office/drawing/2010/main" w="9525">
+                <a14:hiddenLine xmlns:a14="http://schemas.microsoft.com/office/drawing/2010/main" xmlns:p14="http://schemas.microsoft.com/office/powerpoint/2010/main" xmlns:a16="http://schemas.microsoft.com/office/drawing/2014/main" xmlns="" w="9525">
                   <a:solidFill>
                     <a:srgbClr val="000000"/>
                   </a:solidFill>
@@ -46716,7 +46734,7 @@
             </a:ln>
             <a:extLst>
               <a:ext uri="{91240B29-F687-4f45-9708-019B960494DF}">
-                <a14:hiddenLine xmlns="" xmlns:a16="http://schemas.microsoft.com/office/drawing/2014/main" xmlns:p14="http://schemas.microsoft.com/office/powerpoint/2010/main" xmlns:a14="http://schemas.microsoft.com/office/drawing/2010/main" w="9525">
+                <a14:hiddenLine xmlns:a14="http://schemas.microsoft.com/office/drawing/2010/main" xmlns:p14="http://schemas.microsoft.com/office/powerpoint/2010/main" xmlns:a16="http://schemas.microsoft.com/office/drawing/2014/main" xmlns="" w="9525">
                   <a:solidFill>
                     <a:srgbClr val="000000"/>
                   </a:solidFill>
@@ -46844,7 +46862,7 @@
             </a:ln>
             <a:extLst>
               <a:ext uri="{91240B29-F687-4f45-9708-019B960494DF}">
-                <a14:hiddenLine xmlns="" xmlns:a16="http://schemas.microsoft.com/office/drawing/2014/main" xmlns:p14="http://schemas.microsoft.com/office/powerpoint/2010/main" xmlns:a14="http://schemas.microsoft.com/office/drawing/2010/main" w="9525">
+                <a14:hiddenLine xmlns:a14="http://schemas.microsoft.com/office/drawing/2010/main" xmlns:p14="http://schemas.microsoft.com/office/powerpoint/2010/main" xmlns:a16="http://schemas.microsoft.com/office/drawing/2014/main" xmlns="" w="9525">
                   <a:solidFill>
                     <a:srgbClr val="000000"/>
                   </a:solidFill>
@@ -46928,7 +46946,7 @@
             </a:ln>
             <a:extLst>
               <a:ext uri="{91240B29-F687-4f45-9708-019B960494DF}">
-                <a14:hiddenLine xmlns="" xmlns:a16="http://schemas.microsoft.com/office/drawing/2014/main" xmlns:p14="http://schemas.microsoft.com/office/powerpoint/2010/main" xmlns:a14="http://schemas.microsoft.com/office/drawing/2010/main" w="9525">
+                <a14:hiddenLine xmlns:a14="http://schemas.microsoft.com/office/drawing/2010/main" xmlns:p14="http://schemas.microsoft.com/office/powerpoint/2010/main" xmlns:a16="http://schemas.microsoft.com/office/drawing/2014/main" xmlns="" w="9525">
                   <a:solidFill>
                     <a:srgbClr val="000000"/>
                   </a:solidFill>
@@ -47012,7 +47030,7 @@
             </a:ln>
             <a:extLst>
               <a:ext uri="{91240B29-F687-4f45-9708-019B960494DF}">
-                <a14:hiddenLine xmlns="" xmlns:a16="http://schemas.microsoft.com/office/drawing/2014/main" xmlns:p14="http://schemas.microsoft.com/office/powerpoint/2010/main" xmlns:a14="http://schemas.microsoft.com/office/drawing/2010/main" w="9525">
+                <a14:hiddenLine xmlns:a14="http://schemas.microsoft.com/office/drawing/2010/main" xmlns:p14="http://schemas.microsoft.com/office/powerpoint/2010/main" xmlns:a16="http://schemas.microsoft.com/office/drawing/2014/main" xmlns="" w="9525">
                   <a:solidFill>
                     <a:srgbClr val="000000"/>
                   </a:solidFill>
@@ -47124,7 +47142,7 @@
             </a:ln>
             <a:extLst>
               <a:ext uri="{91240B29-F687-4f45-9708-019B960494DF}">
-                <a14:hiddenLine xmlns="" xmlns:a16="http://schemas.microsoft.com/office/drawing/2014/main" xmlns:p14="http://schemas.microsoft.com/office/powerpoint/2010/main" xmlns:a14="http://schemas.microsoft.com/office/drawing/2010/main" w="9525">
+                <a14:hiddenLine xmlns:a14="http://schemas.microsoft.com/office/drawing/2010/main" xmlns:p14="http://schemas.microsoft.com/office/powerpoint/2010/main" xmlns:a16="http://schemas.microsoft.com/office/drawing/2014/main" xmlns="" w="9525">
                   <a:solidFill>
                     <a:srgbClr val="000000"/>
                   </a:solidFill>
@@ -47180,7 +47198,7 @@
             </a:ln>
             <a:extLst>
               <a:ext uri="{91240B29-F687-4f45-9708-019B960494DF}">
-                <a14:hiddenLine xmlns="" xmlns:a16="http://schemas.microsoft.com/office/drawing/2014/main" xmlns:p14="http://schemas.microsoft.com/office/powerpoint/2010/main" xmlns:a14="http://schemas.microsoft.com/office/drawing/2010/main" w="9525">
+                <a14:hiddenLine xmlns:a14="http://schemas.microsoft.com/office/drawing/2010/main" xmlns:p14="http://schemas.microsoft.com/office/powerpoint/2010/main" xmlns:a16="http://schemas.microsoft.com/office/drawing/2014/main" xmlns="" w="9525">
                   <a:solidFill>
                     <a:srgbClr val="000000"/>
                   </a:solidFill>
@@ -47267,7 +47285,7 @@
             </a:ln>
             <a:extLst>
               <a:ext uri="{91240B29-F687-4f45-9708-019B960494DF}">
-                <a14:hiddenLine xmlns="" xmlns:a16="http://schemas.microsoft.com/office/drawing/2014/main" xmlns:p14="http://schemas.microsoft.com/office/powerpoint/2010/main" xmlns:a14="http://schemas.microsoft.com/office/drawing/2010/main" w="9525">
+                <a14:hiddenLine xmlns:a14="http://schemas.microsoft.com/office/drawing/2010/main" xmlns:p14="http://schemas.microsoft.com/office/powerpoint/2010/main" xmlns:a16="http://schemas.microsoft.com/office/drawing/2014/main" xmlns="" w="9525">
                   <a:solidFill>
                     <a:srgbClr val="000000"/>
                   </a:solidFill>
@@ -47379,7 +47397,7 @@
             </a:ln>
             <a:extLst>
               <a:ext uri="{91240B29-F687-4f45-9708-019B960494DF}">
-                <a14:hiddenLine xmlns="" xmlns:a16="http://schemas.microsoft.com/office/drawing/2014/main" xmlns:p14="http://schemas.microsoft.com/office/powerpoint/2010/main" xmlns:a14="http://schemas.microsoft.com/office/drawing/2010/main" w="9525">
+                <a14:hiddenLine xmlns:a14="http://schemas.microsoft.com/office/drawing/2010/main" xmlns:p14="http://schemas.microsoft.com/office/powerpoint/2010/main" xmlns:a16="http://schemas.microsoft.com/office/drawing/2014/main" xmlns="" w="9525">
                   <a:solidFill>
                     <a:srgbClr val="000000"/>
                   </a:solidFill>
@@ -47463,7 +47481,7 @@
             </a:ln>
             <a:extLst>
               <a:ext uri="{91240B29-F687-4f45-9708-019B960494DF}">
-                <a14:hiddenLine xmlns="" xmlns:a16="http://schemas.microsoft.com/office/drawing/2014/main" xmlns:p14="http://schemas.microsoft.com/office/powerpoint/2010/main" xmlns:a14="http://schemas.microsoft.com/office/drawing/2010/main" w="9525">
+                <a14:hiddenLine xmlns:a14="http://schemas.microsoft.com/office/drawing/2010/main" xmlns:p14="http://schemas.microsoft.com/office/powerpoint/2010/main" xmlns:a16="http://schemas.microsoft.com/office/drawing/2014/main" xmlns="" w="9525">
                   <a:solidFill>
                     <a:srgbClr val="000000"/>
                   </a:solidFill>
@@ -47575,7 +47593,7 @@
             </a:ln>
             <a:extLst>
               <a:ext uri="{91240B29-F687-4f45-9708-019B960494DF}">
-                <a14:hiddenLine xmlns="" xmlns:a16="http://schemas.microsoft.com/office/drawing/2014/main" xmlns:p14="http://schemas.microsoft.com/office/powerpoint/2010/main" xmlns:a14="http://schemas.microsoft.com/office/drawing/2010/main" w="9525">
+                <a14:hiddenLine xmlns:a14="http://schemas.microsoft.com/office/drawing/2010/main" xmlns:p14="http://schemas.microsoft.com/office/powerpoint/2010/main" xmlns:a16="http://schemas.microsoft.com/office/drawing/2014/main" xmlns="" w="9525">
                   <a:solidFill>
                     <a:srgbClr val="000000"/>
                   </a:solidFill>
@@ -47662,7 +47680,7 @@
             </a:ln>
             <a:extLst>
               <a:ext uri="{91240B29-F687-4f45-9708-019B960494DF}">
-                <a14:hiddenLine xmlns="" xmlns:a16="http://schemas.microsoft.com/office/drawing/2014/main" xmlns:p14="http://schemas.microsoft.com/office/powerpoint/2010/main" xmlns:a14="http://schemas.microsoft.com/office/drawing/2010/main" w="9525">
+                <a14:hiddenLine xmlns:a14="http://schemas.microsoft.com/office/drawing/2010/main" xmlns:p14="http://schemas.microsoft.com/office/powerpoint/2010/main" xmlns:a16="http://schemas.microsoft.com/office/drawing/2014/main" xmlns="" w="9525">
                   <a:solidFill>
                     <a:srgbClr val="000000"/>
                   </a:solidFill>
@@ -47746,7 +47764,7 @@
             </a:ln>
             <a:extLst>
               <a:ext uri="{91240B29-F687-4f45-9708-019B960494DF}">
-                <a14:hiddenLine xmlns="" xmlns:a16="http://schemas.microsoft.com/office/drawing/2014/main" xmlns:p14="http://schemas.microsoft.com/office/powerpoint/2010/main" xmlns:a14="http://schemas.microsoft.com/office/drawing/2010/main" w="9525">
+                <a14:hiddenLine xmlns:a14="http://schemas.microsoft.com/office/drawing/2010/main" xmlns:p14="http://schemas.microsoft.com/office/powerpoint/2010/main" xmlns:a16="http://schemas.microsoft.com/office/drawing/2014/main" xmlns="" w="9525">
                   <a:solidFill>
                     <a:srgbClr val="000000"/>
                   </a:solidFill>
@@ -47858,7 +47876,7 @@
             </a:ln>
             <a:extLst>
               <a:ext uri="{91240B29-F687-4f45-9708-019B960494DF}">
-                <a14:hiddenLine xmlns="" xmlns:a16="http://schemas.microsoft.com/office/drawing/2014/main" xmlns:p14="http://schemas.microsoft.com/office/powerpoint/2010/main" xmlns:a14="http://schemas.microsoft.com/office/drawing/2010/main" w="9525">
+                <a14:hiddenLine xmlns:a14="http://schemas.microsoft.com/office/drawing/2010/main" xmlns:p14="http://schemas.microsoft.com/office/powerpoint/2010/main" xmlns:a16="http://schemas.microsoft.com/office/drawing/2014/main" xmlns="" w="9525">
                   <a:solidFill>
                     <a:srgbClr val="000000"/>
                   </a:solidFill>
@@ -47970,7 +47988,7 @@
             </a:ln>
             <a:extLst>
               <a:ext uri="{91240B29-F687-4f45-9708-019B960494DF}">
-                <a14:hiddenLine xmlns="" xmlns:a16="http://schemas.microsoft.com/office/drawing/2014/main" xmlns:p14="http://schemas.microsoft.com/office/powerpoint/2010/main" xmlns:a14="http://schemas.microsoft.com/office/drawing/2010/main" w="9525">
+                <a14:hiddenLine xmlns:a14="http://schemas.microsoft.com/office/drawing/2010/main" xmlns:p14="http://schemas.microsoft.com/office/powerpoint/2010/main" xmlns:a16="http://schemas.microsoft.com/office/drawing/2014/main" xmlns="" w="9525">
                   <a:solidFill>
                     <a:srgbClr val="000000"/>
                   </a:solidFill>
@@ -48057,7 +48075,7 @@
             </a:ln>
             <a:extLst>
               <a:ext uri="{91240B29-F687-4f45-9708-019B960494DF}">
-                <a14:hiddenLine xmlns="" xmlns:a16="http://schemas.microsoft.com/office/drawing/2014/main" xmlns:p14="http://schemas.microsoft.com/office/powerpoint/2010/main" xmlns:a14="http://schemas.microsoft.com/office/drawing/2010/main" w="9525">
+                <a14:hiddenLine xmlns:a14="http://schemas.microsoft.com/office/drawing/2010/main" xmlns:p14="http://schemas.microsoft.com/office/powerpoint/2010/main" xmlns:a16="http://schemas.microsoft.com/office/drawing/2014/main" xmlns="" w="9525">
                   <a:solidFill>
                     <a:srgbClr val="000000"/>
                   </a:solidFill>
@@ -48199,7 +48217,7 @@
             </a:ln>
             <a:extLst>
               <a:ext uri="{91240B29-F687-4f45-9708-019B960494DF}">
-                <a14:hiddenLine xmlns="" xmlns:a16="http://schemas.microsoft.com/office/drawing/2014/main" xmlns:p14="http://schemas.microsoft.com/office/powerpoint/2010/main" xmlns:a14="http://schemas.microsoft.com/office/drawing/2010/main" w="9525">
+                <a14:hiddenLine xmlns:a14="http://schemas.microsoft.com/office/drawing/2010/main" xmlns:p14="http://schemas.microsoft.com/office/powerpoint/2010/main" xmlns:a16="http://schemas.microsoft.com/office/drawing/2014/main" xmlns="" w="9525">
                   <a:solidFill>
                     <a:srgbClr val="000000"/>
                   </a:solidFill>
@@ -48811,7 +48829,7 @@
             <a:noFill/>
             <a:extLst>
               <a:ext uri="{909E8E84-426E-40dd-AFC4-6F175D3DCCD1}">
-                <a14:hiddenFill xmlns="" xmlns:a16="http://schemas.microsoft.com/office/drawing/2014/main" xmlns:a14="http://schemas.microsoft.com/office/drawing/2010/main" xmlns:p14="http://schemas.microsoft.com/office/powerpoint/2010/main">
+                <a14:hiddenFill xmlns:p14="http://schemas.microsoft.com/office/powerpoint/2010/main" xmlns:a14="http://schemas.microsoft.com/office/drawing/2010/main" xmlns:a16="http://schemas.microsoft.com/office/drawing/2014/main" xmlns="">
                   <a:solidFill>
                     <a:srgbClr val="FFFFFF"/>
                   </a:solidFill>
@@ -48954,7 +48972,7 @@
             </a:ln>
             <a:extLst>
               <a:ext uri="{91240B29-F687-4f45-9708-019B960494DF}">
-                <a14:hiddenLine xmlns="" xmlns:a16="http://schemas.microsoft.com/office/drawing/2014/main" xmlns:a14="http://schemas.microsoft.com/office/drawing/2010/main" xmlns:p14="http://schemas.microsoft.com/office/powerpoint/2010/main" w="9525">
+                <a14:hiddenLine xmlns:p14="http://schemas.microsoft.com/office/powerpoint/2010/main" xmlns:a14="http://schemas.microsoft.com/office/drawing/2010/main" xmlns:a16="http://schemas.microsoft.com/office/drawing/2014/main" xmlns="" w="9525">
                   <a:solidFill>
                     <a:srgbClr val="000000"/>
                   </a:solidFill>
@@ -49066,7 +49084,7 @@
             </a:ln>
             <a:extLst>
               <a:ext uri="{91240B29-F687-4f45-9708-019B960494DF}">
-                <a14:hiddenLine xmlns="" xmlns:a16="http://schemas.microsoft.com/office/drawing/2014/main" xmlns:a14="http://schemas.microsoft.com/office/drawing/2010/main" xmlns:p14="http://schemas.microsoft.com/office/powerpoint/2010/main" w="9525">
+                <a14:hiddenLine xmlns:p14="http://schemas.microsoft.com/office/powerpoint/2010/main" xmlns:a14="http://schemas.microsoft.com/office/drawing/2010/main" xmlns:a16="http://schemas.microsoft.com/office/drawing/2014/main" xmlns="" w="9525">
                   <a:solidFill>
                     <a:srgbClr val="000000"/>
                   </a:solidFill>
@@ -49178,7 +49196,7 @@
             </a:ln>
             <a:extLst>
               <a:ext uri="{91240B29-F687-4f45-9708-019B960494DF}">
-                <a14:hiddenLine xmlns="" xmlns:a16="http://schemas.microsoft.com/office/drawing/2014/main" xmlns:a14="http://schemas.microsoft.com/office/drawing/2010/main" xmlns:p14="http://schemas.microsoft.com/office/powerpoint/2010/main" w="9525">
+                <a14:hiddenLine xmlns:p14="http://schemas.microsoft.com/office/powerpoint/2010/main" xmlns:a14="http://schemas.microsoft.com/office/drawing/2010/main" xmlns:a16="http://schemas.microsoft.com/office/drawing/2014/main" xmlns="" w="9525">
                   <a:solidFill>
                     <a:srgbClr val="000000"/>
                   </a:solidFill>
@@ -49234,7 +49252,7 @@
             </a:ln>
             <a:extLst>
               <a:ext uri="{91240B29-F687-4f45-9708-019B960494DF}">
-                <a14:hiddenLine xmlns="" xmlns:a16="http://schemas.microsoft.com/office/drawing/2014/main" xmlns:a14="http://schemas.microsoft.com/office/drawing/2010/main" xmlns:p14="http://schemas.microsoft.com/office/powerpoint/2010/main" w="9525">
+                <a14:hiddenLine xmlns:p14="http://schemas.microsoft.com/office/powerpoint/2010/main" xmlns:a14="http://schemas.microsoft.com/office/drawing/2010/main" xmlns:a16="http://schemas.microsoft.com/office/drawing/2014/main" xmlns="" w="9525">
                   <a:solidFill>
                     <a:srgbClr val="000000"/>
                   </a:solidFill>
@@ -49346,7 +49364,7 @@
             </a:ln>
             <a:extLst>
               <a:ext uri="{91240B29-F687-4f45-9708-019B960494DF}">
-                <a14:hiddenLine xmlns="" xmlns:a16="http://schemas.microsoft.com/office/drawing/2014/main" xmlns:a14="http://schemas.microsoft.com/office/drawing/2010/main" xmlns:p14="http://schemas.microsoft.com/office/powerpoint/2010/main" w="9525">
+                <a14:hiddenLine xmlns:p14="http://schemas.microsoft.com/office/powerpoint/2010/main" xmlns:a14="http://schemas.microsoft.com/office/drawing/2010/main" xmlns:a16="http://schemas.microsoft.com/office/drawing/2014/main" xmlns="" w="9525">
                   <a:solidFill>
                     <a:srgbClr val="000000"/>
                   </a:solidFill>
@@ -49430,7 +49448,7 @@
             </a:ln>
             <a:extLst>
               <a:ext uri="{91240B29-F687-4f45-9708-019B960494DF}">
-                <a14:hiddenLine xmlns="" xmlns:a16="http://schemas.microsoft.com/office/drawing/2014/main" xmlns:a14="http://schemas.microsoft.com/office/drawing/2010/main" xmlns:p14="http://schemas.microsoft.com/office/powerpoint/2010/main" w="9525">
+                <a14:hiddenLine xmlns:p14="http://schemas.microsoft.com/office/powerpoint/2010/main" xmlns:a14="http://schemas.microsoft.com/office/drawing/2010/main" xmlns:a16="http://schemas.microsoft.com/office/drawing/2014/main" xmlns="" w="9525">
                   <a:solidFill>
                     <a:srgbClr val="000000"/>
                   </a:solidFill>
@@ -49514,7 +49532,7 @@
             </a:ln>
             <a:extLst>
               <a:ext uri="{91240B29-F687-4f45-9708-019B960494DF}">
-                <a14:hiddenLine xmlns="" xmlns:a16="http://schemas.microsoft.com/office/drawing/2014/main" xmlns:a14="http://schemas.microsoft.com/office/drawing/2010/main" xmlns:p14="http://schemas.microsoft.com/office/powerpoint/2010/main" w="9525">
+                <a14:hiddenLine xmlns:p14="http://schemas.microsoft.com/office/powerpoint/2010/main" xmlns:a14="http://schemas.microsoft.com/office/drawing/2010/main" xmlns:a16="http://schemas.microsoft.com/office/drawing/2014/main" xmlns="" w="9525">
                   <a:solidFill>
                     <a:srgbClr val="000000"/>
                   </a:solidFill>
@@ -49626,7 +49644,7 @@
             </a:ln>
             <a:extLst>
               <a:ext uri="{91240B29-F687-4f45-9708-019B960494DF}">
-                <a14:hiddenLine xmlns="" xmlns:a16="http://schemas.microsoft.com/office/drawing/2014/main" xmlns:a14="http://schemas.microsoft.com/office/drawing/2010/main" xmlns:p14="http://schemas.microsoft.com/office/powerpoint/2010/main" w="9525">
+                <a14:hiddenLine xmlns:p14="http://schemas.microsoft.com/office/powerpoint/2010/main" xmlns:a14="http://schemas.microsoft.com/office/drawing/2010/main" xmlns:a16="http://schemas.microsoft.com/office/drawing/2014/main" xmlns="" w="9525">
                   <a:solidFill>
                     <a:srgbClr val="000000"/>
                   </a:solidFill>
@@ -49710,7 +49728,7 @@
             </a:ln>
             <a:extLst>
               <a:ext uri="{91240B29-F687-4f45-9708-019B960494DF}">
-                <a14:hiddenLine xmlns="" xmlns:a16="http://schemas.microsoft.com/office/drawing/2014/main" xmlns:a14="http://schemas.microsoft.com/office/drawing/2010/main" xmlns:p14="http://schemas.microsoft.com/office/powerpoint/2010/main" w="9525">
+                <a14:hiddenLine xmlns:p14="http://schemas.microsoft.com/office/powerpoint/2010/main" xmlns:a14="http://schemas.microsoft.com/office/drawing/2010/main" xmlns:a16="http://schemas.microsoft.com/office/drawing/2014/main" xmlns="" w="9525">
                   <a:solidFill>
                     <a:srgbClr val="000000"/>
                   </a:solidFill>
@@ -49794,7 +49812,7 @@
             </a:ln>
             <a:extLst>
               <a:ext uri="{91240B29-F687-4f45-9708-019B960494DF}">
-                <a14:hiddenLine xmlns="" xmlns:a16="http://schemas.microsoft.com/office/drawing/2014/main" xmlns:a14="http://schemas.microsoft.com/office/drawing/2010/main" xmlns:p14="http://schemas.microsoft.com/office/powerpoint/2010/main" w="9525">
+                <a14:hiddenLine xmlns:p14="http://schemas.microsoft.com/office/powerpoint/2010/main" xmlns:a14="http://schemas.microsoft.com/office/drawing/2010/main" xmlns:a16="http://schemas.microsoft.com/office/drawing/2014/main" xmlns="" w="9525">
                   <a:solidFill>
                     <a:srgbClr val="000000"/>
                   </a:solidFill>
@@ -49906,7 +49924,7 @@
             </a:ln>
             <a:extLst>
               <a:ext uri="{91240B29-F687-4f45-9708-019B960494DF}">
-                <a14:hiddenLine xmlns="" xmlns:a16="http://schemas.microsoft.com/office/drawing/2014/main" xmlns:a14="http://schemas.microsoft.com/office/drawing/2010/main" xmlns:p14="http://schemas.microsoft.com/office/powerpoint/2010/main" w="9525">
+                <a14:hiddenLine xmlns:p14="http://schemas.microsoft.com/office/powerpoint/2010/main" xmlns:a14="http://schemas.microsoft.com/office/drawing/2010/main" xmlns:a16="http://schemas.microsoft.com/office/drawing/2014/main" xmlns="" w="9525">
                   <a:solidFill>
                     <a:srgbClr val="000000"/>
                   </a:solidFill>
@@ -50018,7 +50036,7 @@
             </a:ln>
             <a:extLst>
               <a:ext uri="{91240B29-F687-4f45-9708-019B960494DF}">
-                <a14:hiddenLine xmlns="" xmlns:a16="http://schemas.microsoft.com/office/drawing/2014/main" xmlns:a14="http://schemas.microsoft.com/office/drawing/2010/main" xmlns:p14="http://schemas.microsoft.com/office/powerpoint/2010/main" w="9525">
+                <a14:hiddenLine xmlns:p14="http://schemas.microsoft.com/office/powerpoint/2010/main" xmlns:a14="http://schemas.microsoft.com/office/drawing/2010/main" xmlns:a16="http://schemas.microsoft.com/office/drawing/2014/main" xmlns="" w="9525">
                   <a:solidFill>
                     <a:srgbClr val="000000"/>
                   </a:solidFill>
@@ -50102,7 +50120,7 @@
             </a:ln>
             <a:extLst>
               <a:ext uri="{91240B29-F687-4f45-9708-019B960494DF}">
-                <a14:hiddenLine xmlns="" xmlns:a16="http://schemas.microsoft.com/office/drawing/2014/main" xmlns:a14="http://schemas.microsoft.com/office/drawing/2010/main" xmlns:p14="http://schemas.microsoft.com/office/powerpoint/2010/main" w="9525">
+                <a14:hiddenLine xmlns:p14="http://schemas.microsoft.com/office/powerpoint/2010/main" xmlns:a14="http://schemas.microsoft.com/office/drawing/2010/main" xmlns:a16="http://schemas.microsoft.com/office/drawing/2014/main" xmlns="" w="9525">
                   <a:solidFill>
                     <a:srgbClr val="000000"/>
                   </a:solidFill>
@@ -50234,7 +50252,7 @@
             </a:ln>
             <a:extLst>
               <a:ext uri="{91240B29-F687-4f45-9708-019B960494DF}">
-                <a14:hiddenLine xmlns="" xmlns:a16="http://schemas.microsoft.com/office/drawing/2014/main" xmlns:a14="http://schemas.microsoft.com/office/drawing/2010/main" xmlns:p14="http://schemas.microsoft.com/office/powerpoint/2010/main" w="9525">
+                <a14:hiddenLine xmlns:p14="http://schemas.microsoft.com/office/powerpoint/2010/main" xmlns:a14="http://schemas.microsoft.com/office/drawing/2010/main" xmlns:a16="http://schemas.microsoft.com/office/drawing/2014/main" xmlns="" w="9525">
                   <a:solidFill>
                     <a:srgbClr val="000000"/>
                   </a:solidFill>
@@ -50318,7 +50336,7 @@
             </a:ln>
             <a:extLst>
               <a:ext uri="{91240B29-F687-4f45-9708-019B960494DF}">
-                <a14:hiddenLine xmlns="" xmlns:a16="http://schemas.microsoft.com/office/drawing/2014/main" xmlns:a14="http://schemas.microsoft.com/office/drawing/2010/main" xmlns:p14="http://schemas.microsoft.com/office/powerpoint/2010/main" w="9525">
+                <a14:hiddenLine xmlns:p14="http://schemas.microsoft.com/office/powerpoint/2010/main" xmlns:a14="http://schemas.microsoft.com/office/drawing/2010/main" xmlns:a16="http://schemas.microsoft.com/office/drawing/2014/main" xmlns="" w="9525">
                   <a:solidFill>
                     <a:srgbClr val="000000"/>
                   </a:solidFill>
@@ -50430,7 +50448,7 @@
             </a:ln>
             <a:extLst>
               <a:ext uri="{91240B29-F687-4f45-9708-019B960494DF}">
-                <a14:hiddenLine xmlns="" xmlns:a16="http://schemas.microsoft.com/office/drawing/2014/main" xmlns:a14="http://schemas.microsoft.com/office/drawing/2010/main" xmlns:p14="http://schemas.microsoft.com/office/powerpoint/2010/main" w="9525">
+                <a14:hiddenLine xmlns:p14="http://schemas.microsoft.com/office/powerpoint/2010/main" xmlns:a14="http://schemas.microsoft.com/office/drawing/2010/main" xmlns:a16="http://schemas.microsoft.com/office/drawing/2014/main" xmlns="" w="9525">
                   <a:solidFill>
                     <a:srgbClr val="000000"/>
                   </a:solidFill>
@@ -50542,7 +50560,7 @@
             </a:ln>
             <a:extLst>
               <a:ext uri="{91240B29-F687-4f45-9708-019B960494DF}">
-                <a14:hiddenLine xmlns="" xmlns:a16="http://schemas.microsoft.com/office/drawing/2014/main" xmlns:a14="http://schemas.microsoft.com/office/drawing/2010/main" xmlns:p14="http://schemas.microsoft.com/office/powerpoint/2010/main" w="9525">
+                <a14:hiddenLine xmlns:p14="http://schemas.microsoft.com/office/powerpoint/2010/main" xmlns:a14="http://schemas.microsoft.com/office/drawing/2010/main" xmlns:a16="http://schemas.microsoft.com/office/drawing/2014/main" xmlns="" w="9525">
                   <a:solidFill>
                     <a:srgbClr val="000000"/>
                   </a:solidFill>
@@ -50626,7 +50644,7 @@
             </a:ln>
             <a:extLst>
               <a:ext uri="{91240B29-F687-4f45-9708-019B960494DF}">
-                <a14:hiddenLine xmlns="" xmlns:a16="http://schemas.microsoft.com/office/drawing/2014/main" xmlns:a14="http://schemas.microsoft.com/office/drawing/2010/main" xmlns:p14="http://schemas.microsoft.com/office/powerpoint/2010/main" w="9525">
+                <a14:hiddenLine xmlns:p14="http://schemas.microsoft.com/office/powerpoint/2010/main" xmlns:a14="http://schemas.microsoft.com/office/drawing/2010/main" xmlns:a16="http://schemas.microsoft.com/office/drawing/2014/main" xmlns="" w="9525">
                   <a:solidFill>
                     <a:srgbClr val="000000"/>
                   </a:solidFill>
@@ -50738,7 +50756,7 @@
             </a:ln>
             <a:extLst>
               <a:ext uri="{91240B29-F687-4f45-9708-019B960494DF}">
-                <a14:hiddenLine xmlns="" xmlns:a16="http://schemas.microsoft.com/office/drawing/2014/main" xmlns:a14="http://schemas.microsoft.com/office/drawing/2010/main" xmlns:p14="http://schemas.microsoft.com/office/powerpoint/2010/main" w="9525">
+                <a14:hiddenLine xmlns:p14="http://schemas.microsoft.com/office/powerpoint/2010/main" xmlns:a14="http://schemas.microsoft.com/office/drawing/2010/main" xmlns:a16="http://schemas.microsoft.com/office/drawing/2014/main" xmlns="" w="9525">
                   <a:solidFill>
                     <a:srgbClr val="000000"/>
                   </a:solidFill>
@@ -50850,7 +50868,7 @@
             </a:ln>
             <a:extLst>
               <a:ext uri="{91240B29-F687-4f45-9708-019B960494DF}">
-                <a14:hiddenLine xmlns="" xmlns:a16="http://schemas.microsoft.com/office/drawing/2014/main" xmlns:a14="http://schemas.microsoft.com/office/drawing/2010/main" xmlns:p14="http://schemas.microsoft.com/office/powerpoint/2010/main" w="9525">
+                <a14:hiddenLine xmlns:p14="http://schemas.microsoft.com/office/powerpoint/2010/main" xmlns:a14="http://schemas.microsoft.com/office/drawing/2010/main" xmlns:a16="http://schemas.microsoft.com/office/drawing/2014/main" xmlns="" w="9525">
                   <a:solidFill>
                     <a:srgbClr val="000000"/>
                   </a:solidFill>
@@ -50928,7 +50946,7 @@
             </a:ln>
             <a:extLst>
               <a:ext uri="{91240B29-F687-4f45-9708-019B960494DF}">
-                <a14:hiddenLine xmlns="" xmlns:a16="http://schemas.microsoft.com/office/drawing/2014/main" xmlns:a14="http://schemas.microsoft.com/office/drawing/2010/main" xmlns:p14="http://schemas.microsoft.com/office/powerpoint/2010/main" w="9525">
+                <a14:hiddenLine xmlns:p14="http://schemas.microsoft.com/office/powerpoint/2010/main" xmlns:a14="http://schemas.microsoft.com/office/drawing/2010/main" xmlns:a16="http://schemas.microsoft.com/office/drawing/2014/main" xmlns="" w="9525">
                   <a:solidFill>
                     <a:srgbClr val="000000"/>
                   </a:solidFill>
@@ -51040,7 +51058,7 @@
             </a:ln>
             <a:extLst>
               <a:ext uri="{91240B29-F687-4f45-9708-019B960494DF}">
-                <a14:hiddenLine xmlns="" xmlns:a16="http://schemas.microsoft.com/office/drawing/2014/main" xmlns:a14="http://schemas.microsoft.com/office/drawing/2010/main" xmlns:p14="http://schemas.microsoft.com/office/powerpoint/2010/main" w="9525">
+                <a14:hiddenLine xmlns:p14="http://schemas.microsoft.com/office/powerpoint/2010/main" xmlns:a14="http://schemas.microsoft.com/office/drawing/2010/main" xmlns:a16="http://schemas.microsoft.com/office/drawing/2014/main" xmlns="" w="9525">
                   <a:solidFill>
                     <a:srgbClr val="000000"/>
                   </a:solidFill>
@@ -51118,7 +51136,7 @@
             </a:ln>
             <a:extLst>
               <a:ext uri="{91240B29-F687-4f45-9708-019B960494DF}">
-                <a14:hiddenLine xmlns="" xmlns:a16="http://schemas.microsoft.com/office/drawing/2014/main" xmlns:a14="http://schemas.microsoft.com/office/drawing/2010/main" xmlns:p14="http://schemas.microsoft.com/office/powerpoint/2010/main" w="9525">
+                <a14:hiddenLine xmlns:p14="http://schemas.microsoft.com/office/powerpoint/2010/main" xmlns:a14="http://schemas.microsoft.com/office/drawing/2010/main" xmlns:a16="http://schemas.microsoft.com/office/drawing/2014/main" xmlns="" w="9525">
                   <a:solidFill>
                     <a:srgbClr val="000000"/>
                   </a:solidFill>
@@ -51230,7 +51248,7 @@
             </a:ln>
             <a:extLst>
               <a:ext uri="{91240B29-F687-4f45-9708-019B960494DF}">
-                <a14:hiddenLine xmlns="" xmlns:a16="http://schemas.microsoft.com/office/drawing/2014/main" xmlns:a14="http://schemas.microsoft.com/office/drawing/2010/main" xmlns:p14="http://schemas.microsoft.com/office/powerpoint/2010/main" w="9525">
+                <a14:hiddenLine xmlns:p14="http://schemas.microsoft.com/office/powerpoint/2010/main" xmlns:a14="http://schemas.microsoft.com/office/drawing/2010/main" xmlns:a16="http://schemas.microsoft.com/office/drawing/2014/main" xmlns="" w="9525">
                   <a:solidFill>
                     <a:srgbClr val="000000"/>
                   </a:solidFill>
@@ -51320,7 +51338,7 @@
             </a:ln>
             <a:extLst>
               <a:ext uri="{91240B29-F687-4f45-9708-019B960494DF}">
-                <a14:hiddenLine xmlns="" xmlns:a16="http://schemas.microsoft.com/office/drawing/2014/main" xmlns:a14="http://schemas.microsoft.com/office/drawing/2010/main" xmlns:p14="http://schemas.microsoft.com/office/powerpoint/2010/main" w="9525">
+                <a14:hiddenLine xmlns:p14="http://schemas.microsoft.com/office/powerpoint/2010/main" xmlns:a14="http://schemas.microsoft.com/office/drawing/2010/main" xmlns:a16="http://schemas.microsoft.com/office/drawing/2014/main" xmlns="" w="9525">
                   <a:solidFill>
                     <a:srgbClr val="000000"/>
                   </a:solidFill>
@@ -51432,7 +51450,7 @@
             </a:ln>
             <a:extLst>
               <a:ext uri="{91240B29-F687-4f45-9708-019B960494DF}">
-                <a14:hiddenLine xmlns="" xmlns:a16="http://schemas.microsoft.com/office/drawing/2014/main" xmlns:a14="http://schemas.microsoft.com/office/drawing/2010/main" xmlns:p14="http://schemas.microsoft.com/office/powerpoint/2010/main" w="9525">
+                <a14:hiddenLine xmlns:p14="http://schemas.microsoft.com/office/powerpoint/2010/main" xmlns:a14="http://schemas.microsoft.com/office/drawing/2010/main" xmlns:a16="http://schemas.microsoft.com/office/drawing/2014/main" xmlns="" w="9525">
                   <a:solidFill>
                     <a:srgbClr val="000000"/>
                   </a:solidFill>
@@ -51522,7 +51540,7 @@
             </a:ln>
             <a:extLst>
               <a:ext uri="{91240B29-F687-4f45-9708-019B960494DF}">
-                <a14:hiddenLine xmlns="" xmlns:a16="http://schemas.microsoft.com/office/drawing/2014/main" xmlns:a14="http://schemas.microsoft.com/office/drawing/2010/main" xmlns:p14="http://schemas.microsoft.com/office/powerpoint/2010/main" w="9525">
+                <a14:hiddenLine xmlns:p14="http://schemas.microsoft.com/office/powerpoint/2010/main" xmlns:a14="http://schemas.microsoft.com/office/drawing/2010/main" xmlns:a16="http://schemas.microsoft.com/office/drawing/2014/main" xmlns="" w="9525">
                   <a:solidFill>
                     <a:srgbClr val="000000"/>
                   </a:solidFill>
@@ -51634,7 +51652,7 @@
             </a:ln>
             <a:extLst>
               <a:ext uri="{91240B29-F687-4f45-9708-019B960494DF}">
-                <a14:hiddenLine xmlns="" xmlns:a16="http://schemas.microsoft.com/office/drawing/2014/main" xmlns:a14="http://schemas.microsoft.com/office/drawing/2010/main" xmlns:p14="http://schemas.microsoft.com/office/powerpoint/2010/main" w="9525">
+                <a14:hiddenLine xmlns:p14="http://schemas.microsoft.com/office/powerpoint/2010/main" xmlns:a14="http://schemas.microsoft.com/office/drawing/2010/main" xmlns:a16="http://schemas.microsoft.com/office/drawing/2014/main" xmlns="" w="9525">
                   <a:solidFill>
                     <a:srgbClr val="000000"/>
                   </a:solidFill>
@@ -51690,7 +51708,7 @@
             </a:ln>
             <a:extLst>
               <a:ext uri="{91240B29-F687-4f45-9708-019B960494DF}">
-                <a14:hiddenLine xmlns="" xmlns:a16="http://schemas.microsoft.com/office/drawing/2014/main" xmlns:a14="http://schemas.microsoft.com/office/drawing/2010/main" xmlns:p14="http://schemas.microsoft.com/office/powerpoint/2010/main" w="9525">
+                <a14:hiddenLine xmlns:p14="http://schemas.microsoft.com/office/powerpoint/2010/main" xmlns:a14="http://schemas.microsoft.com/office/drawing/2010/main" xmlns:a16="http://schemas.microsoft.com/office/drawing/2014/main" xmlns="" w="9525">
                   <a:solidFill>
                     <a:srgbClr val="000000"/>
                   </a:solidFill>
@@ -51802,7 +51820,7 @@
             </a:ln>
             <a:extLst>
               <a:ext uri="{91240B29-F687-4f45-9708-019B960494DF}">
-                <a14:hiddenLine xmlns="" xmlns:a16="http://schemas.microsoft.com/office/drawing/2014/main" xmlns:a14="http://schemas.microsoft.com/office/drawing/2010/main" xmlns:p14="http://schemas.microsoft.com/office/powerpoint/2010/main" w="9525">
+                <a14:hiddenLine xmlns:p14="http://schemas.microsoft.com/office/powerpoint/2010/main" xmlns:a14="http://schemas.microsoft.com/office/drawing/2010/main" xmlns:a16="http://schemas.microsoft.com/office/drawing/2014/main" xmlns="" w="9525">
                   <a:solidFill>
                     <a:srgbClr val="000000"/>
                   </a:solidFill>
@@ -51886,7 +51904,7 @@
             </a:ln>
             <a:extLst>
               <a:ext uri="{91240B29-F687-4f45-9708-019B960494DF}">
-                <a14:hiddenLine xmlns="" xmlns:a16="http://schemas.microsoft.com/office/drawing/2014/main" xmlns:a14="http://schemas.microsoft.com/office/drawing/2010/main" xmlns:p14="http://schemas.microsoft.com/office/powerpoint/2010/main" w="9525">
+                <a14:hiddenLine xmlns:p14="http://schemas.microsoft.com/office/powerpoint/2010/main" xmlns:a14="http://schemas.microsoft.com/office/drawing/2010/main" xmlns:a16="http://schemas.microsoft.com/office/drawing/2014/main" xmlns="" w="9525">
                   <a:solidFill>
                     <a:srgbClr val="000000"/>
                   </a:solidFill>
@@ -51970,7 +51988,7 @@
             </a:ln>
             <a:extLst>
               <a:ext uri="{91240B29-F687-4f45-9708-019B960494DF}">
-                <a14:hiddenLine xmlns="" xmlns:a16="http://schemas.microsoft.com/office/drawing/2014/main" xmlns:a14="http://schemas.microsoft.com/office/drawing/2010/main" xmlns:p14="http://schemas.microsoft.com/office/powerpoint/2010/main" w="9525">
+                <a14:hiddenLine xmlns:p14="http://schemas.microsoft.com/office/powerpoint/2010/main" xmlns:a14="http://schemas.microsoft.com/office/drawing/2010/main" xmlns:a16="http://schemas.microsoft.com/office/drawing/2014/main" xmlns="" w="9525">
                   <a:solidFill>
                     <a:srgbClr val="000000"/>
                   </a:solidFill>
@@ -52082,7 +52100,7 @@
             </a:ln>
             <a:extLst>
               <a:ext uri="{91240B29-F687-4f45-9708-019B960494DF}">
-                <a14:hiddenLine xmlns="" xmlns:a16="http://schemas.microsoft.com/office/drawing/2014/main" xmlns:a14="http://schemas.microsoft.com/office/drawing/2010/main" xmlns:p14="http://schemas.microsoft.com/office/powerpoint/2010/main" w="9525">
+                <a14:hiddenLine xmlns:p14="http://schemas.microsoft.com/office/powerpoint/2010/main" xmlns:a14="http://schemas.microsoft.com/office/drawing/2010/main" xmlns:a16="http://schemas.microsoft.com/office/drawing/2014/main" xmlns="" w="9525">
                   <a:solidFill>
                     <a:srgbClr val="000000"/>
                   </a:solidFill>
@@ -52172,7 +52190,7 @@
             </a:ln>
             <a:extLst>
               <a:ext uri="{91240B29-F687-4f45-9708-019B960494DF}">
-                <a14:hiddenLine xmlns="" xmlns:a16="http://schemas.microsoft.com/office/drawing/2014/main" xmlns:a14="http://schemas.microsoft.com/office/drawing/2010/main" xmlns:p14="http://schemas.microsoft.com/office/powerpoint/2010/main" w="9525">
+                <a14:hiddenLine xmlns:p14="http://schemas.microsoft.com/office/powerpoint/2010/main" xmlns:a14="http://schemas.microsoft.com/office/drawing/2010/main" xmlns:a16="http://schemas.microsoft.com/office/drawing/2014/main" xmlns="" w="9525">
                   <a:solidFill>
                     <a:srgbClr val="000000"/>
                   </a:solidFill>
@@ -52256,7 +52274,7 @@
             </a:ln>
             <a:extLst>
               <a:ext uri="{91240B29-F687-4f45-9708-019B960494DF}">
-                <a14:hiddenLine xmlns="" xmlns:a16="http://schemas.microsoft.com/office/drawing/2014/main" xmlns:a14="http://schemas.microsoft.com/office/drawing/2010/main" xmlns:p14="http://schemas.microsoft.com/office/powerpoint/2010/main" w="9525">
+                <a14:hiddenLine xmlns:p14="http://schemas.microsoft.com/office/powerpoint/2010/main" xmlns:a14="http://schemas.microsoft.com/office/drawing/2010/main" xmlns:a16="http://schemas.microsoft.com/office/drawing/2014/main" xmlns="" w="9525">
                   <a:solidFill>
                     <a:srgbClr val="000000"/>
                   </a:solidFill>
@@ -52368,7 +52386,7 @@
             </a:ln>
             <a:extLst>
               <a:ext uri="{91240B29-F687-4f45-9708-019B960494DF}">
-                <a14:hiddenLine xmlns="" xmlns:a16="http://schemas.microsoft.com/office/drawing/2014/main" xmlns:a14="http://schemas.microsoft.com/office/drawing/2010/main" xmlns:p14="http://schemas.microsoft.com/office/powerpoint/2010/main" w="9525">
+                <a14:hiddenLine xmlns:p14="http://schemas.microsoft.com/office/powerpoint/2010/main" xmlns:a14="http://schemas.microsoft.com/office/drawing/2010/main" xmlns:a16="http://schemas.microsoft.com/office/drawing/2014/main" xmlns="" w="9525">
                   <a:solidFill>
                     <a:srgbClr val="000000"/>
                   </a:solidFill>
@@ -52452,7 +52470,7 @@
             </a:ln>
             <a:extLst>
               <a:ext uri="{91240B29-F687-4f45-9708-019B960494DF}">
-                <a14:hiddenLine xmlns="" xmlns:a16="http://schemas.microsoft.com/office/drawing/2014/main" xmlns:a14="http://schemas.microsoft.com/office/drawing/2010/main" xmlns:p14="http://schemas.microsoft.com/office/powerpoint/2010/main" w="9525">
+                <a14:hiddenLine xmlns:p14="http://schemas.microsoft.com/office/powerpoint/2010/main" xmlns:a14="http://schemas.microsoft.com/office/drawing/2010/main" xmlns:a16="http://schemas.microsoft.com/office/drawing/2014/main" xmlns="" w="9525">
                   <a:solidFill>
                     <a:srgbClr val="000000"/>
                   </a:solidFill>
@@ -52564,7 +52582,7 @@
             </a:ln>
             <a:extLst>
               <a:ext uri="{91240B29-F687-4f45-9708-019B960494DF}">
-                <a14:hiddenLine xmlns="" xmlns:a16="http://schemas.microsoft.com/office/drawing/2014/main" xmlns:a14="http://schemas.microsoft.com/office/drawing/2010/main" xmlns:p14="http://schemas.microsoft.com/office/powerpoint/2010/main" w="9525">
+                <a14:hiddenLine xmlns:p14="http://schemas.microsoft.com/office/powerpoint/2010/main" xmlns:a14="http://schemas.microsoft.com/office/drawing/2010/main" xmlns:a16="http://schemas.microsoft.com/office/drawing/2014/main" xmlns="" w="9525">
                   <a:solidFill>
                     <a:srgbClr val="000000"/>
                   </a:solidFill>
@@ -52648,7 +52666,7 @@
             </a:ln>
             <a:extLst>
               <a:ext uri="{91240B29-F687-4f45-9708-019B960494DF}">
-                <a14:hiddenLine xmlns="" xmlns:a16="http://schemas.microsoft.com/office/drawing/2014/main" xmlns:a14="http://schemas.microsoft.com/office/drawing/2010/main" xmlns:p14="http://schemas.microsoft.com/office/powerpoint/2010/main" w="9525">
+                <a14:hiddenLine xmlns:p14="http://schemas.microsoft.com/office/powerpoint/2010/main" xmlns:a14="http://schemas.microsoft.com/office/drawing/2010/main" xmlns:a16="http://schemas.microsoft.com/office/drawing/2014/main" xmlns="" w="9525">
                   <a:solidFill>
                     <a:srgbClr val="000000"/>
                   </a:solidFill>
@@ -52760,7 +52778,7 @@
             </a:ln>
             <a:extLst>
               <a:ext uri="{91240B29-F687-4f45-9708-019B960494DF}">
-                <a14:hiddenLine xmlns="" xmlns:a16="http://schemas.microsoft.com/office/drawing/2014/main" xmlns:a14="http://schemas.microsoft.com/office/drawing/2010/main" xmlns:p14="http://schemas.microsoft.com/office/powerpoint/2010/main" w="9525">
+                <a14:hiddenLine xmlns:p14="http://schemas.microsoft.com/office/powerpoint/2010/main" xmlns:a14="http://schemas.microsoft.com/office/drawing/2010/main" xmlns:a16="http://schemas.microsoft.com/office/drawing/2014/main" xmlns="" w="9525">
                   <a:solidFill>
                     <a:srgbClr val="000000"/>
                   </a:solidFill>
@@ -52816,7 +52834,7 @@
             </a:ln>
             <a:extLst>
               <a:ext uri="{91240B29-F687-4f45-9708-019B960494DF}">
-                <a14:hiddenLine xmlns="" xmlns:a16="http://schemas.microsoft.com/office/drawing/2014/main" xmlns:a14="http://schemas.microsoft.com/office/drawing/2010/main" xmlns:p14="http://schemas.microsoft.com/office/powerpoint/2010/main" w="9525">
+                <a14:hiddenLine xmlns:p14="http://schemas.microsoft.com/office/powerpoint/2010/main" xmlns:a14="http://schemas.microsoft.com/office/drawing/2010/main" xmlns:a16="http://schemas.microsoft.com/office/drawing/2014/main" xmlns="" w="9525">
                   <a:solidFill>
                     <a:srgbClr val="000000"/>
                   </a:solidFill>
@@ -52903,7 +52921,7 @@
             </a:ln>
             <a:extLst>
               <a:ext uri="{91240B29-F687-4f45-9708-019B960494DF}">
-                <a14:hiddenLine xmlns="" xmlns:a16="http://schemas.microsoft.com/office/drawing/2014/main" xmlns:a14="http://schemas.microsoft.com/office/drawing/2010/main" xmlns:p14="http://schemas.microsoft.com/office/powerpoint/2010/main" w="9525">
+                <a14:hiddenLine xmlns:p14="http://schemas.microsoft.com/office/powerpoint/2010/main" xmlns:a14="http://schemas.microsoft.com/office/drawing/2010/main" xmlns:a16="http://schemas.microsoft.com/office/drawing/2014/main" xmlns="" w="9525">
                   <a:solidFill>
                     <a:srgbClr val="000000"/>
                   </a:solidFill>
@@ -53015,7 +53033,7 @@
             </a:ln>
             <a:extLst>
               <a:ext uri="{91240B29-F687-4f45-9708-019B960494DF}">
-                <a14:hiddenLine xmlns="" xmlns:a16="http://schemas.microsoft.com/office/drawing/2014/main" xmlns:a14="http://schemas.microsoft.com/office/drawing/2010/main" xmlns:p14="http://schemas.microsoft.com/office/powerpoint/2010/main" w="9525">
+                <a14:hiddenLine xmlns:p14="http://schemas.microsoft.com/office/powerpoint/2010/main" xmlns:a14="http://schemas.microsoft.com/office/drawing/2010/main" xmlns:a16="http://schemas.microsoft.com/office/drawing/2014/main" xmlns="" w="9525">
                   <a:solidFill>
                     <a:srgbClr val="000000"/>
                   </a:solidFill>
@@ -53099,7 +53117,7 @@
             </a:ln>
             <a:extLst>
               <a:ext uri="{91240B29-F687-4f45-9708-019B960494DF}">
-                <a14:hiddenLine xmlns="" xmlns:a16="http://schemas.microsoft.com/office/drawing/2014/main" xmlns:a14="http://schemas.microsoft.com/office/drawing/2010/main" xmlns:p14="http://schemas.microsoft.com/office/powerpoint/2010/main" w="9525">
+                <a14:hiddenLine xmlns:p14="http://schemas.microsoft.com/office/powerpoint/2010/main" xmlns:a14="http://schemas.microsoft.com/office/drawing/2010/main" xmlns:a16="http://schemas.microsoft.com/office/drawing/2014/main" xmlns="" w="9525">
                   <a:solidFill>
                     <a:srgbClr val="000000"/>
                   </a:solidFill>
@@ -53211,7 +53229,7 @@
             </a:ln>
             <a:extLst>
               <a:ext uri="{91240B29-F687-4f45-9708-019B960494DF}">
-                <a14:hiddenLine xmlns="" xmlns:a16="http://schemas.microsoft.com/office/drawing/2014/main" xmlns:a14="http://schemas.microsoft.com/office/drawing/2010/main" xmlns:p14="http://schemas.microsoft.com/office/powerpoint/2010/main" w="9525">
+                <a14:hiddenLine xmlns:p14="http://schemas.microsoft.com/office/powerpoint/2010/main" xmlns:a14="http://schemas.microsoft.com/office/drawing/2010/main" xmlns:a16="http://schemas.microsoft.com/office/drawing/2014/main" xmlns="" w="9525">
                   <a:solidFill>
                     <a:srgbClr val="000000"/>
                   </a:solidFill>
@@ -53323,7 +53341,7 @@
             </a:ln>
             <a:extLst>
               <a:ext uri="{91240B29-F687-4f45-9708-019B960494DF}">
-                <a14:hiddenLine xmlns="" xmlns:a16="http://schemas.microsoft.com/office/drawing/2014/main" xmlns:a14="http://schemas.microsoft.com/office/drawing/2010/main" xmlns:p14="http://schemas.microsoft.com/office/powerpoint/2010/main" w="9525">
+                <a14:hiddenLine xmlns:p14="http://schemas.microsoft.com/office/powerpoint/2010/main" xmlns:a14="http://schemas.microsoft.com/office/drawing/2010/main" xmlns:a16="http://schemas.microsoft.com/office/drawing/2014/main" xmlns="" w="9525">
                   <a:solidFill>
                     <a:srgbClr val="000000"/>
                   </a:solidFill>
@@ -53410,7 +53428,7 @@
             </a:ln>
             <a:extLst>
               <a:ext uri="{91240B29-F687-4f45-9708-019B960494DF}">
-                <a14:hiddenLine xmlns="" xmlns:a16="http://schemas.microsoft.com/office/drawing/2014/main" xmlns:a14="http://schemas.microsoft.com/office/drawing/2010/main" xmlns:p14="http://schemas.microsoft.com/office/powerpoint/2010/main" w="9525">
+                <a14:hiddenLine xmlns:p14="http://schemas.microsoft.com/office/powerpoint/2010/main" xmlns:a14="http://schemas.microsoft.com/office/drawing/2010/main" xmlns:a16="http://schemas.microsoft.com/office/drawing/2014/main" xmlns="" w="9525">
                   <a:solidFill>
                     <a:srgbClr val="000000"/>
                   </a:solidFill>
@@ -53494,7 +53512,7 @@
             </a:ln>
             <a:extLst>
               <a:ext uri="{91240B29-F687-4f45-9708-019B960494DF}">
-                <a14:hiddenLine xmlns="" xmlns:a16="http://schemas.microsoft.com/office/drawing/2014/main" xmlns:a14="http://schemas.microsoft.com/office/drawing/2010/main" xmlns:p14="http://schemas.microsoft.com/office/powerpoint/2010/main" w="9525">
+                <a14:hiddenLine xmlns:p14="http://schemas.microsoft.com/office/powerpoint/2010/main" xmlns:a14="http://schemas.microsoft.com/office/drawing/2010/main" xmlns:a16="http://schemas.microsoft.com/office/drawing/2014/main" xmlns="" w="9525">
                   <a:solidFill>
                     <a:srgbClr val="000000"/>
                   </a:solidFill>
@@ -53606,7 +53624,7 @@
             </a:ln>
             <a:extLst>
               <a:ext uri="{91240B29-F687-4f45-9708-019B960494DF}">
-                <a14:hiddenLine xmlns="" xmlns:a16="http://schemas.microsoft.com/office/drawing/2014/main" xmlns:a14="http://schemas.microsoft.com/office/drawing/2010/main" xmlns:p14="http://schemas.microsoft.com/office/powerpoint/2010/main" w="9525">
+                <a14:hiddenLine xmlns:p14="http://schemas.microsoft.com/office/powerpoint/2010/main" xmlns:a14="http://schemas.microsoft.com/office/drawing/2010/main" xmlns:a16="http://schemas.microsoft.com/office/drawing/2014/main" xmlns="" w="9525">
                   <a:solidFill>
                     <a:srgbClr val="000000"/>
                   </a:solidFill>
@@ -53718,7 +53736,7 @@
             </a:ln>
             <a:extLst>
               <a:ext uri="{91240B29-F687-4f45-9708-019B960494DF}">
-                <a14:hiddenLine xmlns="" xmlns:a16="http://schemas.microsoft.com/office/drawing/2014/main" xmlns:a14="http://schemas.microsoft.com/office/drawing/2010/main" xmlns:p14="http://schemas.microsoft.com/office/powerpoint/2010/main" w="9525">
+                <a14:hiddenLine xmlns:p14="http://schemas.microsoft.com/office/powerpoint/2010/main" xmlns:a14="http://schemas.microsoft.com/office/drawing/2010/main" xmlns:a16="http://schemas.microsoft.com/office/drawing/2014/main" xmlns="" w="9525">
                   <a:solidFill>
                     <a:srgbClr val="000000"/>
                   </a:solidFill>
@@ -53802,7 +53820,7 @@
             </a:ln>
             <a:extLst>
               <a:ext uri="{91240B29-F687-4f45-9708-019B960494DF}">
-                <a14:hiddenLine xmlns="" xmlns:a16="http://schemas.microsoft.com/office/drawing/2014/main" xmlns:a14="http://schemas.microsoft.com/office/drawing/2010/main" xmlns:p14="http://schemas.microsoft.com/office/powerpoint/2010/main" w="9525">
+                <a14:hiddenLine xmlns:p14="http://schemas.microsoft.com/office/powerpoint/2010/main" xmlns:a14="http://schemas.microsoft.com/office/drawing/2010/main" xmlns:a16="http://schemas.microsoft.com/office/drawing/2014/main" xmlns="" w="9525">
                   <a:solidFill>
                     <a:srgbClr val="000000"/>
                   </a:solidFill>
@@ -53944,7 +53962,7 @@
             </a:ln>
             <a:extLst>
               <a:ext uri="{91240B29-F687-4f45-9708-019B960494DF}">
-                <a14:hiddenLine xmlns="" xmlns:a16="http://schemas.microsoft.com/office/drawing/2014/main" xmlns:a14="http://schemas.microsoft.com/office/drawing/2010/main" xmlns:p14="http://schemas.microsoft.com/office/powerpoint/2010/main" w="9525">
+                <a14:hiddenLine xmlns:p14="http://schemas.microsoft.com/office/powerpoint/2010/main" xmlns:a14="http://schemas.microsoft.com/office/drawing/2010/main" xmlns:a16="http://schemas.microsoft.com/office/drawing/2014/main" xmlns="" w="9525">
                   <a:solidFill>
                     <a:srgbClr val="000000"/>
                   </a:solidFill>
@@ -54034,7 +54052,7 @@
             </a:ln>
             <a:extLst>
               <a:ext uri="{91240B29-F687-4f45-9708-019B960494DF}">
-                <a14:hiddenLine xmlns="" xmlns:a16="http://schemas.microsoft.com/office/drawing/2014/main" xmlns:a14="http://schemas.microsoft.com/office/drawing/2010/main" xmlns:p14="http://schemas.microsoft.com/office/powerpoint/2010/main" w="9525">
+                <a14:hiddenLine xmlns:p14="http://schemas.microsoft.com/office/powerpoint/2010/main" xmlns:a14="http://schemas.microsoft.com/office/drawing/2010/main" xmlns:a16="http://schemas.microsoft.com/office/drawing/2014/main" xmlns="" w="9525">
                   <a:solidFill>
                     <a:srgbClr val="000000"/>
                   </a:solidFill>
@@ -54146,7 +54164,7 @@
             </a:ln>
             <a:extLst>
               <a:ext uri="{91240B29-F687-4f45-9708-019B960494DF}">
-                <a14:hiddenLine xmlns="" xmlns:a16="http://schemas.microsoft.com/office/drawing/2014/main" xmlns:a14="http://schemas.microsoft.com/office/drawing/2010/main" xmlns:p14="http://schemas.microsoft.com/office/powerpoint/2010/main" w="9525">
+                <a14:hiddenLine xmlns:p14="http://schemas.microsoft.com/office/powerpoint/2010/main" xmlns:a14="http://schemas.microsoft.com/office/drawing/2010/main" xmlns:a16="http://schemas.microsoft.com/office/drawing/2014/main" xmlns="" w="9525">
                   <a:solidFill>
                     <a:srgbClr val="000000"/>
                   </a:solidFill>

</xml_diff>